<commit_message>
order processing: first preference: Yes
</commit_message>
<xml_diff>
--- a/notes/Business_flows.pptx
+++ b/notes/Business_flows.pptx
@@ -5,10 +5,11 @@
     <p:sldMasterId id="2147483648" r:id="rId1"/>
   </p:sldMasterIdLst>
   <p:notesMasterIdLst>
-    <p:notesMasterId r:id="rId3"/>
+    <p:notesMasterId r:id="rId4"/>
   </p:notesMasterIdLst>
   <p:sldIdLst>
     <p:sldId id="257" r:id="rId2"/>
+    <p:sldId id="258" r:id="rId3"/>
   </p:sldIdLst>
   <p:sldSz cx="9144000" cy="6858000" type="screen4x3"/>
   <p:notesSz cx="6858000" cy="9144000"/>
@@ -526,6 +527,90 @@
             <a:fld id="{76C21F45-62E2-45F0-9269-DC91EBB6FBC8}" type="slidenum">
               <a:rPr lang="en-IN" smtClean="0"/>
               <a:t>1</a:t>
+            </a:fld>
+            <a:endParaRPr lang="en-IN"/>
+          </a:p>
+        </p:txBody>
+      </p:sp>
+    </p:spTree>
+    <p:extLst>
+      <p:ext uri="{BB962C8B-B14F-4D97-AF65-F5344CB8AC3E}">
+        <p14:creationId xmlns:p14="http://schemas.microsoft.com/office/powerpoint/2010/main" val="3524416177"/>
+      </p:ext>
+    </p:extLst>
+  </p:cSld>
+  <p:clrMapOvr>
+    <a:masterClrMapping/>
+  </p:clrMapOvr>
+</p:notes>
+</file>
+
+<file path=ppt/notesSlides/notesSlide2.xml><?xml version="1.0" encoding="utf-8"?>
+<p:notes xmlns:a="http://schemas.openxmlformats.org/drawingml/2006/main" xmlns:r="http://schemas.openxmlformats.org/officeDocument/2006/relationships" xmlns:p="http://schemas.openxmlformats.org/presentationml/2006/main">
+  <p:cSld>
+    <p:spTree>
+      <p:nvGrpSpPr>
+        <p:cNvPr id="1" name=""/>
+        <p:cNvGrpSpPr/>
+        <p:nvPr/>
+      </p:nvGrpSpPr>
+      <p:grpSpPr>
+        <a:xfrm>
+          <a:off x="0" y="0"/>
+          <a:ext cx="0" cy="0"/>
+          <a:chOff x="0" y="0"/>
+          <a:chExt cx="0" cy="0"/>
+        </a:xfrm>
+      </p:grpSpPr>
+      <p:sp>
+        <p:nvSpPr>
+          <p:cNvPr id="2" name="Slide Image Placeholder 1"/>
+          <p:cNvSpPr>
+            <a:spLocks noGrp="1" noRot="1" noChangeAspect="1"/>
+          </p:cNvSpPr>
+          <p:nvPr>
+            <p:ph type="sldImg"/>
+          </p:nvPr>
+        </p:nvSpPr>
+        <p:spPr/>
+      </p:sp>
+      <p:sp>
+        <p:nvSpPr>
+          <p:cNvPr id="3" name="Notes Placeholder 2"/>
+          <p:cNvSpPr>
+            <a:spLocks noGrp="1"/>
+          </p:cNvSpPr>
+          <p:nvPr>
+            <p:ph type="body" idx="1"/>
+          </p:nvPr>
+        </p:nvSpPr>
+        <p:spPr/>
+        <p:txBody>
+          <a:bodyPr/>
+          <a:lstStyle/>
+          <a:p>
+            <a:endParaRPr lang="en-IN"/>
+          </a:p>
+        </p:txBody>
+      </p:sp>
+      <p:sp>
+        <p:nvSpPr>
+          <p:cNvPr id="4" name="Slide Number Placeholder 3"/>
+          <p:cNvSpPr>
+            <a:spLocks noGrp="1"/>
+          </p:cNvSpPr>
+          <p:nvPr>
+            <p:ph type="sldNum" sz="quarter" idx="10"/>
+          </p:nvPr>
+        </p:nvSpPr>
+        <p:spPr/>
+        <p:txBody>
+          <a:bodyPr/>
+          <a:lstStyle/>
+          <a:p>
+            <a:fld id="{76C21F45-62E2-45F0-9269-DC91EBB6FBC8}" type="slidenum">
+              <a:rPr lang="en-IN" smtClean="0"/>
+              <a:t>2</a:t>
             </a:fld>
             <a:endParaRPr lang="en-IN"/>
           </a:p>
@@ -3605,7 +3690,15 @@
             <a:p>
               <a:r>
                 <a:rPr lang="en-US" sz="1400" dirty="0" smtClean="0"/>
-                <a:t>Order processing: availability first preference: NO, further preferences YES/NO </a:t>
+                <a:t>Order processing: </a:t>
+              </a:r>
+              <a:r>
+                <a:rPr lang="en-US" sz="1400" dirty="0" smtClean="0"/>
+                <a:t>first </a:t>
+              </a:r>
+              <a:r>
+                <a:rPr lang="en-US" sz="1400" dirty="0" smtClean="0"/>
+                <a:t>preference: NO, further preferences YES/NO </a:t>
               </a:r>
               <a:endParaRPr lang="en-IN" sz="1400" dirty="0"/>
             </a:p>
@@ -3676,7 +3769,7 @@
         </p:blipFill>
         <p:spPr bwMode="auto">
           <a:xfrm>
-            <a:off x="8388424" y="2209012"/>
+            <a:off x="7236296" y="2209012"/>
             <a:ext cx="771922" cy="771922"/>
           </a:xfrm>
           <a:prstGeom prst="rect">
@@ -3789,7 +3882,7 @@
         <p:spPr>
           <a:xfrm>
             <a:off x="5004048" y="512676"/>
-            <a:ext cx="3770337" cy="1696336"/>
+            <a:ext cx="2618209" cy="1696336"/>
           </a:xfrm>
           <a:prstGeom prst="bentConnector2">
             <a:avLst/>
@@ -3821,7 +3914,7 @@
         </p:nvGrpSpPr>
         <p:grpSpPr>
           <a:xfrm>
-            <a:off x="395536" y="527472"/>
+            <a:off x="73596" y="489372"/>
             <a:ext cx="1416417" cy="276999"/>
             <a:chOff x="395536" y="574080"/>
             <a:chExt cx="1416417" cy="276999"/>
@@ -3901,99 +3994,13 @@
       </p:grpSp>
       <p:grpSp>
         <p:nvGrpSpPr>
-          <p:cNvPr id="20" name="Group 19"/>
+          <p:cNvPr id="89" name="Group 88"/>
           <p:cNvGrpSpPr/>
           <p:nvPr/>
         </p:nvGrpSpPr>
         <p:grpSpPr>
           <a:xfrm>
-            <a:off x="7020272" y="514772"/>
-            <a:ext cx="1944216" cy="276999"/>
-            <a:chOff x="395536" y="574080"/>
-            <a:chExt cx="1944216" cy="276999"/>
-          </a:xfrm>
-        </p:grpSpPr>
-        <p:pic>
-          <p:nvPicPr>
-            <p:cNvPr id="21" name="Picture 5" descr="D:\MyWorkSpace\xampp\htdocs\bmhs\assets\img\bmhs\icons\email.png"/>
-            <p:cNvPicPr>
-              <a:picLocks noChangeAspect="1" noChangeArrowheads="1"/>
-            </p:cNvPicPr>
-            <p:nvPr/>
-          </p:nvPicPr>
-          <p:blipFill>
-            <a:blip r:embed="rId5" cstate="print">
-              <a:extLst>
-                <a:ext uri="{28A0092B-C50C-407E-A947-70E740481C1C}">
-                  <a14:useLocalDpi xmlns:a14="http://schemas.microsoft.com/office/drawing/2010/main" val="0"/>
-                </a:ext>
-              </a:extLst>
-            </a:blip>
-            <a:srcRect/>
-            <a:stretch>
-              <a:fillRect/>
-            </a:stretch>
-          </p:blipFill>
-          <p:spPr bwMode="auto">
-            <a:xfrm>
-              <a:off x="395536" y="620688"/>
-              <a:ext cx="248502" cy="177392"/>
-            </a:xfrm>
-            <a:prstGeom prst="rect">
-              <a:avLst/>
-            </a:prstGeom>
-            <a:noFill/>
-            <a:extLst>
-              <a:ext uri="{909E8E84-426E-40DD-AFC4-6F175D3DCCD1}">
-                <a14:hiddenFill xmlns:a14="http://schemas.microsoft.com/office/drawing/2010/main">
-                  <a:solidFill>
-                    <a:srgbClr val="FFFFFF"/>
-                  </a:solidFill>
-                </a14:hiddenFill>
-              </a:ext>
-            </a:extLst>
-          </p:spPr>
-        </p:pic>
-        <p:sp>
-          <p:nvSpPr>
-            <p:cNvPr id="22" name="TextBox 21"/>
-            <p:cNvSpPr txBox="1"/>
-            <p:nvPr/>
-          </p:nvSpPr>
-          <p:spPr>
-            <a:xfrm>
-              <a:off x="611560" y="574080"/>
-              <a:ext cx="1728192" cy="276999"/>
-            </a:xfrm>
-            <a:prstGeom prst="rect">
-              <a:avLst/>
-            </a:prstGeom>
-            <a:noFill/>
-          </p:spPr>
-          <p:txBody>
-            <a:bodyPr wrap="square" rtlCol="0">
-              <a:spAutoFit/>
-            </a:bodyPr>
-            <a:lstStyle/>
-            <a:p>
-              <a:r>
-                <a:rPr lang="en-US" sz="1200" dirty="0" smtClean="0"/>
-                <a:t>Booking  confirmation</a:t>
-              </a:r>
-              <a:endParaRPr lang="en-IN" sz="1200" dirty="0"/>
-            </a:p>
-          </p:txBody>
-        </p:sp>
-      </p:grpSp>
-      <p:grpSp>
-        <p:nvGrpSpPr>
-          <p:cNvPr id="89" name="Group 88"/>
-          <p:cNvGrpSpPr/>
-          <p:nvPr/>
-        </p:nvGrpSpPr>
-        <p:grpSpPr>
-          <a:xfrm>
-            <a:off x="395536" y="3140968"/>
+            <a:off x="60896" y="3140968"/>
             <a:ext cx="1296144" cy="461665"/>
             <a:chOff x="3707904" y="3933056"/>
             <a:chExt cx="1296144" cy="461665"/>
@@ -4336,7 +4343,7 @@
         </p:nvGrpSpPr>
         <p:grpSpPr>
           <a:xfrm>
-            <a:off x="395536" y="5102285"/>
+            <a:off x="60896" y="5102285"/>
             <a:ext cx="1296144" cy="1015663"/>
             <a:chOff x="3707904" y="3933056"/>
             <a:chExt cx="1296144" cy="1015663"/>
@@ -4422,7 +4429,7 @@
         </p:nvGrpSpPr>
         <p:grpSpPr>
           <a:xfrm>
-            <a:off x="6300192" y="3327375"/>
+            <a:off x="5868144" y="2782669"/>
             <a:ext cx="1296144" cy="646331"/>
             <a:chOff x="3707904" y="3933056"/>
             <a:chExt cx="1296144" cy="646331"/>
@@ -4508,7 +4515,7 @@
         </p:nvSpPr>
         <p:spPr>
           <a:xfrm>
-            <a:off x="1818343" y="4985295"/>
+            <a:off x="431540" y="4742245"/>
             <a:ext cx="360040" cy="360040"/>
           </a:xfrm>
           <a:prstGeom prst="ellipse">
@@ -4652,7 +4659,7 @@
         </p:nvSpPr>
         <p:spPr>
           <a:xfrm>
-            <a:off x="722136" y="1988840"/>
+            <a:off x="467544" y="1988840"/>
             <a:ext cx="360040" cy="360040"/>
           </a:xfrm>
           <a:prstGeom prst="ellipse">
@@ -4694,7 +4701,7 @@
         </p:nvSpPr>
         <p:spPr>
           <a:xfrm>
-            <a:off x="3478498" y="4298613"/>
+            <a:off x="3478498" y="4509120"/>
             <a:ext cx="360040" cy="360040"/>
           </a:xfrm>
           <a:prstGeom prst="ellipse">
@@ -4736,7 +4743,7 @@
         </p:nvSpPr>
         <p:spPr>
           <a:xfrm>
-            <a:off x="4876660" y="4149080"/>
+            <a:off x="3923927" y="3143328"/>
             <a:ext cx="2071604" cy="537990"/>
           </a:xfrm>
           <a:prstGeom prst="diamond">
@@ -4781,8 +4788,8 @@
         </p:nvCxnSpPr>
         <p:spPr>
           <a:xfrm flipV="1">
-            <a:off x="4034885" y="4687070"/>
-            <a:ext cx="1877577" cy="1555328"/>
+            <a:off x="4034885" y="3681318"/>
+            <a:ext cx="924844" cy="2561080"/>
           </a:xfrm>
           <a:prstGeom prst="bentConnector2">
             <a:avLst/>
@@ -4814,7 +4821,7 @@
         </p:nvSpPr>
         <p:spPr>
           <a:xfrm>
-            <a:off x="1211756" y="1988840"/>
+            <a:off x="957164" y="1988840"/>
             <a:ext cx="360040" cy="360040"/>
           </a:xfrm>
           <a:prstGeom prst="ellipse">
@@ -4898,7 +4905,7 @@
         </p:nvSpPr>
         <p:spPr>
           <a:xfrm>
-            <a:off x="1691680" y="1988840"/>
+            <a:off x="1437088" y="1988840"/>
             <a:ext cx="360040" cy="360040"/>
           </a:xfrm>
           <a:prstGeom prst="ellipse">
@@ -4943,8 +4950,8 @@
         </p:nvCxnSpPr>
         <p:spPr>
           <a:xfrm flipV="1">
-            <a:off x="6948264" y="2980934"/>
-            <a:ext cx="1826121" cy="1437141"/>
+            <a:off x="5995531" y="2980934"/>
+            <a:ext cx="1626726" cy="431389"/>
           </a:xfrm>
           <a:prstGeom prst="bentConnector2">
             <a:avLst/>
@@ -4976,7 +4983,7 @@
         </p:nvSpPr>
         <p:spPr>
           <a:xfrm>
-            <a:off x="5547970" y="3861048"/>
+            <a:off x="5004048" y="2842435"/>
             <a:ext cx="464190" cy="276998"/>
           </a:xfrm>
           <a:prstGeom prst="rect">
@@ -5006,7 +5013,7 @@
         </p:nvSpPr>
         <p:spPr>
           <a:xfrm>
-            <a:off x="6844114" y="4437112"/>
+            <a:off x="5940152" y="3429000"/>
             <a:ext cx="464190" cy="276998"/>
           </a:xfrm>
           <a:prstGeom prst="rect">
@@ -5036,10 +5043,10 @@
         </p:nvGrpSpPr>
         <p:grpSpPr>
           <a:xfrm>
-            <a:off x="3638593" y="4839470"/>
-            <a:ext cx="1296144" cy="1200329"/>
+            <a:off x="3131840" y="4839470"/>
+            <a:ext cx="1296144" cy="646331"/>
             <a:chOff x="3707904" y="3933056"/>
-            <a:chExt cx="1296144" cy="1200329"/>
+            <a:chExt cx="1296144" cy="646331"/>
           </a:xfrm>
         </p:grpSpPr>
         <p:pic>
@@ -5092,7 +5099,7 @@
           <p:spPr>
             <a:xfrm>
               <a:off x="3950954" y="3933056"/>
-              <a:ext cx="1053094" cy="1200329"/>
+              <a:ext cx="1053094" cy="646331"/>
             </a:xfrm>
             <a:prstGeom prst="rect">
               <a:avLst/>
@@ -5107,7 +5114,11 @@
             <a:p>
               <a:r>
                 <a:rPr lang="en-US" sz="1200" dirty="0" smtClean="0"/>
-                <a:t>If preferred place is not available, then check with similar places</a:t>
+                <a:t>Then </a:t>
+              </a:r>
+              <a:r>
+                <a:rPr lang="en-US" sz="1200" dirty="0" smtClean="0"/>
+                <a:t>check with similar places</a:t>
               </a:r>
               <a:endParaRPr lang="en-IN" sz="1200" dirty="0"/>
             </a:p>
@@ -5122,10 +5133,10 @@
         </p:nvGrpSpPr>
         <p:grpSpPr>
           <a:xfrm>
-            <a:off x="7478241" y="4547021"/>
-            <a:ext cx="1296144" cy="1200329"/>
+            <a:off x="6012160" y="3812847"/>
+            <a:ext cx="1296144" cy="646331"/>
             <a:chOff x="3707904" y="3933056"/>
-            <a:chExt cx="1296144" cy="1200329"/>
+            <a:chExt cx="1296144" cy="646331"/>
           </a:xfrm>
         </p:grpSpPr>
         <p:pic>
@@ -5178,7 +5189,7 @@
           <p:spPr>
             <a:xfrm>
               <a:off x="3950954" y="3933056"/>
-              <a:ext cx="1053094" cy="1200329"/>
+              <a:ext cx="1053094" cy="646331"/>
             </a:xfrm>
             <a:prstGeom prst="rect">
               <a:avLst/>
@@ -5193,7 +5204,11 @@
             <a:p>
               <a:r>
                 <a:rPr lang="en-US" sz="1200" dirty="0" smtClean="0"/>
-                <a:t>Communicate the same to user and request user to browse further</a:t>
+                <a:t>Request </a:t>
+              </a:r>
+              <a:r>
+                <a:rPr lang="en-US" sz="1200" dirty="0" smtClean="0"/>
+                <a:t>user to browse further</a:t>
               </a:r>
               <a:endParaRPr lang="en-IN" sz="1200" dirty="0"/>
             </a:p>
@@ -5208,7 +5223,7 @@
         </p:nvSpPr>
         <p:spPr>
           <a:xfrm>
-            <a:off x="5912462" y="3621995"/>
+            <a:off x="5485104" y="2834697"/>
             <a:ext cx="360040" cy="360040"/>
           </a:xfrm>
           <a:prstGeom prst="ellipse">
@@ -5250,7 +5265,7 @@
         </p:nvSpPr>
         <p:spPr>
           <a:xfrm>
-            <a:off x="8316416" y="3982035"/>
+            <a:off x="6340978" y="3470521"/>
             <a:ext cx="360040" cy="360040"/>
           </a:xfrm>
           <a:prstGeom prst="ellipse">
@@ -5284,19 +5299,108 @@
           </a:p>
         </p:txBody>
       </p:sp>
+      <p:sp>
+        <p:nvSpPr>
+          <p:cNvPr id="183" name="Diamond 182"/>
+          <p:cNvSpPr/>
+          <p:nvPr/>
+        </p:nvSpPr>
+        <p:spPr>
+          <a:xfrm>
+            <a:off x="3923928" y="1979225"/>
+            <a:ext cx="2071604" cy="537990"/>
+          </a:xfrm>
+          <a:prstGeom prst="diamond">
+            <a:avLst/>
+          </a:prstGeom>
+        </p:spPr>
+        <p:style>
+          <a:lnRef idx="2">
+            <a:schemeClr val="accent6"/>
+          </a:lnRef>
+          <a:fillRef idx="1">
+            <a:schemeClr val="lt1"/>
+          </a:fillRef>
+          <a:effectRef idx="0">
+            <a:schemeClr val="accent6"/>
+          </a:effectRef>
+          <a:fontRef idx="minor">
+            <a:schemeClr val="dk1"/>
+          </a:fontRef>
+        </p:style>
+        <p:txBody>
+          <a:bodyPr rtlCol="0" anchor="ctr"/>
+          <a:lstStyle/>
+          <a:p>
+            <a:pPr algn="ctr"/>
+            <a:r>
+              <a:rPr lang="en-US" sz="1400" dirty="0" smtClean="0"/>
+              <a:t>accept</a:t>
+            </a:r>
+            <a:endParaRPr lang="en-IN" sz="1400" dirty="0"/>
+          </a:p>
+        </p:txBody>
+      </p:sp>
+      <p:sp>
+        <p:nvSpPr>
+          <p:cNvPr id="188" name="Rectangle 187"/>
+          <p:cNvSpPr/>
+          <p:nvPr/>
+        </p:nvSpPr>
+        <p:spPr>
+          <a:xfrm>
+            <a:off x="2051718" y="1979227"/>
+            <a:ext cx="1512168" cy="537988"/>
+          </a:xfrm>
+          <a:prstGeom prst="rect">
+            <a:avLst/>
+          </a:prstGeom>
+          <a:ln>
+            <a:solidFill>
+              <a:srgbClr val="FF0000"/>
+            </a:solidFill>
+          </a:ln>
+        </p:spPr>
+        <p:style>
+          <a:lnRef idx="2">
+            <a:schemeClr val="accent2"/>
+          </a:lnRef>
+          <a:fillRef idx="1">
+            <a:schemeClr val="lt1"/>
+          </a:fillRef>
+          <a:effectRef idx="0">
+            <a:schemeClr val="accent2"/>
+          </a:effectRef>
+          <a:fontRef idx="minor">
+            <a:schemeClr val="dk1"/>
+          </a:fontRef>
+        </p:style>
+        <p:txBody>
+          <a:bodyPr rtlCol="0" anchor="ctr"/>
+          <a:lstStyle/>
+          <a:p>
+            <a:pPr algn="ctr"/>
+            <a:r>
+              <a:rPr lang="en-US" sz="1200" dirty="0" smtClean="0"/>
+              <a:t>Divert the user to browse other Ads</a:t>
+            </a:r>
+            <a:endParaRPr lang="en-IN" dirty="0"/>
+          </a:p>
+        </p:txBody>
+      </p:sp>
       <p:cxnSp>
         <p:nvCxnSpPr>
-          <p:cNvPr id="1050" name="Straight Arrow Connector 1049"/>
+          <p:cNvPr id="1056" name="Straight Arrow Connector 1055"/>
           <p:cNvCxnSpPr>
-            <a:stCxn id="158" idx="0"/>
-            <a:endCxn id="1028" idx="2"/>
+            <a:stCxn id="183" idx="1"/>
+            <a:endCxn id="188" idx="3"/>
           </p:cNvCxnSpPr>
           <p:nvPr/>
         </p:nvCxnSpPr>
         <p:spPr>
-          <a:xfrm flipV="1">
-            <a:off x="5912462" y="2980934"/>
-            <a:ext cx="2861923" cy="1168146"/>
+          <a:xfrm flipH="1">
+            <a:off x="3563886" y="2248220"/>
+            <a:ext cx="360042" cy="1"/>
           </a:xfrm>
           <a:prstGeom prst="straightConnector1">
             <a:avLst/>
@@ -5322,138 +5426,13 @@
       </p:cxnSp>
       <p:sp>
         <p:nvSpPr>
-          <p:cNvPr id="183" name="Diamond 182"/>
-          <p:cNvSpPr/>
-          <p:nvPr/>
-        </p:nvSpPr>
-        <p:spPr>
-          <a:xfrm>
-            <a:off x="4876660" y="2325977"/>
-            <a:ext cx="2071604" cy="537990"/>
-          </a:xfrm>
-          <a:prstGeom prst="diamond">
-            <a:avLst/>
-          </a:prstGeom>
-        </p:spPr>
-        <p:style>
-          <a:lnRef idx="2">
-            <a:schemeClr val="accent6"/>
-          </a:lnRef>
-          <a:fillRef idx="1">
-            <a:schemeClr val="lt1"/>
-          </a:fillRef>
-          <a:effectRef idx="0">
-            <a:schemeClr val="accent6"/>
-          </a:effectRef>
-          <a:fontRef idx="minor">
-            <a:schemeClr val="dk1"/>
-          </a:fontRef>
-        </p:style>
-        <p:txBody>
-          <a:bodyPr rtlCol="0" anchor="ctr"/>
-          <a:lstStyle/>
-          <a:p>
-            <a:pPr algn="ctr"/>
-            <a:r>
-              <a:rPr lang="en-US" sz="1400" dirty="0" smtClean="0"/>
-              <a:t>accept</a:t>
-            </a:r>
-            <a:endParaRPr lang="en-IN" sz="1400" dirty="0"/>
-          </a:p>
-        </p:txBody>
-      </p:sp>
-      <p:sp>
-        <p:nvSpPr>
-          <p:cNvPr id="188" name="Rectangle 187"/>
-          <p:cNvSpPr/>
-          <p:nvPr/>
-        </p:nvSpPr>
-        <p:spPr>
-          <a:xfrm>
-            <a:off x="2555776" y="2325979"/>
-            <a:ext cx="1512168" cy="537988"/>
-          </a:xfrm>
-          <a:prstGeom prst="rect">
-            <a:avLst/>
-          </a:prstGeom>
-          <a:ln>
-            <a:solidFill>
-              <a:srgbClr val="FF0000"/>
-            </a:solidFill>
-          </a:ln>
-        </p:spPr>
-        <p:style>
-          <a:lnRef idx="2">
-            <a:schemeClr val="accent2"/>
-          </a:lnRef>
-          <a:fillRef idx="1">
-            <a:schemeClr val="lt1"/>
-          </a:fillRef>
-          <a:effectRef idx="0">
-            <a:schemeClr val="accent2"/>
-          </a:effectRef>
-          <a:fontRef idx="minor">
-            <a:schemeClr val="dk1"/>
-          </a:fontRef>
-        </p:style>
-        <p:txBody>
-          <a:bodyPr rtlCol="0" anchor="ctr"/>
-          <a:lstStyle/>
-          <a:p>
-            <a:pPr algn="ctr"/>
-            <a:r>
-              <a:rPr lang="en-US" sz="1200" dirty="0" smtClean="0"/>
-              <a:t>Divert the user to browse other Ads</a:t>
-            </a:r>
-            <a:endParaRPr lang="en-IN" dirty="0"/>
-          </a:p>
-        </p:txBody>
-      </p:sp>
-      <p:cxnSp>
-        <p:nvCxnSpPr>
-          <p:cNvPr id="1056" name="Straight Arrow Connector 1055"/>
-          <p:cNvCxnSpPr>
-            <a:stCxn id="183" idx="1"/>
-            <a:endCxn id="188" idx="3"/>
-          </p:cNvCxnSpPr>
-          <p:nvPr/>
-        </p:nvCxnSpPr>
-        <p:spPr>
-          <a:xfrm flipH="1">
-            <a:off x="4067944" y="2594972"/>
-            <a:ext cx="808716" cy="1"/>
-          </a:xfrm>
-          <a:prstGeom prst="straightConnector1">
-            <a:avLst/>
-          </a:prstGeom>
-          <a:ln>
-            <a:tailEnd type="arrow"/>
-          </a:ln>
-        </p:spPr>
-        <p:style>
-          <a:lnRef idx="1">
-            <a:schemeClr val="accent1"/>
-          </a:lnRef>
-          <a:fillRef idx="0">
-            <a:schemeClr val="accent1"/>
-          </a:fillRef>
-          <a:effectRef idx="0">
-            <a:schemeClr val="accent1"/>
-          </a:effectRef>
-          <a:fontRef idx="minor">
-            <a:schemeClr val="tx1"/>
-          </a:fontRef>
-        </p:style>
-      </p:cxnSp>
-      <p:sp>
-        <p:nvSpPr>
           <p:cNvPr id="191" name="TextBox 190"/>
           <p:cNvSpPr txBox="1"/>
           <p:nvPr/>
         </p:nvSpPr>
         <p:spPr>
           <a:xfrm>
-            <a:off x="4323834" y="2359914"/>
+            <a:off x="3675762" y="1988840"/>
             <a:ext cx="464190" cy="276998"/>
           </a:xfrm>
           <a:prstGeom prst="rect">
@@ -5483,7 +5462,7 @@
         </p:nvSpPr>
         <p:spPr>
           <a:xfrm>
-            <a:off x="5868144" y="1891862"/>
+            <a:off x="5004048" y="1495818"/>
             <a:ext cx="464190" cy="276998"/>
           </a:xfrm>
           <a:prstGeom prst="rect">
@@ -5515,7 +5494,7 @@
         </p:nvCxnSpPr>
         <p:spPr>
           <a:xfrm rot="16200000" flipH="1">
-            <a:off x="7147268" y="1091170"/>
+            <a:off x="6194536" y="744418"/>
             <a:ext cx="6351" cy="2475964"/>
           </a:xfrm>
           <a:prstGeom prst="bentConnector4">
@@ -5547,14 +5526,13 @@
         <p:nvCxnSpPr>
           <p:cNvPr id="1071" name="Straight Arrow Connector 1070"/>
           <p:cNvCxnSpPr>
-            <a:stCxn id="1028" idx="1"/>
             <a:endCxn id="183" idx="3"/>
           </p:cNvCxnSpPr>
           <p:nvPr/>
         </p:nvCxnSpPr>
         <p:spPr>
           <a:xfrm flipH="1" flipV="1">
-            <a:off x="6948264" y="2594972"/>
+            <a:off x="5995532" y="2248220"/>
             <a:ext cx="1440160" cy="1"/>
           </a:xfrm>
           <a:prstGeom prst="straightConnector1">
@@ -5587,7 +5565,7 @@
         </p:nvGrpSpPr>
         <p:grpSpPr>
           <a:xfrm>
-            <a:off x="5920680" y="1222344"/>
+            <a:off x="5056584" y="1173052"/>
             <a:ext cx="1944216" cy="276999"/>
             <a:chOff x="395536" y="574080"/>
             <a:chExt cx="1944216" cy="276999"/>
@@ -5658,7 +5636,11 @@
             <a:p>
               <a:r>
                 <a:rPr lang="en-US" sz="1200" dirty="0" smtClean="0"/>
-                <a:t>Payment request mail</a:t>
+                <a:t>Payment </a:t>
+              </a:r>
+              <a:r>
+                <a:rPr lang="en-US" sz="1200" dirty="0" smtClean="0"/>
+                <a:t>request</a:t>
               </a:r>
               <a:endParaRPr lang="en-IN" sz="1200" dirty="0"/>
             </a:p>
@@ -5673,7 +5655,7 @@
         </p:nvSpPr>
         <p:spPr>
           <a:xfrm>
-            <a:off x="2522717" y="1255472"/>
+            <a:off x="2018659" y="908720"/>
             <a:ext cx="1512168" cy="537988"/>
           </a:xfrm>
           <a:prstGeom prst="rect">
@@ -5706,7 +5688,11 @@
             <a:pPr algn="ctr"/>
             <a:r>
               <a:rPr lang="en-US" sz="1200" dirty="0" smtClean="0"/>
-              <a:t>Block the calendar for particular place</a:t>
+              <a:t>Block the calendar for particular </a:t>
+            </a:r>
+            <a:r>
+              <a:rPr lang="en-US" sz="1200" dirty="0" smtClean="0"/>
+              <a:t>place for 1Hr</a:t>
             </a:r>
             <a:endParaRPr lang="en-IN" dirty="0"/>
           </a:p>
@@ -5723,10 +5709,2738 @@
         </p:nvCxnSpPr>
         <p:spPr>
           <a:xfrm rot="16200000" flipV="1">
-            <a:off x="4572919" y="986433"/>
+            <a:off x="3844524" y="864018"/>
+            <a:ext cx="801511" cy="1428903"/>
+          </a:xfrm>
+          <a:prstGeom prst="bentConnector2">
+            <a:avLst/>
+          </a:prstGeom>
+          <a:ln>
+            <a:tailEnd type="arrow"/>
+          </a:ln>
+        </p:spPr>
+        <p:style>
+          <a:lnRef idx="1">
+            <a:schemeClr val="accent1"/>
+          </a:lnRef>
+          <a:fillRef idx="0">
+            <a:schemeClr val="accent1"/>
+          </a:fillRef>
+          <a:effectRef idx="0">
+            <a:schemeClr val="accent1"/>
+          </a:effectRef>
+          <a:fontRef idx="minor">
+            <a:schemeClr val="tx1"/>
+          </a:fontRef>
+        </p:style>
+      </p:cxnSp>
+      <p:pic>
+        <p:nvPicPr>
+          <p:cNvPr id="67" name="Picture 2" descr="D:\MyWorkSpace\xampp\htdocs\bmhs\assets\img\bmhs\icons\icon-home-stay.png"/>
+          <p:cNvPicPr>
+            <a:picLocks noChangeAspect="1" noChangeArrowheads="1"/>
+          </p:cNvPicPr>
+          <p:nvPr/>
+        </p:nvPicPr>
+        <p:blipFill>
+          <a:blip r:embed="rId8" cstate="print">
+            <a:extLst>
+              <a:ext uri="{28A0092B-C50C-407E-A947-70E740481C1C}">
+                <a14:useLocalDpi xmlns:a14="http://schemas.microsoft.com/office/drawing/2010/main" val="0"/>
+              </a:ext>
+            </a:extLst>
+          </a:blip>
+          <a:srcRect/>
+          <a:stretch>
+            <a:fillRect/>
+          </a:stretch>
+        </p:blipFill>
+        <p:spPr bwMode="auto">
+          <a:xfrm>
+            <a:off x="5652120" y="6055144"/>
+            <a:ext cx="655240" cy="655240"/>
+          </a:xfrm>
+          <a:prstGeom prst="rect">
+            <a:avLst/>
+          </a:prstGeom>
+          <a:noFill/>
+          <a:extLst>
+            <a:ext uri="{909E8E84-426E-40DD-AFC4-6F175D3DCCD1}">
+              <a14:hiddenFill xmlns:a14="http://schemas.microsoft.com/office/drawing/2010/main">
+                <a:solidFill>
+                  <a:srgbClr val="FFFFFF"/>
+                </a:solidFill>
+              </a14:hiddenFill>
+            </a:ext>
+          </a:extLst>
+        </p:spPr>
+      </p:pic>
+      <p:sp>
+        <p:nvSpPr>
+          <p:cNvPr id="68" name="Diamond 67"/>
+          <p:cNvSpPr/>
+          <p:nvPr/>
+        </p:nvSpPr>
+        <p:spPr>
+          <a:xfrm>
+            <a:off x="6795476" y="4481995"/>
+            <a:ext cx="2071604" cy="537990"/>
+          </a:xfrm>
+          <a:prstGeom prst="diamond">
+            <a:avLst/>
+          </a:prstGeom>
+        </p:spPr>
+        <p:style>
+          <a:lnRef idx="2">
+            <a:schemeClr val="accent6"/>
+          </a:lnRef>
+          <a:fillRef idx="1">
+            <a:schemeClr val="lt1"/>
+          </a:fillRef>
+          <a:effectRef idx="0">
+            <a:schemeClr val="accent6"/>
+          </a:effectRef>
+          <a:fontRef idx="minor">
+            <a:schemeClr val="dk1"/>
+          </a:fontRef>
+        </p:style>
+        <p:txBody>
+          <a:bodyPr rtlCol="0" anchor="ctr"/>
+          <a:lstStyle/>
+          <a:p>
+            <a:pPr algn="ctr"/>
+            <a:r>
+              <a:rPr lang="en-US" sz="1400" dirty="0" smtClean="0"/>
+              <a:t>successful</a:t>
+            </a:r>
+            <a:endParaRPr lang="en-IN" sz="1400" dirty="0"/>
+          </a:p>
+        </p:txBody>
+      </p:sp>
+      <p:cxnSp>
+        <p:nvCxnSpPr>
+          <p:cNvPr id="69" name="Straight Arrow Connector 68"/>
+          <p:cNvCxnSpPr/>
+          <p:nvPr/>
+        </p:nvCxnSpPr>
+        <p:spPr>
+          <a:xfrm>
+            <a:off x="7828889" y="2980934"/>
+            <a:ext cx="2389" cy="1467677"/>
+          </a:xfrm>
+          <a:prstGeom prst="straightConnector1">
+            <a:avLst/>
+          </a:prstGeom>
+          <a:ln>
+            <a:tailEnd type="arrow"/>
+          </a:ln>
+        </p:spPr>
+        <p:style>
+          <a:lnRef idx="1">
+            <a:schemeClr val="accent1"/>
+          </a:lnRef>
+          <a:fillRef idx="0">
+            <a:schemeClr val="accent1"/>
+          </a:fillRef>
+          <a:effectRef idx="0">
+            <a:schemeClr val="accent1"/>
+          </a:effectRef>
+          <a:fontRef idx="minor">
+            <a:schemeClr val="tx1"/>
+          </a:fontRef>
+        </p:style>
+      </p:cxnSp>
+      <p:sp>
+        <p:nvSpPr>
+          <p:cNvPr id="70" name="TextBox 69"/>
+          <p:cNvSpPr txBox="1"/>
+          <p:nvPr/>
+        </p:nvSpPr>
+        <p:spPr>
+          <a:xfrm>
+            <a:off x="7452320" y="3512041"/>
+            <a:ext cx="932850" cy="276999"/>
+          </a:xfrm>
+          <a:prstGeom prst="rect">
+            <a:avLst/>
+          </a:prstGeom>
+          <a:noFill/>
+        </p:spPr>
+        <p:txBody>
+          <a:bodyPr wrap="square" rtlCol="0">
+            <a:spAutoFit/>
+          </a:bodyPr>
+          <a:lstStyle/>
+          <a:p>
+            <a:r>
+              <a:rPr lang="en-US" sz="1200" dirty="0" smtClean="0"/>
+              <a:t>payment</a:t>
+            </a:r>
+            <a:endParaRPr lang="en-IN" sz="1200" dirty="0"/>
+          </a:p>
+        </p:txBody>
+      </p:sp>
+      <p:grpSp>
+        <p:nvGrpSpPr>
+          <p:cNvPr id="71" name="Group 70"/>
+          <p:cNvGrpSpPr/>
+          <p:nvPr/>
+        </p:nvGrpSpPr>
+        <p:grpSpPr>
+          <a:xfrm>
+            <a:off x="7622257" y="5288191"/>
+            <a:ext cx="1944216" cy="461665"/>
+            <a:chOff x="395536" y="574080"/>
+            <a:chExt cx="1944216" cy="461665"/>
+          </a:xfrm>
+        </p:grpSpPr>
+        <p:pic>
+          <p:nvPicPr>
+            <p:cNvPr id="72" name="Picture 5" descr="D:\MyWorkSpace\xampp\htdocs\bmhs\assets\img\bmhs\icons\email.png"/>
+            <p:cNvPicPr>
+              <a:picLocks noChangeAspect="1" noChangeArrowheads="1"/>
+            </p:cNvPicPr>
+            <p:nvPr/>
+          </p:nvPicPr>
+          <p:blipFill>
+            <a:blip r:embed="rId5" cstate="print">
+              <a:extLst>
+                <a:ext uri="{28A0092B-C50C-407E-A947-70E740481C1C}">
+                  <a14:useLocalDpi xmlns:a14="http://schemas.microsoft.com/office/drawing/2010/main" val="0"/>
+                </a:ext>
+              </a:extLst>
+            </a:blip>
+            <a:srcRect/>
+            <a:stretch>
+              <a:fillRect/>
+            </a:stretch>
+          </p:blipFill>
+          <p:spPr bwMode="auto">
+            <a:xfrm>
+              <a:off x="395536" y="620688"/>
+              <a:ext cx="248502" cy="177392"/>
+            </a:xfrm>
+            <a:prstGeom prst="rect">
+              <a:avLst/>
+            </a:prstGeom>
+            <a:noFill/>
+            <a:extLst>
+              <a:ext uri="{909E8E84-426E-40DD-AFC4-6F175D3DCCD1}">
+                <a14:hiddenFill xmlns:a14="http://schemas.microsoft.com/office/drawing/2010/main">
+                  <a:solidFill>
+                    <a:srgbClr val="FFFFFF"/>
+                  </a:solidFill>
+                </a14:hiddenFill>
+              </a:ext>
+            </a:extLst>
+          </p:spPr>
+        </p:pic>
+        <p:sp>
+          <p:nvSpPr>
+            <p:cNvPr id="73" name="TextBox 72"/>
+            <p:cNvSpPr txBox="1"/>
+            <p:nvPr/>
+          </p:nvSpPr>
+          <p:spPr>
+            <a:xfrm>
+              <a:off x="611560" y="574080"/>
+              <a:ext cx="1728192" cy="461665"/>
+            </a:xfrm>
+            <a:prstGeom prst="rect">
+              <a:avLst/>
+            </a:prstGeom>
+            <a:noFill/>
+          </p:spPr>
+          <p:txBody>
+            <a:bodyPr wrap="square" rtlCol="0">
+              <a:spAutoFit/>
+            </a:bodyPr>
+            <a:lstStyle/>
+            <a:p>
+              <a:r>
+                <a:rPr lang="en-US" sz="1200" dirty="0" smtClean="0"/>
+                <a:t>Payment </a:t>
+              </a:r>
+              <a:endParaRPr lang="en-US" sz="1200" dirty="0" smtClean="0"/>
+            </a:p>
+            <a:p>
+              <a:r>
+                <a:rPr lang="en-US" sz="1200" dirty="0" smtClean="0"/>
+                <a:t>confirmation</a:t>
+              </a:r>
+              <a:endParaRPr lang="en-IN" sz="1200" dirty="0"/>
+            </a:p>
+          </p:txBody>
+        </p:sp>
+      </p:grpSp>
+      <p:cxnSp>
+        <p:nvCxnSpPr>
+          <p:cNvPr id="74" name="Elbow Connector 73"/>
+          <p:cNvCxnSpPr>
+            <a:stCxn id="68" idx="2"/>
+            <a:endCxn id="1028" idx="3"/>
+          </p:cNvCxnSpPr>
+          <p:nvPr/>
+        </p:nvCxnSpPr>
+        <p:spPr>
+          <a:xfrm rot="5400000" flipH="1" flipV="1">
+            <a:off x="6707242" y="3719009"/>
+            <a:ext cx="2425012" cy="176940"/>
+          </a:xfrm>
+          <a:prstGeom prst="bentConnector4">
+            <a:avLst>
+              <a:gd name="adj1" fmla="val -9427"/>
+              <a:gd name="adj2" fmla="val 599753"/>
+            </a:avLst>
+          </a:prstGeom>
+          <a:ln>
+            <a:tailEnd type="arrow"/>
+          </a:ln>
+        </p:spPr>
+        <p:style>
+          <a:lnRef idx="1">
+            <a:schemeClr val="accent1"/>
+          </a:lnRef>
+          <a:fillRef idx="0">
+            <a:schemeClr val="accent1"/>
+          </a:fillRef>
+          <a:effectRef idx="0">
+            <a:schemeClr val="accent1"/>
+          </a:effectRef>
+          <a:fontRef idx="minor">
+            <a:schemeClr val="tx1"/>
+          </a:fontRef>
+        </p:style>
+      </p:cxnSp>
+      <p:cxnSp>
+        <p:nvCxnSpPr>
+          <p:cNvPr id="75" name="Elbow Connector 74"/>
+          <p:cNvCxnSpPr>
+            <a:stCxn id="68" idx="1"/>
+            <a:endCxn id="67" idx="1"/>
+          </p:cNvCxnSpPr>
+          <p:nvPr/>
+        </p:nvCxnSpPr>
+        <p:spPr>
+          <a:xfrm rot="10800000" flipV="1">
+            <a:off x="5652120" y="4750990"/>
+            <a:ext cx="1143356" cy="1631774"/>
+          </a:xfrm>
+          <a:prstGeom prst="bentConnector3">
+            <a:avLst>
+              <a:gd name="adj1" fmla="val 119994"/>
+            </a:avLst>
+          </a:prstGeom>
+          <a:ln>
+            <a:tailEnd type="arrow"/>
+          </a:ln>
+        </p:spPr>
+        <p:style>
+          <a:lnRef idx="1">
+            <a:schemeClr val="accent1"/>
+          </a:lnRef>
+          <a:fillRef idx="0">
+            <a:schemeClr val="accent1"/>
+          </a:fillRef>
+          <a:effectRef idx="0">
+            <a:schemeClr val="accent1"/>
+          </a:effectRef>
+          <a:fontRef idx="minor">
+            <a:schemeClr val="tx1"/>
+          </a:fontRef>
+        </p:style>
+      </p:cxnSp>
+      <p:sp>
+        <p:nvSpPr>
+          <p:cNvPr id="76" name="TextBox 75"/>
+          <p:cNvSpPr txBox="1"/>
+          <p:nvPr/>
+        </p:nvSpPr>
+        <p:spPr>
+          <a:xfrm>
+            <a:off x="7452320" y="5011193"/>
+            <a:ext cx="464190" cy="276998"/>
+          </a:xfrm>
+          <a:prstGeom prst="rect">
+            <a:avLst/>
+          </a:prstGeom>
+          <a:noFill/>
+        </p:spPr>
+        <p:txBody>
+          <a:bodyPr wrap="square" rtlCol="0">
+            <a:spAutoFit/>
+          </a:bodyPr>
+          <a:lstStyle/>
+          <a:p>
+            <a:r>
+              <a:rPr lang="en-US" sz="1200" dirty="0" smtClean="0"/>
+              <a:t>Yes</a:t>
+            </a:r>
+            <a:endParaRPr lang="en-IN" sz="1200" dirty="0"/>
+          </a:p>
+        </p:txBody>
+      </p:sp>
+      <p:sp>
+        <p:nvSpPr>
+          <p:cNvPr id="77" name="TextBox 76"/>
+          <p:cNvSpPr txBox="1"/>
+          <p:nvPr/>
+        </p:nvSpPr>
+        <p:spPr>
+          <a:xfrm>
+            <a:off x="6084168" y="4532537"/>
+            <a:ext cx="464190" cy="276998"/>
+          </a:xfrm>
+          <a:prstGeom prst="rect">
+            <a:avLst/>
+          </a:prstGeom>
+          <a:noFill/>
+        </p:spPr>
+        <p:txBody>
+          <a:bodyPr wrap="square" rtlCol="0">
+            <a:spAutoFit/>
+          </a:bodyPr>
+          <a:lstStyle/>
+          <a:p>
+            <a:r>
+              <a:rPr lang="en-US" sz="1200" dirty="0" smtClean="0"/>
+              <a:t>Yes</a:t>
+            </a:r>
+            <a:endParaRPr lang="en-IN" sz="1200" dirty="0"/>
+          </a:p>
+        </p:txBody>
+      </p:sp>
+      <p:sp>
+        <p:nvSpPr>
+          <p:cNvPr id="78" name="Rectangle 77"/>
+          <p:cNvSpPr/>
+          <p:nvPr/>
+        </p:nvSpPr>
+        <p:spPr>
+          <a:xfrm>
+            <a:off x="7380312" y="6113771"/>
+            <a:ext cx="1512168" cy="537988"/>
+          </a:xfrm>
+          <a:prstGeom prst="rect">
+            <a:avLst/>
+          </a:prstGeom>
+          <a:ln>
+            <a:solidFill>
+              <a:srgbClr val="FF0000"/>
+            </a:solidFill>
+          </a:ln>
+        </p:spPr>
+        <p:style>
+          <a:lnRef idx="2">
+            <a:schemeClr val="accent2"/>
+          </a:lnRef>
+          <a:fillRef idx="1">
+            <a:schemeClr val="lt1"/>
+          </a:fillRef>
+          <a:effectRef idx="0">
+            <a:schemeClr val="accent2"/>
+          </a:effectRef>
+          <a:fontRef idx="minor">
+            <a:schemeClr val="dk1"/>
+          </a:fontRef>
+        </p:style>
+        <p:txBody>
+          <a:bodyPr rtlCol="0" anchor="ctr"/>
+          <a:lstStyle/>
+          <a:p>
+            <a:pPr algn="ctr"/>
+            <a:r>
+              <a:rPr lang="en-US" sz="1200" dirty="0" smtClean="0"/>
+              <a:t>Block the calendar </a:t>
+            </a:r>
+            <a:r>
+              <a:rPr lang="en-US" sz="1200" dirty="0" smtClean="0"/>
+              <a:t>of </a:t>
+            </a:r>
+            <a:r>
+              <a:rPr lang="en-US" sz="1200" dirty="0" smtClean="0"/>
+              <a:t>particular </a:t>
+            </a:r>
+            <a:r>
+              <a:rPr lang="en-US" sz="1200" dirty="0" smtClean="0"/>
+              <a:t>place permanently</a:t>
+            </a:r>
+            <a:endParaRPr lang="en-IN" dirty="0"/>
+          </a:p>
+        </p:txBody>
+      </p:sp>
+      <p:cxnSp>
+        <p:nvCxnSpPr>
+          <p:cNvPr id="79" name="Elbow Connector 78"/>
+          <p:cNvCxnSpPr>
+            <a:stCxn id="67" idx="3"/>
+            <a:endCxn id="78" idx="1"/>
+          </p:cNvCxnSpPr>
+          <p:nvPr/>
+        </p:nvCxnSpPr>
+        <p:spPr>
+          <a:xfrm>
+            <a:off x="6307360" y="6382764"/>
+            <a:ext cx="1072952" cy="1"/>
+          </a:xfrm>
+          <a:prstGeom prst="bentConnector3">
+            <a:avLst/>
+          </a:prstGeom>
+          <a:ln>
+            <a:tailEnd type="arrow"/>
+          </a:ln>
+        </p:spPr>
+        <p:style>
+          <a:lnRef idx="1">
+            <a:schemeClr val="accent1"/>
+          </a:lnRef>
+          <a:fillRef idx="0">
+            <a:schemeClr val="accent1"/>
+          </a:fillRef>
+          <a:effectRef idx="0">
+            <a:schemeClr val="accent1"/>
+          </a:effectRef>
+          <a:fontRef idx="minor">
+            <a:schemeClr val="tx1"/>
+          </a:fontRef>
+        </p:style>
+      </p:cxnSp>
+      <p:cxnSp>
+        <p:nvCxnSpPr>
+          <p:cNvPr id="13" name="Elbow Connector 12"/>
+          <p:cNvCxnSpPr>
+            <a:stCxn id="158" idx="0"/>
+            <a:endCxn id="1028" idx="2"/>
+          </p:cNvCxnSpPr>
+          <p:nvPr/>
+        </p:nvCxnSpPr>
+        <p:spPr>
+          <a:xfrm rot="5400000" flipH="1" flipV="1">
+            <a:off x="6209796" y="1730867"/>
+            <a:ext cx="162394" cy="2662528"/>
+          </a:xfrm>
+          <a:prstGeom prst="bentConnector3">
+            <a:avLst/>
+          </a:prstGeom>
+          <a:ln>
+            <a:tailEnd type="arrow"/>
+          </a:ln>
+        </p:spPr>
+        <p:style>
+          <a:lnRef idx="1">
+            <a:schemeClr val="accent1"/>
+          </a:lnRef>
+          <a:fillRef idx="0">
+            <a:schemeClr val="accent1"/>
+          </a:fillRef>
+          <a:effectRef idx="0">
+            <a:schemeClr val="accent1"/>
+          </a:effectRef>
+          <a:fontRef idx="minor">
+            <a:schemeClr val="tx1"/>
+          </a:fontRef>
+        </p:style>
+      </p:cxnSp>
+      <p:grpSp>
+        <p:nvGrpSpPr>
+          <p:cNvPr id="92" name="Group 91"/>
+          <p:cNvGrpSpPr/>
+          <p:nvPr/>
+        </p:nvGrpSpPr>
+        <p:grpSpPr>
+          <a:xfrm>
+            <a:off x="7346404" y="514871"/>
+            <a:ext cx="1944216" cy="461665"/>
+            <a:chOff x="395536" y="574080"/>
+            <a:chExt cx="1944216" cy="461665"/>
+          </a:xfrm>
+        </p:grpSpPr>
+        <p:pic>
+          <p:nvPicPr>
+            <p:cNvPr id="93" name="Picture 5" descr="D:\MyWorkSpace\xampp\htdocs\bmhs\assets\img\bmhs\icons\email.png"/>
+            <p:cNvPicPr>
+              <a:picLocks noChangeAspect="1" noChangeArrowheads="1"/>
+            </p:cNvPicPr>
+            <p:nvPr/>
+          </p:nvPicPr>
+          <p:blipFill>
+            <a:blip r:embed="rId5" cstate="print">
+              <a:extLst>
+                <a:ext uri="{28A0092B-C50C-407E-A947-70E740481C1C}">
+                  <a14:useLocalDpi xmlns:a14="http://schemas.microsoft.com/office/drawing/2010/main" val="0"/>
+                </a:ext>
+              </a:extLst>
+            </a:blip>
+            <a:srcRect/>
+            <a:stretch>
+              <a:fillRect/>
+            </a:stretch>
+          </p:blipFill>
+          <p:spPr bwMode="auto">
+            <a:xfrm>
+              <a:off x="395536" y="620688"/>
+              <a:ext cx="248502" cy="177392"/>
+            </a:xfrm>
+            <a:prstGeom prst="rect">
+              <a:avLst/>
+            </a:prstGeom>
+            <a:noFill/>
+            <a:extLst>
+              <a:ext uri="{909E8E84-426E-40DD-AFC4-6F175D3DCCD1}">
+                <a14:hiddenFill xmlns:a14="http://schemas.microsoft.com/office/drawing/2010/main">
+                  <a:solidFill>
+                    <a:srgbClr val="FFFFFF"/>
+                  </a:solidFill>
+                </a14:hiddenFill>
+              </a:ext>
+            </a:extLst>
+          </p:spPr>
+        </p:pic>
+        <p:sp>
+          <p:nvSpPr>
+            <p:cNvPr id="94" name="TextBox 93"/>
+            <p:cNvSpPr txBox="1"/>
+            <p:nvPr/>
+          </p:nvSpPr>
+          <p:spPr>
+            <a:xfrm>
+              <a:off x="611560" y="574080"/>
+              <a:ext cx="1728192" cy="461665"/>
+            </a:xfrm>
+            <a:prstGeom prst="rect">
+              <a:avLst/>
+            </a:prstGeom>
+            <a:noFill/>
+          </p:spPr>
+          <p:txBody>
+            <a:bodyPr wrap="square" rtlCol="0">
+              <a:spAutoFit/>
+            </a:bodyPr>
+            <a:lstStyle/>
+            <a:p>
+              <a:r>
+                <a:rPr lang="en-US" sz="1200" dirty="0" smtClean="0"/>
+                <a:t>Booking  </a:t>
+              </a:r>
+              <a:r>
+                <a:rPr lang="en-US" sz="1200" dirty="0" smtClean="0"/>
+                <a:t>enquiry</a:t>
+              </a:r>
+            </a:p>
+            <a:p>
+              <a:r>
+                <a:rPr lang="en-US" sz="1200" dirty="0" smtClean="0"/>
+                <a:t>acknowledgment</a:t>
+              </a:r>
+              <a:endParaRPr lang="en-IN" sz="1200" dirty="0"/>
+            </a:p>
+          </p:txBody>
+        </p:sp>
+      </p:grpSp>
+    </p:spTree>
+    <p:extLst>
+      <p:ext uri="{BB962C8B-B14F-4D97-AF65-F5344CB8AC3E}">
+        <p14:creationId xmlns:p14="http://schemas.microsoft.com/office/powerpoint/2010/main" val="3038813677"/>
+      </p:ext>
+    </p:extLst>
+  </p:cSld>
+  <p:clrMapOvr>
+    <a:masterClrMapping/>
+  </p:clrMapOvr>
+  <p:timing>
+    <p:tnLst>
+      <p:par>
+        <p:cTn id="1" dur="indefinite" restart="never" nodeType="tmRoot"/>
+      </p:par>
+    </p:tnLst>
+  </p:timing>
+</p:sld>
+</file>
+
+<file path=ppt/slides/slide2.xml><?xml version="1.0" encoding="utf-8"?>
+<p:sld xmlns:a="http://schemas.openxmlformats.org/drawingml/2006/main" xmlns:r="http://schemas.openxmlformats.org/officeDocument/2006/relationships" xmlns:p="http://schemas.openxmlformats.org/presentationml/2006/main">
+  <p:cSld>
+    <p:spTree>
+      <p:nvGrpSpPr>
+        <p:cNvPr id="1" name=""/>
+        <p:cNvGrpSpPr/>
+        <p:nvPr/>
+      </p:nvGrpSpPr>
+      <p:grpSpPr>
+        <a:xfrm>
+          <a:off x="0" y="0"/>
+          <a:ext cx="0" cy="0"/>
+          <a:chOff x="0" y="0"/>
+          <a:chExt cx="0" cy="0"/>
+        </a:xfrm>
+      </p:grpSpPr>
+      <p:grpSp>
+        <p:nvGrpSpPr>
+          <p:cNvPr id="6" name="Group 5"/>
+          <p:cNvGrpSpPr/>
+          <p:nvPr/>
+        </p:nvGrpSpPr>
+        <p:grpSpPr>
+          <a:xfrm>
+            <a:off x="0" y="24880"/>
+            <a:ext cx="9144000" cy="307777"/>
+            <a:chOff x="0" y="24880"/>
+            <a:chExt cx="9144000" cy="307777"/>
+          </a:xfrm>
+        </p:grpSpPr>
+        <p:cxnSp>
+          <p:nvCxnSpPr>
+            <p:cNvPr id="3" name="Straight Connector 2"/>
+            <p:cNvCxnSpPr/>
+            <p:nvPr/>
+          </p:nvCxnSpPr>
+          <p:spPr>
+            <a:xfrm>
+              <a:off x="0" y="332656"/>
+              <a:ext cx="9144000" cy="0"/>
+            </a:xfrm>
+            <a:prstGeom prst="line">
+              <a:avLst/>
+            </a:prstGeom>
+            <a:ln>
+              <a:solidFill>
+                <a:srgbClr val="FFC000"/>
+              </a:solidFill>
+            </a:ln>
+          </p:spPr>
+          <p:style>
+            <a:lnRef idx="1">
+              <a:schemeClr val="accent1"/>
+            </a:lnRef>
+            <a:fillRef idx="0">
+              <a:schemeClr val="accent1"/>
+            </a:fillRef>
+            <a:effectRef idx="0">
+              <a:schemeClr val="accent1"/>
+            </a:effectRef>
+            <a:fontRef idx="minor">
+              <a:schemeClr val="tx1"/>
+            </a:fontRef>
+          </p:style>
+        </p:cxnSp>
+        <p:sp>
+          <p:nvSpPr>
+            <p:cNvPr id="5" name="TextBox 4"/>
+            <p:cNvSpPr txBox="1"/>
+            <p:nvPr/>
+          </p:nvSpPr>
+          <p:spPr>
+            <a:xfrm>
+              <a:off x="35496" y="24880"/>
+              <a:ext cx="7704856" cy="307777"/>
+            </a:xfrm>
+            <a:prstGeom prst="rect">
+              <a:avLst/>
+            </a:prstGeom>
+            <a:noFill/>
+          </p:spPr>
+          <p:txBody>
+            <a:bodyPr wrap="square" rtlCol="0">
+              <a:spAutoFit/>
+            </a:bodyPr>
+            <a:lstStyle/>
+            <a:p>
+              <a:r>
+                <a:rPr lang="en-US" sz="1400" dirty="0" smtClean="0"/>
+                <a:t>Order processing: </a:t>
+              </a:r>
+              <a:r>
+                <a:rPr lang="en-US" sz="1400" dirty="0" smtClean="0"/>
+                <a:t>first </a:t>
+              </a:r>
+              <a:r>
+                <a:rPr lang="en-US" sz="1400" dirty="0" smtClean="0"/>
+                <a:t>preference: </a:t>
+              </a:r>
+              <a:r>
+                <a:rPr lang="en-US" sz="1400" dirty="0" smtClean="0"/>
+                <a:t>YES</a:t>
+              </a:r>
+              <a:endParaRPr lang="en-IN" sz="1400" dirty="0"/>
+            </a:p>
+          </p:txBody>
+        </p:sp>
+      </p:grpSp>
+      <p:pic>
+        <p:nvPicPr>
+          <p:cNvPr id="1026" name="Picture 2" descr="D:\MyWorkSpace\xampp\htdocs\bmhs\assets\img\bmhs\icons\cc-agent-image.png"/>
+          <p:cNvPicPr>
+            <a:picLocks noChangeAspect="1" noChangeArrowheads="1"/>
+          </p:cNvPicPr>
+          <p:nvPr/>
+        </p:nvPicPr>
+        <p:blipFill>
+          <a:blip r:embed="rId3" cstate="print">
+            <a:extLst>
+              <a:ext uri="{28A0092B-C50C-407E-A947-70E740481C1C}">
+                <a14:useLocalDpi xmlns:a14="http://schemas.microsoft.com/office/drawing/2010/main" val="0"/>
+              </a:ext>
+            </a:extLst>
+          </a:blip>
+          <a:srcRect/>
+          <a:stretch>
+            <a:fillRect/>
+          </a:stretch>
+        </p:blipFill>
+        <p:spPr bwMode="auto">
+          <a:xfrm>
+            <a:off x="35496" y="2325977"/>
+            <a:ext cx="606758" cy="537992"/>
+          </a:xfrm>
+          <a:prstGeom prst="rect">
+            <a:avLst/>
+          </a:prstGeom>
+          <a:noFill/>
+          <a:extLst>
+            <a:ext uri="{909E8E84-426E-40DD-AFC4-6F175D3DCCD1}">
+              <a14:hiddenFill xmlns:a14="http://schemas.microsoft.com/office/drawing/2010/main">
+                <a:solidFill>
+                  <a:srgbClr val="FFFFFF"/>
+                </a:solidFill>
+              </a14:hiddenFill>
+            </a:ext>
+          </a:extLst>
+        </p:spPr>
+      </p:pic>
+      <p:pic>
+        <p:nvPicPr>
+          <p:cNvPr id="1028" name="Picture 4" descr="D:\MyWorkSpace\xampp\htdocs\bmhs\assets\img\bmhs\icons\user.png"/>
+          <p:cNvPicPr>
+            <a:picLocks noChangeAspect="1" noChangeArrowheads="1"/>
+          </p:cNvPicPr>
+          <p:nvPr/>
+        </p:nvPicPr>
+        <p:blipFill>
+          <a:blip r:embed="rId4" cstate="print">
+            <a:extLst>
+              <a:ext uri="{28A0092B-C50C-407E-A947-70E740481C1C}">
+                <a14:useLocalDpi xmlns:a14="http://schemas.microsoft.com/office/drawing/2010/main" val="0"/>
+              </a:ext>
+            </a:extLst>
+          </a:blip>
+          <a:srcRect/>
+          <a:stretch>
+            <a:fillRect/>
+          </a:stretch>
+        </p:blipFill>
+        <p:spPr bwMode="auto">
+          <a:xfrm>
+            <a:off x="6765298" y="2209011"/>
+            <a:ext cx="1119069" cy="1119069"/>
+          </a:xfrm>
+          <a:prstGeom prst="rect">
+            <a:avLst/>
+          </a:prstGeom>
+          <a:noFill/>
+          <a:extLst>
+            <a:ext uri="{909E8E84-426E-40DD-AFC4-6F175D3DCCD1}">
+              <a14:hiddenFill xmlns:a14="http://schemas.microsoft.com/office/drawing/2010/main">
+                <a:solidFill>
+                  <a:srgbClr val="FFFFFF"/>
+                </a:solidFill>
+              </a14:hiddenFill>
+            </a:ext>
+          </a:extLst>
+        </p:spPr>
+      </p:pic>
+      <p:sp>
+        <p:nvSpPr>
+          <p:cNvPr id="7" name="Rectangle 6"/>
+          <p:cNvSpPr/>
+          <p:nvPr/>
+        </p:nvSpPr>
+        <p:spPr>
+          <a:xfrm>
+            <a:off x="4211960" y="404664"/>
+            <a:ext cx="792088" cy="216024"/>
+          </a:xfrm>
+          <a:prstGeom prst="rect">
+            <a:avLst/>
+          </a:prstGeom>
+          <a:ln>
+            <a:solidFill>
+              <a:srgbClr val="FF0000"/>
+            </a:solidFill>
+          </a:ln>
+        </p:spPr>
+        <p:style>
+          <a:lnRef idx="2">
+            <a:schemeClr val="accent2"/>
+          </a:lnRef>
+          <a:fillRef idx="1">
+            <a:schemeClr val="lt1"/>
+          </a:fillRef>
+          <a:effectRef idx="0">
+            <a:schemeClr val="accent2"/>
+          </a:effectRef>
+          <a:fontRef idx="minor">
+            <a:schemeClr val="dk1"/>
+          </a:fontRef>
+        </p:style>
+        <p:txBody>
+          <a:bodyPr rtlCol="0" anchor="ctr"/>
+          <a:lstStyle/>
+          <a:p>
+            <a:pPr algn="ctr"/>
+            <a:r>
+              <a:rPr lang="en-US" sz="1200" dirty="0" smtClean="0"/>
+              <a:t>Booking</a:t>
+            </a:r>
+            <a:endParaRPr lang="en-IN" dirty="0"/>
+          </a:p>
+        </p:txBody>
+      </p:sp>
+      <p:cxnSp>
+        <p:nvCxnSpPr>
+          <p:cNvPr id="9" name="Elbow Connector 8"/>
+          <p:cNvCxnSpPr>
+            <a:stCxn id="7" idx="1"/>
+            <a:endCxn id="1026" idx="0"/>
+          </p:cNvCxnSpPr>
+          <p:nvPr/>
+        </p:nvCxnSpPr>
+        <p:spPr>
+          <a:xfrm rot="10800000" flipV="1">
+            <a:off x="338876" y="512675"/>
+            <a:ext cx="3873085" cy="1813301"/>
+          </a:xfrm>
+          <a:prstGeom prst="bentConnector2">
+            <a:avLst/>
+          </a:prstGeom>
+          <a:ln>
+            <a:tailEnd type="arrow"/>
+          </a:ln>
+        </p:spPr>
+        <p:style>
+          <a:lnRef idx="1">
+            <a:schemeClr val="accent1"/>
+          </a:lnRef>
+          <a:fillRef idx="0">
+            <a:schemeClr val="accent1"/>
+          </a:fillRef>
+          <a:effectRef idx="0">
+            <a:schemeClr val="accent1"/>
+          </a:effectRef>
+          <a:fontRef idx="minor">
+            <a:schemeClr val="tx1"/>
+          </a:fontRef>
+        </p:style>
+      </p:cxnSp>
+      <p:cxnSp>
+        <p:nvCxnSpPr>
+          <p:cNvPr id="11" name="Elbow Connector 10"/>
+          <p:cNvCxnSpPr>
+            <a:stCxn id="7" idx="3"/>
+            <a:endCxn id="1028" idx="0"/>
+          </p:cNvCxnSpPr>
+          <p:nvPr/>
+        </p:nvCxnSpPr>
+        <p:spPr>
+          <a:xfrm>
+            <a:off x="5004048" y="512676"/>
+            <a:ext cx="2320785" cy="1696335"/>
+          </a:xfrm>
+          <a:prstGeom prst="bentConnector2">
+            <a:avLst/>
+          </a:prstGeom>
+          <a:ln>
+            <a:tailEnd type="arrow"/>
+          </a:ln>
+        </p:spPr>
+        <p:style>
+          <a:lnRef idx="1">
+            <a:schemeClr val="accent1"/>
+          </a:lnRef>
+          <a:fillRef idx="0">
+            <a:schemeClr val="accent1"/>
+          </a:fillRef>
+          <a:effectRef idx="0">
+            <a:schemeClr val="accent1"/>
+          </a:effectRef>
+          <a:fontRef idx="minor">
+            <a:schemeClr val="tx1"/>
+          </a:fontRef>
+        </p:style>
+      </p:cxnSp>
+      <p:grpSp>
+        <p:nvGrpSpPr>
+          <p:cNvPr id="14" name="Group 13"/>
+          <p:cNvGrpSpPr/>
+          <p:nvPr/>
+        </p:nvGrpSpPr>
+        <p:grpSpPr>
+          <a:xfrm>
+            <a:off x="69404" y="527472"/>
+            <a:ext cx="1416417" cy="276999"/>
+            <a:chOff x="395536" y="574080"/>
+            <a:chExt cx="1416417" cy="276999"/>
+          </a:xfrm>
+        </p:grpSpPr>
+        <p:pic>
+          <p:nvPicPr>
+            <p:cNvPr id="1029" name="Picture 5" descr="D:\MyWorkSpace\xampp\htdocs\bmhs\assets\img\bmhs\icons\email.png"/>
+            <p:cNvPicPr>
+              <a:picLocks noChangeAspect="1" noChangeArrowheads="1"/>
+            </p:cNvPicPr>
+            <p:nvPr/>
+          </p:nvPicPr>
+          <p:blipFill>
+            <a:blip r:embed="rId5" cstate="print">
+              <a:extLst>
+                <a:ext uri="{28A0092B-C50C-407E-A947-70E740481C1C}">
+                  <a14:useLocalDpi xmlns:a14="http://schemas.microsoft.com/office/drawing/2010/main" val="0"/>
+                </a:ext>
+              </a:extLst>
+            </a:blip>
+            <a:srcRect/>
+            <a:stretch>
+              <a:fillRect/>
+            </a:stretch>
+          </p:blipFill>
+          <p:spPr bwMode="auto">
+            <a:xfrm>
+              <a:off x="395536" y="620688"/>
+              <a:ext cx="248502" cy="177392"/>
+            </a:xfrm>
+            <a:prstGeom prst="rect">
+              <a:avLst/>
+            </a:prstGeom>
+            <a:noFill/>
+            <a:extLst>
+              <a:ext uri="{909E8E84-426E-40DD-AFC4-6F175D3DCCD1}">
+                <a14:hiddenFill xmlns:a14="http://schemas.microsoft.com/office/drawing/2010/main">
+                  <a:solidFill>
+                    <a:srgbClr val="FFFFFF"/>
+                  </a:solidFill>
+                </a14:hiddenFill>
+              </a:ext>
+            </a:extLst>
+          </p:spPr>
+        </p:pic>
+        <p:sp>
+          <p:nvSpPr>
+            <p:cNvPr id="12" name="TextBox 11"/>
+            <p:cNvSpPr txBox="1"/>
+            <p:nvPr/>
+          </p:nvSpPr>
+          <p:spPr>
+            <a:xfrm>
+              <a:off x="611560" y="574080"/>
+              <a:ext cx="1200393" cy="276999"/>
+            </a:xfrm>
+            <a:prstGeom prst="rect">
+              <a:avLst/>
+            </a:prstGeom>
+            <a:noFill/>
+          </p:spPr>
+          <p:txBody>
+            <a:bodyPr wrap="none" rtlCol="0">
+              <a:spAutoFit/>
+            </a:bodyPr>
+            <a:lstStyle/>
+            <a:p>
+              <a:r>
+                <a:rPr lang="en-US" sz="1200" dirty="0" smtClean="0"/>
+                <a:t>Booking request</a:t>
+              </a:r>
+              <a:endParaRPr lang="en-IN" sz="1200" dirty="0"/>
+            </a:p>
+          </p:txBody>
+        </p:sp>
+      </p:grpSp>
+      <p:grpSp>
+        <p:nvGrpSpPr>
+          <p:cNvPr id="20" name="Group 19"/>
+          <p:cNvGrpSpPr/>
+          <p:nvPr/>
+        </p:nvGrpSpPr>
+        <p:grpSpPr>
+          <a:xfrm>
+            <a:off x="7020272" y="514772"/>
+            <a:ext cx="1944216" cy="461665"/>
+            <a:chOff x="395536" y="574080"/>
+            <a:chExt cx="1944216" cy="461665"/>
+          </a:xfrm>
+        </p:grpSpPr>
+        <p:pic>
+          <p:nvPicPr>
+            <p:cNvPr id="21" name="Picture 5" descr="D:\MyWorkSpace\xampp\htdocs\bmhs\assets\img\bmhs\icons\email.png"/>
+            <p:cNvPicPr>
+              <a:picLocks noChangeAspect="1" noChangeArrowheads="1"/>
+            </p:cNvPicPr>
+            <p:nvPr/>
+          </p:nvPicPr>
+          <p:blipFill>
+            <a:blip r:embed="rId5" cstate="print">
+              <a:extLst>
+                <a:ext uri="{28A0092B-C50C-407E-A947-70E740481C1C}">
+                  <a14:useLocalDpi xmlns:a14="http://schemas.microsoft.com/office/drawing/2010/main" val="0"/>
+                </a:ext>
+              </a:extLst>
+            </a:blip>
+            <a:srcRect/>
+            <a:stretch>
+              <a:fillRect/>
+            </a:stretch>
+          </p:blipFill>
+          <p:spPr bwMode="auto">
+            <a:xfrm>
+              <a:off x="395536" y="620688"/>
+              <a:ext cx="248502" cy="177392"/>
+            </a:xfrm>
+            <a:prstGeom prst="rect">
+              <a:avLst/>
+            </a:prstGeom>
+            <a:noFill/>
+            <a:extLst>
+              <a:ext uri="{909E8E84-426E-40DD-AFC4-6F175D3DCCD1}">
+                <a14:hiddenFill xmlns:a14="http://schemas.microsoft.com/office/drawing/2010/main">
+                  <a:solidFill>
+                    <a:srgbClr val="FFFFFF"/>
+                  </a:solidFill>
+                </a14:hiddenFill>
+              </a:ext>
+            </a:extLst>
+          </p:spPr>
+        </p:pic>
+        <p:sp>
+          <p:nvSpPr>
+            <p:cNvPr id="22" name="TextBox 21"/>
+            <p:cNvSpPr txBox="1"/>
+            <p:nvPr/>
+          </p:nvSpPr>
+          <p:spPr>
+            <a:xfrm>
+              <a:off x="611560" y="574080"/>
+              <a:ext cx="1728192" cy="461665"/>
+            </a:xfrm>
+            <a:prstGeom prst="rect">
+              <a:avLst/>
+            </a:prstGeom>
+            <a:noFill/>
+          </p:spPr>
+          <p:txBody>
+            <a:bodyPr wrap="square" rtlCol="0">
+              <a:spAutoFit/>
+            </a:bodyPr>
+            <a:lstStyle/>
+            <a:p>
+              <a:r>
+                <a:rPr lang="en-US" sz="1200" dirty="0" smtClean="0"/>
+                <a:t>Booking  </a:t>
+              </a:r>
+              <a:r>
+                <a:rPr lang="en-US" sz="1200" dirty="0" smtClean="0"/>
+                <a:t>enquiry</a:t>
+              </a:r>
+            </a:p>
+            <a:p>
+              <a:r>
+                <a:rPr lang="en-US" sz="1200" dirty="0" smtClean="0"/>
+                <a:t>acknowledgment</a:t>
+              </a:r>
+              <a:endParaRPr lang="en-IN" sz="1200" dirty="0"/>
+            </a:p>
+          </p:txBody>
+        </p:sp>
+      </p:grpSp>
+      <p:grpSp>
+        <p:nvGrpSpPr>
+          <p:cNvPr id="89" name="Group 88"/>
+          <p:cNvGrpSpPr/>
+          <p:nvPr/>
+        </p:nvGrpSpPr>
+        <p:grpSpPr>
+          <a:xfrm>
+            <a:off x="395536" y="3140968"/>
+            <a:ext cx="1296144" cy="461665"/>
+            <a:chOff x="3707904" y="3933056"/>
+            <a:chExt cx="1296144" cy="461665"/>
+          </a:xfrm>
+        </p:grpSpPr>
+        <p:pic>
+          <p:nvPicPr>
+            <p:cNvPr id="90" name="Picture 6" descr="D:\MyWorkSpace\xampp\htdocs\bmhs\assets\img\bmhs\icons\Phone.png"/>
+            <p:cNvPicPr>
+              <a:picLocks noChangeAspect="1" noChangeArrowheads="1"/>
+            </p:cNvPicPr>
+            <p:nvPr/>
+          </p:nvPicPr>
+          <p:blipFill>
+            <a:blip r:embed="rId6" cstate="print">
+              <a:extLst>
+                <a:ext uri="{28A0092B-C50C-407E-A947-70E740481C1C}">
+                  <a14:useLocalDpi xmlns:a14="http://schemas.microsoft.com/office/drawing/2010/main" val="0"/>
+                </a:ext>
+              </a:extLst>
+            </a:blip>
+            <a:srcRect/>
+            <a:stretch>
+              <a:fillRect/>
+            </a:stretch>
+          </p:blipFill>
+          <p:spPr bwMode="auto">
+            <a:xfrm>
+              <a:off x="3707904" y="3933056"/>
+              <a:ext cx="243050" cy="243050"/>
+            </a:xfrm>
+            <a:prstGeom prst="rect">
+              <a:avLst/>
+            </a:prstGeom>
+            <a:noFill/>
+            <a:extLst>
+              <a:ext uri="{909E8E84-426E-40DD-AFC4-6F175D3DCCD1}">
+                <a14:hiddenFill xmlns:a14="http://schemas.microsoft.com/office/drawing/2010/main">
+                  <a:solidFill>
+                    <a:srgbClr val="FFFFFF"/>
+                  </a:solidFill>
+                </a14:hiddenFill>
+              </a:ext>
+            </a:extLst>
+          </p:spPr>
+        </p:pic>
+        <p:sp>
+          <p:nvSpPr>
+            <p:cNvPr id="91" name="TextBox 90"/>
+            <p:cNvSpPr txBox="1"/>
+            <p:nvPr/>
+          </p:nvSpPr>
+          <p:spPr>
+            <a:xfrm>
+              <a:off x="3950954" y="3933056"/>
+              <a:ext cx="1053094" cy="461665"/>
+            </a:xfrm>
+            <a:prstGeom prst="rect">
+              <a:avLst/>
+            </a:prstGeom>
+            <a:noFill/>
+          </p:spPr>
+          <p:txBody>
+            <a:bodyPr wrap="square" rtlCol="0">
+              <a:spAutoFit/>
+            </a:bodyPr>
+            <a:lstStyle/>
+            <a:p>
+              <a:r>
+                <a:rPr lang="en-US" sz="1200" dirty="0" smtClean="0"/>
+                <a:t>Check availability</a:t>
+              </a:r>
+              <a:endParaRPr lang="en-IN" sz="1200" dirty="0"/>
+            </a:p>
+          </p:txBody>
+        </p:sp>
+      </p:grpSp>
+      <p:pic>
+        <p:nvPicPr>
+          <p:cNvPr id="1031" name="Picture 7" descr="D:\MyWorkSpace\xampp\htdocs\bmhs\assets\img\bmhs\icons\owner.png"/>
+          <p:cNvPicPr>
+            <a:picLocks noChangeAspect="1" noChangeArrowheads="1"/>
+          </p:cNvPicPr>
+          <p:nvPr/>
+        </p:nvPicPr>
+        <p:blipFill>
+          <a:blip r:embed="rId7" cstate="print">
+            <a:extLst>
+              <a:ext uri="{28A0092B-C50C-407E-A947-70E740481C1C}">
+                <a14:useLocalDpi xmlns:a14="http://schemas.microsoft.com/office/drawing/2010/main" val="0"/>
+              </a:ext>
+            </a:extLst>
+          </a:blip>
+          <a:srcRect/>
+          <a:stretch>
+            <a:fillRect/>
+          </a:stretch>
+        </p:blipFill>
+        <p:spPr bwMode="auto">
+          <a:xfrm>
+            <a:off x="2715342" y="5794500"/>
+            <a:ext cx="641030" cy="658836"/>
+          </a:xfrm>
+          <a:prstGeom prst="rect">
+            <a:avLst/>
+          </a:prstGeom>
+          <a:noFill/>
+          <a:extLst>
+            <a:ext uri="{909E8E84-426E-40DD-AFC4-6F175D3DCCD1}">
+              <a14:hiddenFill xmlns:a14="http://schemas.microsoft.com/office/drawing/2010/main">
+                <a:solidFill>
+                  <a:srgbClr val="FFFFFF"/>
+                </a:solidFill>
+              </a14:hiddenFill>
+            </a:ext>
+          </a:extLst>
+        </p:spPr>
+      </p:pic>
+      <p:sp>
+        <p:nvSpPr>
+          <p:cNvPr id="118" name="Diamond 117"/>
+          <p:cNvSpPr/>
+          <p:nvPr/>
+        </p:nvSpPr>
+        <p:spPr>
+          <a:xfrm>
+            <a:off x="1996340" y="4149080"/>
+            <a:ext cx="2071604" cy="537990"/>
+          </a:xfrm>
+          <a:prstGeom prst="diamond">
+            <a:avLst/>
+          </a:prstGeom>
+        </p:spPr>
+        <p:style>
+          <a:lnRef idx="2">
+            <a:schemeClr val="accent6"/>
+          </a:lnRef>
+          <a:fillRef idx="1">
+            <a:schemeClr val="lt1"/>
+          </a:fillRef>
+          <a:effectRef idx="0">
+            <a:schemeClr val="accent6"/>
+          </a:effectRef>
+          <a:fontRef idx="minor">
+            <a:schemeClr val="dk1"/>
+          </a:fontRef>
+        </p:style>
+        <p:txBody>
+          <a:bodyPr rtlCol="0" anchor="ctr"/>
+          <a:lstStyle/>
+          <a:p>
+            <a:pPr algn="ctr"/>
+            <a:r>
+              <a:rPr lang="en-US" sz="1400" dirty="0" smtClean="0"/>
+              <a:t>available</a:t>
+            </a:r>
+            <a:endParaRPr lang="en-IN" sz="1400" dirty="0"/>
+          </a:p>
+        </p:txBody>
+      </p:sp>
+      <p:cxnSp>
+        <p:nvCxnSpPr>
+          <p:cNvPr id="107" name="Elbow Connector 106"/>
+          <p:cNvCxnSpPr>
+            <a:stCxn id="1026" idx="2"/>
+            <a:endCxn id="1031" idx="1"/>
+          </p:cNvCxnSpPr>
+          <p:nvPr/>
+        </p:nvCxnSpPr>
+        <p:spPr>
+          <a:xfrm rot="16200000" flipH="1">
+            <a:off x="-102866" y="3305709"/>
+            <a:ext cx="3259949" cy="2376467"/>
+          </a:xfrm>
+          <a:prstGeom prst="bentConnector2">
+            <a:avLst/>
+          </a:prstGeom>
+          <a:ln>
+            <a:tailEnd type="arrow"/>
+          </a:ln>
+        </p:spPr>
+        <p:style>
+          <a:lnRef idx="1">
+            <a:schemeClr val="accent1"/>
+          </a:lnRef>
+          <a:fillRef idx="0">
+            <a:schemeClr val="accent1"/>
+          </a:fillRef>
+          <a:effectRef idx="0">
+            <a:schemeClr val="accent1"/>
+          </a:effectRef>
+          <a:fontRef idx="minor">
+            <a:schemeClr val="tx1"/>
+          </a:fontRef>
+        </p:style>
+      </p:cxnSp>
+      <p:grpSp>
+        <p:nvGrpSpPr>
+          <p:cNvPr id="133" name="Group 132"/>
+          <p:cNvGrpSpPr/>
+          <p:nvPr/>
+        </p:nvGrpSpPr>
+        <p:grpSpPr>
+          <a:xfrm>
+            <a:off x="1691680" y="5102285"/>
+            <a:ext cx="1296144" cy="1015663"/>
+            <a:chOff x="3707904" y="3933056"/>
+            <a:chExt cx="1296144" cy="1015663"/>
+          </a:xfrm>
+        </p:grpSpPr>
+        <p:pic>
+          <p:nvPicPr>
+            <p:cNvPr id="134" name="Picture 6" descr="D:\MyWorkSpace\xampp\htdocs\bmhs\assets\img\bmhs\icons\Phone.png"/>
+            <p:cNvPicPr>
+              <a:picLocks noChangeAspect="1" noChangeArrowheads="1"/>
+            </p:cNvPicPr>
+            <p:nvPr/>
+          </p:nvPicPr>
+          <p:blipFill>
+            <a:blip r:embed="rId6" cstate="print">
+              <a:extLst>
+                <a:ext uri="{28A0092B-C50C-407E-A947-70E740481C1C}">
+                  <a14:useLocalDpi xmlns:a14="http://schemas.microsoft.com/office/drawing/2010/main" val="0"/>
+                </a:ext>
+              </a:extLst>
+            </a:blip>
+            <a:srcRect/>
+            <a:stretch>
+              <a:fillRect/>
+            </a:stretch>
+          </p:blipFill>
+          <p:spPr bwMode="auto">
+            <a:xfrm>
+              <a:off x="3707904" y="3933056"/>
+              <a:ext cx="243050" cy="243050"/>
+            </a:xfrm>
+            <a:prstGeom prst="rect">
+              <a:avLst/>
+            </a:prstGeom>
+            <a:noFill/>
+            <a:extLst>
+              <a:ext uri="{909E8E84-426E-40DD-AFC4-6F175D3DCCD1}">
+                <a14:hiddenFill xmlns:a14="http://schemas.microsoft.com/office/drawing/2010/main">
+                  <a:solidFill>
+                    <a:srgbClr val="FFFFFF"/>
+                  </a:solidFill>
+                </a14:hiddenFill>
+              </a:ext>
+            </a:extLst>
+          </p:spPr>
+        </p:pic>
+        <p:sp>
+          <p:nvSpPr>
+            <p:cNvPr id="135" name="TextBox 134"/>
+            <p:cNvSpPr txBox="1"/>
+            <p:nvPr/>
+          </p:nvSpPr>
+          <p:spPr>
+            <a:xfrm>
+              <a:off x="3950954" y="3933056"/>
+              <a:ext cx="1053094" cy="1015663"/>
+            </a:xfrm>
+            <a:prstGeom prst="rect">
+              <a:avLst/>
+            </a:prstGeom>
+            <a:noFill/>
+          </p:spPr>
+          <p:txBody>
+            <a:bodyPr wrap="square" rtlCol="0">
+              <a:spAutoFit/>
+            </a:bodyPr>
+            <a:lstStyle/>
+            <a:p>
+              <a:r>
+                <a:rPr lang="en-US" sz="1200" dirty="0" smtClean="0"/>
+                <a:t>Get availability details from  preferred  place</a:t>
+              </a:r>
+              <a:endParaRPr lang="en-IN" sz="1200" dirty="0"/>
+            </a:p>
+          </p:txBody>
+        </p:sp>
+      </p:grpSp>
+      <p:sp>
+        <p:nvSpPr>
+          <p:cNvPr id="127" name="Oval 126"/>
+          <p:cNvSpPr/>
+          <p:nvPr/>
+        </p:nvSpPr>
+        <p:spPr>
+          <a:xfrm>
+            <a:off x="3114487" y="4985295"/>
+            <a:ext cx="360040" cy="360040"/>
+          </a:xfrm>
+          <a:prstGeom prst="ellipse">
+            <a:avLst/>
+          </a:prstGeom>
+        </p:spPr>
+        <p:style>
+          <a:lnRef idx="2">
+            <a:schemeClr val="accent6"/>
+          </a:lnRef>
+          <a:fillRef idx="1">
+            <a:schemeClr val="lt1"/>
+          </a:fillRef>
+          <a:effectRef idx="0">
+            <a:schemeClr val="accent6"/>
+          </a:effectRef>
+          <a:fontRef idx="minor">
+            <a:schemeClr val="dk1"/>
+          </a:fontRef>
+        </p:style>
+        <p:txBody>
+          <a:bodyPr rtlCol="0" anchor="ctr"/>
+          <a:lstStyle/>
+          <a:p>
+            <a:pPr algn="ctr"/>
+            <a:r>
+              <a:rPr lang="en-US" sz="1200" dirty="0"/>
+              <a:t>1</a:t>
+            </a:r>
+            <a:endParaRPr lang="en-IN" sz="1200" dirty="0"/>
+          </a:p>
+        </p:txBody>
+      </p:sp>
+      <p:cxnSp>
+        <p:nvCxnSpPr>
+          <p:cNvPr id="1039" name="Elbow Connector 1038"/>
+          <p:cNvCxnSpPr>
+            <a:stCxn id="1031" idx="0"/>
+            <a:endCxn id="118" idx="2"/>
+          </p:cNvCxnSpPr>
+          <p:nvPr/>
+        </p:nvCxnSpPr>
+        <p:spPr>
+          <a:xfrm rot="16200000" flipV="1">
+            <a:off x="2480285" y="5238927"/>
+            <a:ext cx="1107430" cy="3715"/>
+          </a:xfrm>
+          <a:prstGeom prst="bentConnector3">
+            <a:avLst/>
+          </a:prstGeom>
+          <a:ln>
+            <a:tailEnd type="arrow"/>
+          </a:ln>
+        </p:spPr>
+        <p:style>
+          <a:lnRef idx="1">
+            <a:schemeClr val="accent1"/>
+          </a:lnRef>
+          <a:fillRef idx="0">
+            <a:schemeClr val="accent1"/>
+          </a:fillRef>
+          <a:effectRef idx="0">
+            <a:schemeClr val="accent1"/>
+          </a:effectRef>
+          <a:fontRef idx="minor">
+            <a:schemeClr val="tx1"/>
+          </a:fontRef>
+        </p:style>
+      </p:cxnSp>
+      <p:sp>
+        <p:nvSpPr>
+          <p:cNvPr id="156" name="Oval 155"/>
+          <p:cNvSpPr/>
+          <p:nvPr/>
+        </p:nvSpPr>
+        <p:spPr>
+          <a:xfrm>
+            <a:off x="467544" y="1916832"/>
+            <a:ext cx="360040" cy="360040"/>
+          </a:xfrm>
+          <a:prstGeom prst="ellipse">
+            <a:avLst/>
+          </a:prstGeom>
+        </p:spPr>
+        <p:style>
+          <a:lnRef idx="2">
+            <a:schemeClr val="accent6"/>
+          </a:lnRef>
+          <a:fillRef idx="1">
+            <a:schemeClr val="lt1"/>
+          </a:fillRef>
+          <a:effectRef idx="0">
+            <a:schemeClr val="accent6"/>
+          </a:effectRef>
+          <a:fontRef idx="minor">
+            <a:schemeClr val="dk1"/>
+          </a:fontRef>
+        </p:style>
+        <p:txBody>
+          <a:bodyPr rtlCol="0" anchor="ctr"/>
+          <a:lstStyle/>
+          <a:p>
+            <a:pPr algn="ctr"/>
+            <a:r>
+              <a:rPr lang="en-US" sz="1200" dirty="0"/>
+              <a:t>1</a:t>
+            </a:r>
+            <a:endParaRPr lang="en-IN" sz="1200" dirty="0"/>
+          </a:p>
+        </p:txBody>
+      </p:sp>
+      <p:sp>
+        <p:nvSpPr>
+          <p:cNvPr id="161" name="Oval 160"/>
+          <p:cNvSpPr/>
+          <p:nvPr/>
+        </p:nvSpPr>
+        <p:spPr>
+          <a:xfrm>
+            <a:off x="957164" y="1916832"/>
+            <a:ext cx="360040" cy="360040"/>
+          </a:xfrm>
+          <a:prstGeom prst="ellipse">
+            <a:avLst/>
+          </a:prstGeom>
+        </p:spPr>
+        <p:style>
+          <a:lnRef idx="2">
+            <a:schemeClr val="accent6"/>
+          </a:lnRef>
+          <a:fillRef idx="1">
+            <a:schemeClr val="lt1"/>
+          </a:fillRef>
+          <a:effectRef idx="0">
+            <a:schemeClr val="accent6"/>
+          </a:effectRef>
+          <a:fontRef idx="minor">
+            <a:schemeClr val="dk1"/>
+          </a:fontRef>
+        </p:style>
+        <p:txBody>
+          <a:bodyPr rtlCol="0" anchor="ctr"/>
+          <a:lstStyle/>
+          <a:p>
+            <a:pPr algn="ctr"/>
+            <a:r>
+              <a:rPr lang="en-US" sz="1200" dirty="0" smtClean="0"/>
+              <a:t>2</a:t>
+            </a:r>
+            <a:endParaRPr lang="en-IN" sz="1200" dirty="0"/>
+          </a:p>
+        </p:txBody>
+      </p:sp>
+      <p:sp>
+        <p:nvSpPr>
+          <p:cNvPr id="162" name="Oval 161"/>
+          <p:cNvSpPr/>
+          <p:nvPr/>
+        </p:nvSpPr>
+        <p:spPr>
+          <a:xfrm>
+            <a:off x="395536" y="3602633"/>
+            <a:ext cx="360040" cy="360040"/>
+          </a:xfrm>
+          <a:prstGeom prst="ellipse">
+            <a:avLst/>
+          </a:prstGeom>
+        </p:spPr>
+        <p:style>
+          <a:lnRef idx="2">
+            <a:schemeClr val="accent6"/>
+          </a:lnRef>
+          <a:fillRef idx="1">
+            <a:schemeClr val="lt1"/>
+          </a:fillRef>
+          <a:effectRef idx="0">
+            <a:schemeClr val="accent6"/>
+          </a:effectRef>
+          <a:fontRef idx="minor">
+            <a:schemeClr val="dk1"/>
+          </a:fontRef>
+        </p:style>
+        <p:txBody>
+          <a:bodyPr rtlCol="0" anchor="ctr"/>
+          <a:lstStyle/>
+          <a:p>
+            <a:pPr algn="ctr"/>
+            <a:r>
+              <a:rPr lang="en-US" sz="1200" dirty="0"/>
+              <a:t>1</a:t>
+            </a:r>
+            <a:endParaRPr lang="en-IN" sz="1200" dirty="0"/>
+          </a:p>
+        </p:txBody>
+      </p:sp>
+      <p:sp>
+        <p:nvSpPr>
+          <p:cNvPr id="183" name="Diamond 182"/>
+          <p:cNvSpPr/>
+          <p:nvPr/>
+        </p:nvSpPr>
+        <p:spPr>
+          <a:xfrm>
+            <a:off x="4117631" y="2325977"/>
+            <a:ext cx="2071604" cy="537990"/>
+          </a:xfrm>
+          <a:prstGeom prst="diamond">
+            <a:avLst/>
+          </a:prstGeom>
+        </p:spPr>
+        <p:style>
+          <a:lnRef idx="2">
+            <a:schemeClr val="accent6"/>
+          </a:lnRef>
+          <a:fillRef idx="1">
+            <a:schemeClr val="lt1"/>
+          </a:fillRef>
+          <a:effectRef idx="0">
+            <a:schemeClr val="accent6"/>
+          </a:effectRef>
+          <a:fontRef idx="minor">
+            <a:schemeClr val="dk1"/>
+          </a:fontRef>
+        </p:style>
+        <p:txBody>
+          <a:bodyPr rtlCol="0" anchor="ctr"/>
+          <a:lstStyle/>
+          <a:p>
+            <a:pPr algn="ctr"/>
+            <a:r>
+              <a:rPr lang="en-US" sz="1400" dirty="0" smtClean="0"/>
+              <a:t>accept</a:t>
+            </a:r>
+            <a:endParaRPr lang="en-IN" sz="1400" dirty="0"/>
+          </a:p>
+        </p:txBody>
+      </p:sp>
+      <p:sp>
+        <p:nvSpPr>
+          <p:cNvPr id="188" name="Rectangle 187"/>
+          <p:cNvSpPr/>
+          <p:nvPr/>
+        </p:nvSpPr>
+        <p:spPr>
+          <a:xfrm>
+            <a:off x="1796747" y="2325979"/>
+            <a:ext cx="1512168" cy="537988"/>
+          </a:xfrm>
+          <a:prstGeom prst="rect">
+            <a:avLst/>
+          </a:prstGeom>
+          <a:ln>
+            <a:solidFill>
+              <a:srgbClr val="FF0000"/>
+            </a:solidFill>
+          </a:ln>
+        </p:spPr>
+        <p:style>
+          <a:lnRef idx="2">
+            <a:schemeClr val="accent2"/>
+          </a:lnRef>
+          <a:fillRef idx="1">
+            <a:schemeClr val="lt1"/>
+          </a:fillRef>
+          <a:effectRef idx="0">
+            <a:schemeClr val="accent2"/>
+          </a:effectRef>
+          <a:fontRef idx="minor">
+            <a:schemeClr val="dk1"/>
+          </a:fontRef>
+        </p:style>
+        <p:txBody>
+          <a:bodyPr rtlCol="0" anchor="ctr"/>
+          <a:lstStyle/>
+          <a:p>
+            <a:pPr algn="ctr"/>
+            <a:r>
+              <a:rPr lang="en-US" sz="1200" dirty="0" smtClean="0"/>
+              <a:t>Divert the user to browse other Ads</a:t>
+            </a:r>
+            <a:endParaRPr lang="en-IN" dirty="0"/>
+          </a:p>
+        </p:txBody>
+      </p:sp>
+      <p:cxnSp>
+        <p:nvCxnSpPr>
+          <p:cNvPr id="1056" name="Straight Arrow Connector 1055"/>
+          <p:cNvCxnSpPr>
+            <a:stCxn id="183" idx="1"/>
+            <a:endCxn id="188" idx="3"/>
+          </p:cNvCxnSpPr>
+          <p:nvPr/>
+        </p:nvCxnSpPr>
+        <p:spPr>
+          <a:xfrm flipH="1">
+            <a:off x="3308915" y="2594972"/>
+            <a:ext cx="808716" cy="1"/>
+          </a:xfrm>
+          <a:prstGeom prst="straightConnector1">
+            <a:avLst/>
+          </a:prstGeom>
+          <a:ln>
+            <a:tailEnd type="arrow"/>
+          </a:ln>
+        </p:spPr>
+        <p:style>
+          <a:lnRef idx="1">
+            <a:schemeClr val="accent1"/>
+          </a:lnRef>
+          <a:fillRef idx="0">
+            <a:schemeClr val="accent1"/>
+          </a:fillRef>
+          <a:effectRef idx="0">
+            <a:schemeClr val="accent1"/>
+          </a:effectRef>
+          <a:fontRef idx="minor">
+            <a:schemeClr val="tx1"/>
+          </a:fontRef>
+        </p:style>
+      </p:cxnSp>
+      <p:sp>
+        <p:nvSpPr>
+          <p:cNvPr id="191" name="TextBox 190"/>
+          <p:cNvSpPr txBox="1"/>
+          <p:nvPr/>
+        </p:nvSpPr>
+        <p:spPr>
+          <a:xfrm>
+            <a:off x="3564805" y="2359914"/>
+            <a:ext cx="464190" cy="276998"/>
+          </a:xfrm>
+          <a:prstGeom prst="rect">
+            <a:avLst/>
+          </a:prstGeom>
+          <a:noFill/>
+        </p:spPr>
+        <p:txBody>
+          <a:bodyPr wrap="square" rtlCol="0">
+            <a:spAutoFit/>
+          </a:bodyPr>
+          <a:lstStyle/>
+          <a:p>
+            <a:r>
+              <a:rPr lang="en-US" sz="1200" dirty="0" smtClean="0"/>
+              <a:t>No</a:t>
+            </a:r>
+            <a:endParaRPr lang="en-IN" sz="1200" dirty="0"/>
+          </a:p>
+        </p:txBody>
+      </p:sp>
+      <p:sp>
+        <p:nvSpPr>
+          <p:cNvPr id="192" name="TextBox 191"/>
+          <p:cNvSpPr txBox="1"/>
+          <p:nvPr/>
+        </p:nvSpPr>
+        <p:spPr>
+          <a:xfrm>
+            <a:off x="5109115" y="1891862"/>
+            <a:ext cx="464190" cy="276998"/>
+          </a:xfrm>
+          <a:prstGeom prst="rect">
+            <a:avLst/>
+          </a:prstGeom>
+          <a:noFill/>
+        </p:spPr>
+        <p:txBody>
+          <a:bodyPr wrap="square" rtlCol="0">
+            <a:spAutoFit/>
+          </a:bodyPr>
+          <a:lstStyle/>
+          <a:p>
+            <a:r>
+              <a:rPr lang="en-US" sz="1200" dirty="0" smtClean="0"/>
+              <a:t>Yes</a:t>
+            </a:r>
+            <a:endParaRPr lang="en-IN" sz="1200" dirty="0"/>
+          </a:p>
+        </p:txBody>
+      </p:sp>
+      <p:cxnSp>
+        <p:nvCxnSpPr>
+          <p:cNvPr id="1064" name="Elbow Connector 1063"/>
+          <p:cNvCxnSpPr>
+            <a:stCxn id="183" idx="0"/>
+          </p:cNvCxnSpPr>
+          <p:nvPr/>
+        </p:nvCxnSpPr>
+        <p:spPr>
+          <a:xfrm rot="16200000" flipH="1">
+            <a:off x="5947915" y="1531494"/>
+            <a:ext cx="22903" cy="1611868"/>
+          </a:xfrm>
+          <a:prstGeom prst="bentConnector4">
+            <a:avLst>
+              <a:gd name="adj1" fmla="val -3493438"/>
+              <a:gd name="adj2" fmla="val 82130"/>
+            </a:avLst>
+          </a:prstGeom>
+          <a:ln>
+            <a:tailEnd type="arrow"/>
+          </a:ln>
+        </p:spPr>
+        <p:style>
+          <a:lnRef idx="1">
+            <a:schemeClr val="accent1"/>
+          </a:lnRef>
+          <a:fillRef idx="0">
+            <a:schemeClr val="accent1"/>
+          </a:fillRef>
+          <a:effectRef idx="0">
+            <a:schemeClr val="accent1"/>
+          </a:effectRef>
+          <a:fontRef idx="minor">
+            <a:schemeClr val="tx1"/>
+          </a:fontRef>
+        </p:style>
+      </p:cxnSp>
+      <p:grpSp>
+        <p:nvGrpSpPr>
+          <p:cNvPr id="208" name="Group 207"/>
+          <p:cNvGrpSpPr/>
+          <p:nvPr/>
+        </p:nvGrpSpPr>
+        <p:grpSpPr>
+          <a:xfrm>
+            <a:off x="5161651" y="1222344"/>
+            <a:ext cx="1944216" cy="276999"/>
+            <a:chOff x="395536" y="574080"/>
+            <a:chExt cx="1944216" cy="276999"/>
+          </a:xfrm>
+        </p:grpSpPr>
+        <p:pic>
+          <p:nvPicPr>
+            <p:cNvPr id="209" name="Picture 5" descr="D:\MyWorkSpace\xampp\htdocs\bmhs\assets\img\bmhs\icons\email.png"/>
+            <p:cNvPicPr>
+              <a:picLocks noChangeAspect="1" noChangeArrowheads="1"/>
+            </p:cNvPicPr>
+            <p:nvPr/>
+          </p:nvPicPr>
+          <p:blipFill>
+            <a:blip r:embed="rId5" cstate="print">
+              <a:extLst>
+                <a:ext uri="{28A0092B-C50C-407E-A947-70E740481C1C}">
+                  <a14:useLocalDpi xmlns:a14="http://schemas.microsoft.com/office/drawing/2010/main" val="0"/>
+                </a:ext>
+              </a:extLst>
+            </a:blip>
+            <a:srcRect/>
+            <a:stretch>
+              <a:fillRect/>
+            </a:stretch>
+          </p:blipFill>
+          <p:spPr bwMode="auto">
+            <a:xfrm>
+              <a:off x="395536" y="620688"/>
+              <a:ext cx="248502" cy="177392"/>
+            </a:xfrm>
+            <a:prstGeom prst="rect">
+              <a:avLst/>
+            </a:prstGeom>
+            <a:noFill/>
+            <a:extLst>
+              <a:ext uri="{909E8E84-426E-40DD-AFC4-6F175D3DCCD1}">
+                <a14:hiddenFill xmlns:a14="http://schemas.microsoft.com/office/drawing/2010/main">
+                  <a:solidFill>
+                    <a:srgbClr val="FFFFFF"/>
+                  </a:solidFill>
+                </a14:hiddenFill>
+              </a:ext>
+            </a:extLst>
+          </p:spPr>
+        </p:pic>
+        <p:sp>
+          <p:nvSpPr>
+            <p:cNvPr id="210" name="TextBox 209"/>
+            <p:cNvSpPr txBox="1"/>
+            <p:nvPr/>
+          </p:nvSpPr>
+          <p:spPr>
+            <a:xfrm>
+              <a:off x="611560" y="574080"/>
+              <a:ext cx="1728192" cy="276999"/>
+            </a:xfrm>
+            <a:prstGeom prst="rect">
+              <a:avLst/>
+            </a:prstGeom>
+            <a:noFill/>
+          </p:spPr>
+          <p:txBody>
+            <a:bodyPr wrap="square" rtlCol="0">
+              <a:spAutoFit/>
+            </a:bodyPr>
+            <a:lstStyle/>
+            <a:p>
+              <a:r>
+                <a:rPr lang="en-US" sz="1200" dirty="0" smtClean="0"/>
+                <a:t>Payment </a:t>
+              </a:r>
+              <a:r>
+                <a:rPr lang="en-US" sz="1200" dirty="0" smtClean="0"/>
+                <a:t>request</a:t>
+              </a:r>
+              <a:endParaRPr lang="en-IN" sz="1200" dirty="0"/>
+            </a:p>
+          </p:txBody>
+        </p:sp>
+      </p:grpSp>
+      <p:sp>
+        <p:nvSpPr>
+          <p:cNvPr id="213" name="Rectangle 212"/>
+          <p:cNvSpPr/>
+          <p:nvPr/>
+        </p:nvSpPr>
+        <p:spPr>
+          <a:xfrm>
+            <a:off x="1763688" y="1255472"/>
+            <a:ext cx="1512168" cy="537988"/>
+          </a:xfrm>
+          <a:prstGeom prst="rect">
+            <a:avLst/>
+          </a:prstGeom>
+          <a:ln>
+            <a:solidFill>
+              <a:srgbClr val="FF0000"/>
+            </a:solidFill>
+          </a:ln>
+        </p:spPr>
+        <p:style>
+          <a:lnRef idx="2">
+            <a:schemeClr val="accent2"/>
+          </a:lnRef>
+          <a:fillRef idx="1">
+            <a:schemeClr val="lt1"/>
+          </a:fillRef>
+          <a:effectRef idx="0">
+            <a:schemeClr val="accent2"/>
+          </a:effectRef>
+          <a:fontRef idx="minor">
+            <a:schemeClr val="dk1"/>
+          </a:fontRef>
+        </p:style>
+        <p:txBody>
+          <a:bodyPr rtlCol="0" anchor="ctr"/>
+          <a:lstStyle/>
+          <a:p>
+            <a:pPr algn="ctr"/>
+            <a:r>
+              <a:rPr lang="en-US" sz="1200" dirty="0" smtClean="0"/>
+              <a:t>Block the calendar </a:t>
+            </a:r>
+            <a:r>
+              <a:rPr lang="en-US" sz="1200" dirty="0" smtClean="0"/>
+              <a:t>of </a:t>
+            </a:r>
+            <a:r>
+              <a:rPr lang="en-US" sz="1200" dirty="0" smtClean="0"/>
+              <a:t>particular </a:t>
+            </a:r>
+            <a:r>
+              <a:rPr lang="en-US" sz="1200" dirty="0" smtClean="0"/>
+              <a:t>place for 1Hr</a:t>
+            </a:r>
+            <a:endParaRPr lang="en-IN" dirty="0"/>
+          </a:p>
+        </p:txBody>
+      </p:sp>
+      <p:cxnSp>
+        <p:nvCxnSpPr>
+          <p:cNvPr id="1075" name="Elbow Connector 1074"/>
+          <p:cNvCxnSpPr>
+            <a:stCxn id="183" idx="0"/>
+            <a:endCxn id="213" idx="3"/>
+          </p:cNvCxnSpPr>
+          <p:nvPr/>
+        </p:nvCxnSpPr>
+        <p:spPr>
+          <a:xfrm rot="16200000" flipV="1">
+            <a:off x="3813890" y="986433"/>
             <a:ext cx="801511" cy="1877577"/>
           </a:xfrm>
           <a:prstGeom prst="bentConnector2">
+            <a:avLst/>
+          </a:prstGeom>
+          <a:ln>
+            <a:tailEnd type="arrow"/>
+          </a:ln>
+        </p:spPr>
+        <p:style>
+          <a:lnRef idx="1">
+            <a:schemeClr val="accent1"/>
+          </a:lnRef>
+          <a:fillRef idx="0">
+            <a:schemeClr val="accent1"/>
+          </a:fillRef>
+          <a:effectRef idx="0">
+            <a:schemeClr val="accent1"/>
+          </a:effectRef>
+          <a:fontRef idx="minor">
+            <a:schemeClr val="tx1"/>
+          </a:fontRef>
+        </p:style>
+      </p:cxnSp>
+      <p:cxnSp>
+        <p:nvCxnSpPr>
+          <p:cNvPr id="4" name="Elbow Connector 3"/>
+          <p:cNvCxnSpPr>
+            <a:stCxn id="118" idx="0"/>
+          </p:cNvCxnSpPr>
+          <p:nvPr/>
+        </p:nvCxnSpPr>
+        <p:spPr>
+          <a:xfrm rot="5400000" flipH="1" flipV="1">
+            <a:off x="4394666" y="1778444"/>
+            <a:ext cx="1008112" cy="3733161"/>
+          </a:xfrm>
+          <a:prstGeom prst="bentConnector2">
+            <a:avLst/>
+          </a:prstGeom>
+          <a:ln>
+            <a:tailEnd type="arrow"/>
+          </a:ln>
+        </p:spPr>
+        <p:style>
+          <a:lnRef idx="1">
+            <a:schemeClr val="accent1"/>
+          </a:lnRef>
+          <a:fillRef idx="0">
+            <a:schemeClr val="accent1"/>
+          </a:fillRef>
+          <a:effectRef idx="0">
+            <a:schemeClr val="accent1"/>
+          </a:effectRef>
+          <a:fontRef idx="minor">
+            <a:schemeClr val="tx1"/>
+          </a:fontRef>
+        </p:style>
+      </p:cxnSp>
+      <p:sp>
+        <p:nvSpPr>
+          <p:cNvPr id="69" name="TextBox 68"/>
+          <p:cNvSpPr txBox="1"/>
+          <p:nvPr/>
+        </p:nvSpPr>
+        <p:spPr>
+          <a:xfrm>
+            <a:off x="2528601" y="3782653"/>
+            <a:ext cx="464190" cy="276998"/>
+          </a:xfrm>
+          <a:prstGeom prst="rect">
+            <a:avLst/>
+          </a:prstGeom>
+          <a:noFill/>
+        </p:spPr>
+        <p:txBody>
+          <a:bodyPr wrap="square" rtlCol="0">
+            <a:spAutoFit/>
+          </a:bodyPr>
+          <a:lstStyle/>
+          <a:p>
+            <a:r>
+              <a:rPr lang="en-US" sz="1200" dirty="0" smtClean="0"/>
+              <a:t>Yes</a:t>
+            </a:r>
+            <a:endParaRPr lang="en-IN" sz="1200" dirty="0"/>
+          </a:p>
+        </p:txBody>
+      </p:sp>
+      <p:grpSp>
+        <p:nvGrpSpPr>
+          <p:cNvPr id="70" name="Group 69"/>
+          <p:cNvGrpSpPr/>
+          <p:nvPr/>
+        </p:nvGrpSpPr>
+        <p:grpSpPr>
+          <a:xfrm>
+            <a:off x="3812970" y="3212976"/>
+            <a:ext cx="1927588" cy="1015663"/>
+            <a:chOff x="3707904" y="3933056"/>
+            <a:chExt cx="1927588" cy="1015663"/>
+          </a:xfrm>
+        </p:grpSpPr>
+        <p:pic>
+          <p:nvPicPr>
+            <p:cNvPr id="71" name="Picture 6" descr="D:\MyWorkSpace\xampp\htdocs\bmhs\assets\img\bmhs\icons\Phone.png"/>
+            <p:cNvPicPr>
+              <a:picLocks noChangeAspect="1" noChangeArrowheads="1"/>
+            </p:cNvPicPr>
+            <p:nvPr/>
+          </p:nvPicPr>
+          <p:blipFill>
+            <a:blip r:embed="rId6" cstate="print">
+              <a:extLst>
+                <a:ext uri="{28A0092B-C50C-407E-A947-70E740481C1C}">
+                  <a14:useLocalDpi xmlns:a14="http://schemas.microsoft.com/office/drawing/2010/main" val="0"/>
+                </a:ext>
+              </a:extLst>
+            </a:blip>
+            <a:srcRect/>
+            <a:stretch>
+              <a:fillRect/>
+            </a:stretch>
+          </p:blipFill>
+          <p:spPr bwMode="auto">
+            <a:xfrm>
+              <a:off x="3707904" y="3933056"/>
+              <a:ext cx="243050" cy="243050"/>
+            </a:xfrm>
+            <a:prstGeom prst="rect">
+              <a:avLst/>
+            </a:prstGeom>
+            <a:noFill/>
+            <a:extLst>
+              <a:ext uri="{909E8E84-426E-40DD-AFC4-6F175D3DCCD1}">
+                <a14:hiddenFill xmlns:a14="http://schemas.microsoft.com/office/drawing/2010/main">
+                  <a:solidFill>
+                    <a:srgbClr val="FFFFFF"/>
+                  </a:solidFill>
+                </a14:hiddenFill>
+              </a:ext>
+            </a:extLst>
+          </p:spPr>
+        </p:pic>
+        <p:sp>
+          <p:nvSpPr>
+            <p:cNvPr id="72" name="TextBox 71"/>
+            <p:cNvSpPr txBox="1"/>
+            <p:nvPr/>
+          </p:nvSpPr>
+          <p:spPr>
+            <a:xfrm>
+              <a:off x="3950954" y="3933056"/>
+              <a:ext cx="1684538" cy="1015663"/>
+            </a:xfrm>
+            <a:prstGeom prst="rect">
+              <a:avLst/>
+            </a:prstGeom>
+            <a:noFill/>
+          </p:spPr>
+          <p:txBody>
+            <a:bodyPr wrap="square" rtlCol="0">
+              <a:spAutoFit/>
+            </a:bodyPr>
+            <a:lstStyle/>
+            <a:p>
+              <a:r>
+                <a:rPr lang="en-US" sz="1200" dirty="0" smtClean="0"/>
+                <a:t>Communicate the </a:t>
+              </a:r>
+              <a:r>
+                <a:rPr lang="en-US" sz="1200" dirty="0"/>
+                <a:t> </a:t>
+              </a:r>
+              <a:r>
+                <a:rPr lang="en-US" sz="1200" dirty="0" smtClean="0"/>
+                <a:t>availability of place  &amp; request the user to check payment request mail</a:t>
+              </a:r>
+              <a:endParaRPr lang="en-IN" sz="1200" dirty="0"/>
+            </a:p>
+          </p:txBody>
+        </p:sp>
+      </p:grpSp>
+      <p:sp>
+        <p:nvSpPr>
+          <p:cNvPr id="73" name="Oval 72"/>
+          <p:cNvSpPr/>
+          <p:nvPr/>
+        </p:nvSpPr>
+        <p:spPr>
+          <a:xfrm>
+            <a:off x="3347864" y="3212976"/>
+            <a:ext cx="360040" cy="360040"/>
+          </a:xfrm>
+          <a:prstGeom prst="ellipse">
+            <a:avLst/>
+          </a:prstGeom>
+        </p:spPr>
+        <p:style>
+          <a:lnRef idx="2">
+            <a:schemeClr val="accent6"/>
+          </a:lnRef>
+          <a:fillRef idx="1">
+            <a:schemeClr val="lt1"/>
+          </a:fillRef>
+          <a:effectRef idx="0">
+            <a:schemeClr val="accent6"/>
+          </a:effectRef>
+          <a:fontRef idx="minor">
+            <a:schemeClr val="dk1"/>
+          </a:fontRef>
+        </p:style>
+        <p:txBody>
+          <a:bodyPr rtlCol="0" anchor="ctr"/>
+          <a:lstStyle/>
+          <a:p>
+            <a:pPr algn="ctr"/>
+            <a:r>
+              <a:rPr lang="en-US" sz="1200" dirty="0" smtClean="0"/>
+              <a:t>2</a:t>
+            </a:r>
+            <a:endParaRPr lang="en-IN" sz="1200" dirty="0"/>
+          </a:p>
+        </p:txBody>
+      </p:sp>
+      <p:pic>
+        <p:nvPicPr>
+          <p:cNvPr id="15" name="Picture 2" descr="D:\MyWorkSpace\xampp\htdocs\bmhs\assets\img\bmhs\icons\icon-home-stay.png"/>
+          <p:cNvPicPr>
+            <a:picLocks noChangeAspect="1" noChangeArrowheads="1"/>
+          </p:cNvPicPr>
+          <p:nvPr/>
+        </p:nvPicPr>
+        <p:blipFill>
+          <a:blip r:embed="rId8" cstate="print">
+            <a:extLst>
+              <a:ext uri="{28A0092B-C50C-407E-A947-70E740481C1C}">
+                <a14:useLocalDpi xmlns:a14="http://schemas.microsoft.com/office/drawing/2010/main" val="0"/>
+              </a:ext>
+            </a:extLst>
+          </a:blip>
+          <a:srcRect/>
+          <a:stretch>
+            <a:fillRect/>
+          </a:stretch>
+        </p:blipFill>
+        <p:spPr bwMode="auto">
+          <a:xfrm>
+            <a:off x="5148064" y="5898745"/>
+            <a:ext cx="655240" cy="655240"/>
+          </a:xfrm>
+          <a:prstGeom prst="rect">
+            <a:avLst/>
+          </a:prstGeom>
+          <a:noFill/>
+          <a:extLst>
+            <a:ext uri="{909E8E84-426E-40DD-AFC4-6F175D3DCCD1}">
+              <a14:hiddenFill xmlns:a14="http://schemas.microsoft.com/office/drawing/2010/main">
+                <a:solidFill>
+                  <a:srgbClr val="FFFFFF"/>
+                </a:solidFill>
+              </a14:hiddenFill>
+            </a:ext>
+          </a:extLst>
+        </p:spPr>
+      </p:pic>
+      <p:cxnSp>
+        <p:nvCxnSpPr>
+          <p:cNvPr id="28" name="Straight Arrow Connector 27"/>
+          <p:cNvCxnSpPr>
+            <a:endCxn id="183" idx="3"/>
+          </p:cNvCxnSpPr>
+          <p:nvPr/>
+        </p:nvCxnSpPr>
+        <p:spPr>
+          <a:xfrm flipH="1">
+            <a:off x="6189235" y="2594972"/>
+            <a:ext cx="576066" cy="0"/>
+          </a:xfrm>
+          <a:prstGeom prst="straightConnector1">
+            <a:avLst/>
+          </a:prstGeom>
+          <a:ln>
+            <a:tailEnd type="arrow"/>
+          </a:ln>
+        </p:spPr>
+        <p:style>
+          <a:lnRef idx="1">
+            <a:schemeClr val="accent1"/>
+          </a:lnRef>
+          <a:fillRef idx="0">
+            <a:schemeClr val="accent1"/>
+          </a:fillRef>
+          <a:effectRef idx="0">
+            <a:schemeClr val="accent1"/>
+          </a:effectRef>
+          <a:fontRef idx="minor">
+            <a:schemeClr val="tx1"/>
+          </a:fontRef>
+        </p:style>
+      </p:cxnSp>
+      <p:sp>
+        <p:nvSpPr>
+          <p:cNvPr id="93" name="Diamond 92"/>
+          <p:cNvSpPr/>
+          <p:nvPr/>
+        </p:nvSpPr>
+        <p:spPr>
+          <a:xfrm>
+            <a:off x="6291420" y="4325596"/>
+            <a:ext cx="2071604" cy="537990"/>
+          </a:xfrm>
+          <a:prstGeom prst="diamond">
+            <a:avLst/>
+          </a:prstGeom>
+        </p:spPr>
+        <p:style>
+          <a:lnRef idx="2">
+            <a:schemeClr val="accent6"/>
+          </a:lnRef>
+          <a:fillRef idx="1">
+            <a:schemeClr val="lt1"/>
+          </a:fillRef>
+          <a:effectRef idx="0">
+            <a:schemeClr val="accent6"/>
+          </a:effectRef>
+          <a:fontRef idx="minor">
+            <a:schemeClr val="dk1"/>
+          </a:fontRef>
+        </p:style>
+        <p:txBody>
+          <a:bodyPr rtlCol="0" anchor="ctr"/>
+          <a:lstStyle/>
+          <a:p>
+            <a:pPr algn="ctr"/>
+            <a:r>
+              <a:rPr lang="en-US" sz="1400" dirty="0" smtClean="0"/>
+              <a:t>successful</a:t>
+            </a:r>
+            <a:endParaRPr lang="en-IN" sz="1400" dirty="0"/>
+          </a:p>
+        </p:txBody>
+      </p:sp>
+      <p:cxnSp>
+        <p:nvCxnSpPr>
+          <p:cNvPr id="37" name="Straight Arrow Connector 36"/>
+          <p:cNvCxnSpPr>
+            <a:stCxn id="1028" idx="2"/>
+            <a:endCxn id="93" idx="0"/>
+          </p:cNvCxnSpPr>
+          <p:nvPr/>
+        </p:nvCxnSpPr>
+        <p:spPr>
+          <a:xfrm>
+            <a:off x="7324833" y="3328080"/>
+            <a:ext cx="2389" cy="997516"/>
+          </a:xfrm>
+          <a:prstGeom prst="straightConnector1">
+            <a:avLst/>
+          </a:prstGeom>
+          <a:ln>
+            <a:tailEnd type="arrow"/>
+          </a:ln>
+        </p:spPr>
+        <p:style>
+          <a:lnRef idx="1">
+            <a:schemeClr val="accent1"/>
+          </a:lnRef>
+          <a:fillRef idx="0">
+            <a:schemeClr val="accent1"/>
+          </a:fillRef>
+          <a:effectRef idx="0">
+            <a:schemeClr val="accent1"/>
+          </a:effectRef>
+          <a:fontRef idx="minor">
+            <a:schemeClr val="tx1"/>
+          </a:fontRef>
+        </p:style>
+      </p:cxnSp>
+      <p:sp>
+        <p:nvSpPr>
+          <p:cNvPr id="100" name="TextBox 99"/>
+          <p:cNvSpPr txBox="1"/>
+          <p:nvPr/>
+        </p:nvSpPr>
+        <p:spPr>
+          <a:xfrm>
+            <a:off x="6591478" y="3456781"/>
+            <a:ext cx="932850" cy="276999"/>
+          </a:xfrm>
+          <a:prstGeom prst="rect">
+            <a:avLst/>
+          </a:prstGeom>
+          <a:noFill/>
+        </p:spPr>
+        <p:txBody>
+          <a:bodyPr wrap="square" rtlCol="0">
+            <a:spAutoFit/>
+          </a:bodyPr>
+          <a:lstStyle/>
+          <a:p>
+            <a:r>
+              <a:rPr lang="en-US" sz="1200" dirty="0" smtClean="0"/>
+              <a:t>payment</a:t>
+            </a:r>
+            <a:endParaRPr lang="en-IN" sz="1200" dirty="0"/>
+          </a:p>
+        </p:txBody>
+      </p:sp>
+      <p:grpSp>
+        <p:nvGrpSpPr>
+          <p:cNvPr id="111" name="Group 110"/>
+          <p:cNvGrpSpPr/>
+          <p:nvPr/>
+        </p:nvGrpSpPr>
+        <p:grpSpPr>
+          <a:xfrm>
+            <a:off x="7380312" y="5085184"/>
+            <a:ext cx="1944216" cy="461665"/>
+            <a:chOff x="395536" y="574080"/>
+            <a:chExt cx="1944216" cy="461665"/>
+          </a:xfrm>
+        </p:grpSpPr>
+        <p:pic>
+          <p:nvPicPr>
+            <p:cNvPr id="115" name="Picture 5" descr="D:\MyWorkSpace\xampp\htdocs\bmhs\assets\img\bmhs\icons\email.png"/>
+            <p:cNvPicPr>
+              <a:picLocks noChangeAspect="1" noChangeArrowheads="1"/>
+            </p:cNvPicPr>
+            <p:nvPr/>
+          </p:nvPicPr>
+          <p:blipFill>
+            <a:blip r:embed="rId5" cstate="print">
+              <a:extLst>
+                <a:ext uri="{28A0092B-C50C-407E-A947-70E740481C1C}">
+                  <a14:useLocalDpi xmlns:a14="http://schemas.microsoft.com/office/drawing/2010/main" val="0"/>
+                </a:ext>
+              </a:extLst>
+            </a:blip>
+            <a:srcRect/>
+            <a:stretch>
+              <a:fillRect/>
+            </a:stretch>
+          </p:blipFill>
+          <p:spPr bwMode="auto">
+            <a:xfrm>
+              <a:off x="395536" y="620688"/>
+              <a:ext cx="248502" cy="177392"/>
+            </a:xfrm>
+            <a:prstGeom prst="rect">
+              <a:avLst/>
+            </a:prstGeom>
+            <a:noFill/>
+            <a:extLst>
+              <a:ext uri="{909E8E84-426E-40DD-AFC4-6F175D3DCCD1}">
+                <a14:hiddenFill xmlns:a14="http://schemas.microsoft.com/office/drawing/2010/main">
+                  <a:solidFill>
+                    <a:srgbClr val="FFFFFF"/>
+                  </a:solidFill>
+                </a14:hiddenFill>
+              </a:ext>
+            </a:extLst>
+          </p:spPr>
+        </p:pic>
+        <p:sp>
+          <p:nvSpPr>
+            <p:cNvPr id="116" name="TextBox 115"/>
+            <p:cNvSpPr txBox="1"/>
+            <p:nvPr/>
+          </p:nvSpPr>
+          <p:spPr>
+            <a:xfrm>
+              <a:off x="611560" y="574080"/>
+              <a:ext cx="1728192" cy="461665"/>
+            </a:xfrm>
+            <a:prstGeom prst="rect">
+              <a:avLst/>
+            </a:prstGeom>
+            <a:noFill/>
+          </p:spPr>
+          <p:txBody>
+            <a:bodyPr wrap="square" rtlCol="0">
+              <a:spAutoFit/>
+            </a:bodyPr>
+            <a:lstStyle/>
+            <a:p>
+              <a:r>
+                <a:rPr lang="en-US" sz="1200" dirty="0" smtClean="0"/>
+                <a:t>Payment </a:t>
+              </a:r>
+              <a:endParaRPr lang="en-US" sz="1200" dirty="0" smtClean="0"/>
+            </a:p>
+            <a:p>
+              <a:r>
+                <a:rPr lang="en-US" sz="1200" dirty="0" smtClean="0"/>
+                <a:t>confirmation</a:t>
+              </a:r>
+              <a:endParaRPr lang="en-IN" sz="1200" dirty="0"/>
+            </a:p>
+          </p:txBody>
+        </p:sp>
+      </p:grpSp>
+      <p:cxnSp>
+        <p:nvCxnSpPr>
+          <p:cNvPr id="52" name="Elbow Connector 51"/>
+          <p:cNvCxnSpPr>
+            <a:stCxn id="93" idx="2"/>
+            <a:endCxn id="1028" idx="3"/>
+          </p:cNvCxnSpPr>
+          <p:nvPr/>
+        </p:nvCxnSpPr>
+        <p:spPr>
+          <a:xfrm rot="5400000" flipH="1" flipV="1">
+            <a:off x="6558274" y="3537493"/>
+            <a:ext cx="2095040" cy="557145"/>
+          </a:xfrm>
+          <a:prstGeom prst="bentConnector4">
+            <a:avLst>
+              <a:gd name="adj1" fmla="val -10911"/>
+              <a:gd name="adj2" fmla="val 226943"/>
+            </a:avLst>
+          </a:prstGeom>
+          <a:ln>
+            <a:tailEnd type="arrow"/>
+          </a:ln>
+        </p:spPr>
+        <p:style>
+          <a:lnRef idx="1">
+            <a:schemeClr val="accent1"/>
+          </a:lnRef>
+          <a:fillRef idx="0">
+            <a:schemeClr val="accent1"/>
+          </a:fillRef>
+          <a:effectRef idx="0">
+            <a:schemeClr val="accent1"/>
+          </a:effectRef>
+          <a:fontRef idx="minor">
+            <a:schemeClr val="tx1"/>
+          </a:fontRef>
+        </p:style>
+      </p:cxnSp>
+      <p:cxnSp>
+        <p:nvCxnSpPr>
+          <p:cNvPr id="54" name="Elbow Connector 53"/>
+          <p:cNvCxnSpPr>
+            <a:stCxn id="93" idx="1"/>
+            <a:endCxn id="15" idx="1"/>
+          </p:cNvCxnSpPr>
+          <p:nvPr/>
+        </p:nvCxnSpPr>
+        <p:spPr>
+          <a:xfrm rot="10800000" flipV="1">
+            <a:off x="5148064" y="4594591"/>
+            <a:ext cx="1143356" cy="1631774"/>
+          </a:xfrm>
+          <a:prstGeom prst="bentConnector3">
+            <a:avLst>
+              <a:gd name="adj1" fmla="val 119994"/>
+            </a:avLst>
+          </a:prstGeom>
+          <a:ln>
+            <a:tailEnd type="arrow"/>
+          </a:ln>
+        </p:spPr>
+        <p:style>
+          <a:lnRef idx="1">
+            <a:schemeClr val="accent1"/>
+          </a:lnRef>
+          <a:fillRef idx="0">
+            <a:schemeClr val="accent1"/>
+          </a:fillRef>
+          <a:effectRef idx="0">
+            <a:schemeClr val="accent1"/>
+          </a:effectRef>
+          <a:fontRef idx="minor">
+            <a:schemeClr val="tx1"/>
+          </a:fontRef>
+        </p:style>
+      </p:cxnSp>
+      <p:sp>
+        <p:nvSpPr>
+          <p:cNvPr id="122" name="TextBox 121"/>
+          <p:cNvSpPr txBox="1"/>
+          <p:nvPr/>
+        </p:nvSpPr>
+        <p:spPr>
+          <a:xfrm>
+            <a:off x="6948264" y="4854794"/>
+            <a:ext cx="464190" cy="276998"/>
+          </a:xfrm>
+          <a:prstGeom prst="rect">
+            <a:avLst/>
+          </a:prstGeom>
+          <a:noFill/>
+        </p:spPr>
+        <p:txBody>
+          <a:bodyPr wrap="square" rtlCol="0">
+            <a:spAutoFit/>
+          </a:bodyPr>
+          <a:lstStyle/>
+          <a:p>
+            <a:r>
+              <a:rPr lang="en-US" sz="1200" dirty="0" smtClean="0"/>
+              <a:t>Yes</a:t>
+            </a:r>
+            <a:endParaRPr lang="en-IN" sz="1200" dirty="0"/>
+          </a:p>
+        </p:txBody>
+      </p:sp>
+      <p:sp>
+        <p:nvSpPr>
+          <p:cNvPr id="123" name="TextBox 122"/>
+          <p:cNvSpPr txBox="1"/>
+          <p:nvPr/>
+        </p:nvSpPr>
+        <p:spPr>
+          <a:xfrm>
+            <a:off x="5580112" y="4376138"/>
+            <a:ext cx="464190" cy="276998"/>
+          </a:xfrm>
+          <a:prstGeom prst="rect">
+            <a:avLst/>
+          </a:prstGeom>
+          <a:noFill/>
+        </p:spPr>
+        <p:txBody>
+          <a:bodyPr wrap="square" rtlCol="0">
+            <a:spAutoFit/>
+          </a:bodyPr>
+          <a:lstStyle/>
+          <a:p>
+            <a:r>
+              <a:rPr lang="en-US" sz="1200" dirty="0" smtClean="0"/>
+              <a:t>Yes</a:t>
+            </a:r>
+            <a:endParaRPr lang="en-IN" sz="1200" dirty="0"/>
+          </a:p>
+        </p:txBody>
+      </p:sp>
+      <p:sp>
+        <p:nvSpPr>
+          <p:cNvPr id="126" name="Rectangle 125"/>
+          <p:cNvSpPr/>
+          <p:nvPr/>
+        </p:nvSpPr>
+        <p:spPr>
+          <a:xfrm>
+            <a:off x="6876256" y="5957372"/>
+            <a:ext cx="1512168" cy="537988"/>
+          </a:xfrm>
+          <a:prstGeom prst="rect">
+            <a:avLst/>
+          </a:prstGeom>
+          <a:ln>
+            <a:solidFill>
+              <a:srgbClr val="FF0000"/>
+            </a:solidFill>
+          </a:ln>
+        </p:spPr>
+        <p:style>
+          <a:lnRef idx="2">
+            <a:schemeClr val="accent2"/>
+          </a:lnRef>
+          <a:fillRef idx="1">
+            <a:schemeClr val="lt1"/>
+          </a:fillRef>
+          <a:effectRef idx="0">
+            <a:schemeClr val="accent2"/>
+          </a:effectRef>
+          <a:fontRef idx="minor">
+            <a:schemeClr val="dk1"/>
+          </a:fontRef>
+        </p:style>
+        <p:txBody>
+          <a:bodyPr rtlCol="0" anchor="ctr"/>
+          <a:lstStyle/>
+          <a:p>
+            <a:pPr algn="ctr"/>
+            <a:r>
+              <a:rPr lang="en-US" sz="1200" dirty="0" smtClean="0"/>
+              <a:t>Block the calendar </a:t>
+            </a:r>
+            <a:r>
+              <a:rPr lang="en-US" sz="1200" dirty="0" smtClean="0"/>
+              <a:t>of </a:t>
+            </a:r>
+            <a:r>
+              <a:rPr lang="en-US" sz="1200" dirty="0" smtClean="0"/>
+              <a:t>particular </a:t>
+            </a:r>
+            <a:r>
+              <a:rPr lang="en-US" sz="1200" dirty="0" smtClean="0"/>
+              <a:t>place permanently</a:t>
+            </a:r>
+            <a:endParaRPr lang="en-IN" dirty="0"/>
+          </a:p>
+        </p:txBody>
+      </p:sp>
+      <p:cxnSp>
+        <p:nvCxnSpPr>
+          <p:cNvPr id="59" name="Elbow Connector 58"/>
+          <p:cNvCxnSpPr>
+            <a:stCxn id="15" idx="3"/>
+            <a:endCxn id="126" idx="1"/>
+          </p:cNvCxnSpPr>
+          <p:nvPr/>
+        </p:nvCxnSpPr>
+        <p:spPr>
+          <a:xfrm>
+            <a:off x="5803304" y="6226365"/>
+            <a:ext cx="1072952" cy="1"/>
+          </a:xfrm>
+          <a:prstGeom prst="bentConnector3">
             <a:avLst/>
           </a:prstGeom>
           <a:ln>
@@ -5751,7 +8465,7 @@
     </p:spTree>
     <p:extLst>
       <p:ext uri="{BB962C8B-B14F-4D97-AF65-F5344CB8AC3E}">
-        <p14:creationId xmlns:p14="http://schemas.microsoft.com/office/powerpoint/2010/main" val="3038813677"/>
+        <p14:creationId xmlns:p14="http://schemas.microsoft.com/office/powerpoint/2010/main" val="2135036576"/>
       </p:ext>
     </p:extLst>
   </p:cSld>

</xml_diff>

<commit_message>
added pages description sheet
</commit_message>
<xml_diff>
--- a/notes/Business_flows.pptx
+++ b/notes/Business_flows.pptx
@@ -193,7 +193,7 @@
           <a:p>
             <a:fld id="{60825F2C-8D08-44C5-926C-CBDA2DB8FD2F}" type="datetimeFigureOut">
               <a:rPr lang="en-IN" smtClean="0"/>
-              <a:t>31-07-2014</a:t>
+              <a:t>01-08-2014</a:t>
             </a:fld>
             <a:endParaRPr lang="en-IN"/>
           </a:p>
@@ -810,7 +810,7 @@
           <a:p>
             <a:fld id="{73C863D0-9706-484E-A6D1-914164D7E8BF}" type="datetimeFigureOut">
               <a:rPr lang="en-IN" smtClean="0"/>
-              <a:t>31-07-2014</a:t>
+              <a:t>01-08-2014</a:t>
             </a:fld>
             <a:endParaRPr lang="en-IN"/>
           </a:p>
@@ -980,7 +980,7 @@
           <a:p>
             <a:fld id="{73C863D0-9706-484E-A6D1-914164D7E8BF}" type="datetimeFigureOut">
               <a:rPr lang="en-IN" smtClean="0"/>
-              <a:t>31-07-2014</a:t>
+              <a:t>01-08-2014</a:t>
             </a:fld>
             <a:endParaRPr lang="en-IN"/>
           </a:p>
@@ -1160,7 +1160,7 @@
           <a:p>
             <a:fld id="{73C863D0-9706-484E-A6D1-914164D7E8BF}" type="datetimeFigureOut">
               <a:rPr lang="en-IN" smtClean="0"/>
-              <a:t>31-07-2014</a:t>
+              <a:t>01-08-2014</a:t>
             </a:fld>
             <a:endParaRPr lang="en-IN"/>
           </a:p>
@@ -1330,7 +1330,7 @@
           <a:p>
             <a:fld id="{73C863D0-9706-484E-A6D1-914164D7E8BF}" type="datetimeFigureOut">
               <a:rPr lang="en-IN" smtClean="0"/>
-              <a:t>31-07-2014</a:t>
+              <a:t>01-08-2014</a:t>
             </a:fld>
             <a:endParaRPr lang="en-IN"/>
           </a:p>
@@ -1576,7 +1576,7 @@
           <a:p>
             <a:fld id="{73C863D0-9706-484E-A6D1-914164D7E8BF}" type="datetimeFigureOut">
               <a:rPr lang="en-IN" smtClean="0"/>
-              <a:t>31-07-2014</a:t>
+              <a:t>01-08-2014</a:t>
             </a:fld>
             <a:endParaRPr lang="en-IN"/>
           </a:p>
@@ -1864,7 +1864,7 @@
           <a:p>
             <a:fld id="{73C863D0-9706-484E-A6D1-914164D7E8BF}" type="datetimeFigureOut">
               <a:rPr lang="en-IN" smtClean="0"/>
-              <a:t>31-07-2014</a:t>
+              <a:t>01-08-2014</a:t>
             </a:fld>
             <a:endParaRPr lang="en-IN"/>
           </a:p>
@@ -2286,7 +2286,7 @@
           <a:p>
             <a:fld id="{73C863D0-9706-484E-A6D1-914164D7E8BF}" type="datetimeFigureOut">
               <a:rPr lang="en-IN" smtClean="0"/>
-              <a:t>31-07-2014</a:t>
+              <a:t>01-08-2014</a:t>
             </a:fld>
             <a:endParaRPr lang="en-IN"/>
           </a:p>
@@ -2404,7 +2404,7 @@
           <a:p>
             <a:fld id="{73C863D0-9706-484E-A6D1-914164D7E8BF}" type="datetimeFigureOut">
               <a:rPr lang="en-IN" smtClean="0"/>
-              <a:t>31-07-2014</a:t>
+              <a:t>01-08-2014</a:t>
             </a:fld>
             <a:endParaRPr lang="en-IN"/>
           </a:p>
@@ -2499,7 +2499,7 @@
           <a:p>
             <a:fld id="{73C863D0-9706-484E-A6D1-914164D7E8BF}" type="datetimeFigureOut">
               <a:rPr lang="en-IN" smtClean="0"/>
-              <a:t>31-07-2014</a:t>
+              <a:t>01-08-2014</a:t>
             </a:fld>
             <a:endParaRPr lang="en-IN"/>
           </a:p>
@@ -2776,7 +2776,7 @@
           <a:p>
             <a:fld id="{73C863D0-9706-484E-A6D1-914164D7E8BF}" type="datetimeFigureOut">
               <a:rPr lang="en-IN" smtClean="0"/>
-              <a:t>31-07-2014</a:t>
+              <a:t>01-08-2014</a:t>
             </a:fld>
             <a:endParaRPr lang="en-IN"/>
           </a:p>
@@ -3029,7 +3029,7 @@
           <a:p>
             <a:fld id="{73C863D0-9706-484E-A6D1-914164D7E8BF}" type="datetimeFigureOut">
               <a:rPr lang="en-IN" smtClean="0"/>
-              <a:t>31-07-2014</a:t>
+              <a:t>01-08-2014</a:t>
             </a:fld>
             <a:endParaRPr lang="en-IN"/>
           </a:p>
@@ -3242,7 +3242,7 @@
           <a:p>
             <a:fld id="{73C863D0-9706-484E-A6D1-914164D7E8BF}" type="datetimeFigureOut">
               <a:rPr lang="en-IN" smtClean="0"/>
-              <a:t>31-07-2014</a:t>
+              <a:t>01-08-2014</a:t>
             </a:fld>
             <a:endParaRPr lang="en-IN"/>
           </a:p>
@@ -3690,15 +3690,7 @@
             <a:p>
               <a:r>
                 <a:rPr lang="en-US" sz="1400" dirty="0" smtClean="0"/>
-                <a:t>Order processing: </a:t>
-              </a:r>
-              <a:r>
-                <a:rPr lang="en-US" sz="1400" dirty="0" smtClean="0"/>
-                <a:t>first </a:t>
-              </a:r>
-              <a:r>
-                <a:rPr lang="en-US" sz="1400" dirty="0" smtClean="0"/>
-                <a:t>preference: NO, further preferences YES/NO </a:t>
+                <a:t>Order processing: first preference: NO, further preferences YES/NO </a:t>
               </a:r>
               <a:endParaRPr lang="en-IN" sz="1400" dirty="0"/>
             </a:p>
@@ -5114,11 +5106,7 @@
             <a:p>
               <a:r>
                 <a:rPr lang="en-US" sz="1200" dirty="0" smtClean="0"/>
-                <a:t>Then </a:t>
-              </a:r>
-              <a:r>
-                <a:rPr lang="en-US" sz="1200" dirty="0" smtClean="0"/>
-                <a:t>check with similar places</a:t>
+                <a:t>Then check with similar places</a:t>
               </a:r>
               <a:endParaRPr lang="en-IN" sz="1200" dirty="0"/>
             </a:p>
@@ -5204,11 +5192,7 @@
             <a:p>
               <a:r>
                 <a:rPr lang="en-US" sz="1200" dirty="0" smtClean="0"/>
-                <a:t>Request </a:t>
-              </a:r>
-              <a:r>
-                <a:rPr lang="en-US" sz="1200" dirty="0" smtClean="0"/>
-                <a:t>user to browse further</a:t>
+                <a:t>Request user to browse further</a:t>
               </a:r>
               <a:endParaRPr lang="en-IN" sz="1200" dirty="0"/>
             </a:p>
@@ -5636,11 +5620,7 @@
             <a:p>
               <a:r>
                 <a:rPr lang="en-US" sz="1200" dirty="0" smtClean="0"/>
-                <a:t>Payment </a:t>
-              </a:r>
-              <a:r>
-                <a:rPr lang="en-US" sz="1200" dirty="0" smtClean="0"/>
-                <a:t>request</a:t>
+                <a:t>Payment request</a:t>
               </a:r>
               <a:endParaRPr lang="en-IN" sz="1200" dirty="0"/>
             </a:p>
@@ -5688,11 +5668,7 @@
             <a:pPr algn="ctr"/>
             <a:r>
               <a:rPr lang="en-US" sz="1200" dirty="0" smtClean="0"/>
-              <a:t>Block the calendar for particular </a:t>
-            </a:r>
-            <a:r>
-              <a:rPr lang="en-US" sz="1200" dirty="0" smtClean="0"/>
-              <a:t>place for 1Hr</a:t>
+              <a:t>Block the calendar for particular place for 1Hr</a:t>
             </a:r>
             <a:endParaRPr lang="en-IN" dirty="0"/>
           </a:p>
@@ -5961,7 +5937,6 @@
                 <a:rPr lang="en-US" sz="1200" dirty="0" smtClean="0"/>
                 <a:t>Payment </a:t>
               </a:r>
-              <a:endParaRPr lang="en-US" sz="1200" dirty="0" smtClean="0"/>
             </a:p>
             <a:p>
               <a:r>
@@ -6151,19 +6126,7 @@
             <a:pPr algn="ctr"/>
             <a:r>
               <a:rPr lang="en-US" sz="1200" dirty="0" smtClean="0"/>
-              <a:t>Block the calendar </a:t>
-            </a:r>
-            <a:r>
-              <a:rPr lang="en-US" sz="1200" dirty="0" smtClean="0"/>
-              <a:t>of </a:t>
-            </a:r>
-            <a:r>
-              <a:rPr lang="en-US" sz="1200" dirty="0" smtClean="0"/>
-              <a:t>particular </a:t>
-            </a:r>
-            <a:r>
-              <a:rPr lang="en-US" sz="1200" dirty="0" smtClean="0"/>
-              <a:t>place permanently</a:t>
+              <a:t>Block the calendar of particular place permanently</a:t>
             </a:r>
             <a:endParaRPr lang="en-IN" dirty="0"/>
           </a:p>
@@ -6320,11 +6283,7 @@
             <a:p>
               <a:r>
                 <a:rPr lang="en-US" sz="1200" dirty="0" smtClean="0"/>
-                <a:t>Booking  </a:t>
-              </a:r>
-              <a:r>
-                <a:rPr lang="en-US" sz="1200" dirty="0" smtClean="0"/>
-                <a:t>enquiry</a:t>
+                <a:t>Booking  enquiry</a:t>
               </a:r>
             </a:p>
             <a:p>
@@ -6447,19 +6406,7 @@
             <a:p>
               <a:r>
                 <a:rPr lang="en-US" sz="1400" dirty="0" smtClean="0"/>
-                <a:t>Order processing: </a:t>
-              </a:r>
-              <a:r>
-                <a:rPr lang="en-US" sz="1400" dirty="0" smtClean="0"/>
-                <a:t>first </a:t>
-              </a:r>
-              <a:r>
-                <a:rPr lang="en-US" sz="1400" dirty="0" smtClean="0"/>
-                <a:t>preference: </a:t>
-              </a:r>
-              <a:r>
-                <a:rPr lang="en-US" sz="1400" dirty="0" smtClean="0"/>
-                <a:t>YES</a:t>
+                <a:t>Order processing: first preference: YES</a:t>
               </a:r>
               <a:endParaRPr lang="en-IN" sz="1400" dirty="0"/>
             </a:p>
@@ -6832,11 +6779,7 @@
             <a:p>
               <a:r>
                 <a:rPr lang="en-US" sz="1200" dirty="0" smtClean="0"/>
-                <a:t>Booking  </a:t>
-              </a:r>
-              <a:r>
-                <a:rPr lang="en-US" sz="1200" dirty="0" smtClean="0"/>
-                <a:t>enquiry</a:t>
+                <a:t>Booking  enquiry</a:t>
               </a:r>
             </a:p>
             <a:p>
@@ -7646,11 +7589,7 @@
             <a:p>
               <a:r>
                 <a:rPr lang="en-US" sz="1200" dirty="0" smtClean="0"/>
-                <a:t>Payment </a:t>
-              </a:r>
-              <a:r>
-                <a:rPr lang="en-US" sz="1200" dirty="0" smtClean="0"/>
-                <a:t>request</a:t>
+                <a:t>Payment request</a:t>
               </a:r>
               <a:endParaRPr lang="en-IN" sz="1200" dirty="0"/>
             </a:p>
@@ -7698,19 +7637,7 @@
             <a:pPr algn="ctr"/>
             <a:r>
               <a:rPr lang="en-US" sz="1200" dirty="0" smtClean="0"/>
-              <a:t>Block the calendar </a:t>
-            </a:r>
-            <a:r>
-              <a:rPr lang="en-US" sz="1200" dirty="0" smtClean="0"/>
-              <a:t>of </a:t>
-            </a:r>
-            <a:r>
-              <a:rPr lang="en-US" sz="1200" dirty="0" smtClean="0"/>
-              <a:t>particular </a:t>
-            </a:r>
-            <a:r>
-              <a:rPr lang="en-US" sz="1200" dirty="0" smtClean="0"/>
-              <a:t>place for 1Hr</a:t>
+              <a:t>Block the calendar of particular place for 1Hr</a:t>
             </a:r>
             <a:endParaRPr lang="en-IN" dirty="0"/>
           </a:p>
@@ -8218,7 +8145,6 @@
                 <a:rPr lang="en-US" sz="1200" dirty="0" smtClean="0"/>
                 <a:t>Payment </a:t>
               </a:r>
-              <a:endParaRPr lang="en-US" sz="1200" dirty="0" smtClean="0"/>
             </a:p>
             <a:p>
               <a:r>
@@ -8408,19 +8334,7 @@
             <a:pPr algn="ctr"/>
             <a:r>
               <a:rPr lang="en-US" sz="1200" dirty="0" smtClean="0"/>
-              <a:t>Block the calendar </a:t>
-            </a:r>
-            <a:r>
-              <a:rPr lang="en-US" sz="1200" dirty="0" smtClean="0"/>
-              <a:t>of </a:t>
-            </a:r>
-            <a:r>
-              <a:rPr lang="en-US" sz="1200" dirty="0" smtClean="0"/>
-              <a:t>particular </a:t>
-            </a:r>
-            <a:r>
-              <a:rPr lang="en-US" sz="1200" dirty="0" smtClean="0"/>
-              <a:t>place permanently</a:t>
+              <a:t>Block the calendar of particular place permanently</a:t>
             </a:r>
             <a:endParaRPr lang="en-IN" dirty="0"/>
           </a:p>

</xml_diff>

<commit_message>
added order management and database tables
</commit_message>
<xml_diff>
--- a/notes/Business_flows.pptx
+++ b/notes/Business_flows.pptx
@@ -5,11 +5,14 @@
     <p:sldMasterId id="2147483648" r:id="rId1"/>
   </p:sldMasterIdLst>
   <p:notesMasterIdLst>
-    <p:notesMasterId r:id="rId4"/>
+    <p:notesMasterId r:id="rId7"/>
   </p:notesMasterIdLst>
   <p:sldIdLst>
     <p:sldId id="257" r:id="rId2"/>
-    <p:sldId id="258" r:id="rId3"/>
+    <p:sldId id="260" r:id="rId3"/>
+    <p:sldId id="261" r:id="rId4"/>
+    <p:sldId id="258" r:id="rId5"/>
+    <p:sldId id="259" r:id="rId6"/>
   </p:sldIdLst>
   <p:sldSz cx="9144000" cy="6858000" type="screen4x3"/>
   <p:notesSz cx="6858000" cy="9144000"/>
@@ -611,6 +614,90 @@
             <a:fld id="{76C21F45-62E2-45F0-9269-DC91EBB6FBC8}" type="slidenum">
               <a:rPr lang="en-IN" smtClean="0"/>
               <a:t>2</a:t>
+            </a:fld>
+            <a:endParaRPr lang="en-IN"/>
+          </a:p>
+        </p:txBody>
+      </p:sp>
+    </p:spTree>
+    <p:extLst>
+      <p:ext uri="{BB962C8B-B14F-4D97-AF65-F5344CB8AC3E}">
+        <p14:creationId xmlns:p14="http://schemas.microsoft.com/office/powerpoint/2010/main" val="1164041060"/>
+      </p:ext>
+    </p:extLst>
+  </p:cSld>
+  <p:clrMapOvr>
+    <a:masterClrMapping/>
+  </p:clrMapOvr>
+</p:notes>
+</file>
+
+<file path=ppt/notesSlides/notesSlide3.xml><?xml version="1.0" encoding="utf-8"?>
+<p:notes xmlns:a="http://schemas.openxmlformats.org/drawingml/2006/main" xmlns:r="http://schemas.openxmlformats.org/officeDocument/2006/relationships" xmlns:p="http://schemas.openxmlformats.org/presentationml/2006/main">
+  <p:cSld>
+    <p:spTree>
+      <p:nvGrpSpPr>
+        <p:cNvPr id="1" name=""/>
+        <p:cNvGrpSpPr/>
+        <p:nvPr/>
+      </p:nvGrpSpPr>
+      <p:grpSpPr>
+        <a:xfrm>
+          <a:off x="0" y="0"/>
+          <a:ext cx="0" cy="0"/>
+          <a:chOff x="0" y="0"/>
+          <a:chExt cx="0" cy="0"/>
+        </a:xfrm>
+      </p:grpSpPr>
+      <p:sp>
+        <p:nvSpPr>
+          <p:cNvPr id="2" name="Slide Image Placeholder 1"/>
+          <p:cNvSpPr>
+            <a:spLocks noGrp="1" noRot="1" noChangeAspect="1"/>
+          </p:cNvSpPr>
+          <p:nvPr>
+            <p:ph type="sldImg"/>
+          </p:nvPr>
+        </p:nvSpPr>
+        <p:spPr/>
+      </p:sp>
+      <p:sp>
+        <p:nvSpPr>
+          <p:cNvPr id="3" name="Notes Placeholder 2"/>
+          <p:cNvSpPr>
+            <a:spLocks noGrp="1"/>
+          </p:cNvSpPr>
+          <p:nvPr>
+            <p:ph type="body" idx="1"/>
+          </p:nvPr>
+        </p:nvSpPr>
+        <p:spPr/>
+        <p:txBody>
+          <a:bodyPr/>
+          <a:lstStyle/>
+          <a:p>
+            <a:endParaRPr lang="en-IN"/>
+          </a:p>
+        </p:txBody>
+      </p:sp>
+      <p:sp>
+        <p:nvSpPr>
+          <p:cNvPr id="4" name="Slide Number Placeholder 3"/>
+          <p:cNvSpPr>
+            <a:spLocks noGrp="1"/>
+          </p:cNvSpPr>
+          <p:nvPr>
+            <p:ph type="sldNum" sz="quarter" idx="10"/>
+          </p:nvPr>
+        </p:nvSpPr>
+        <p:spPr/>
+        <p:txBody>
+          <a:bodyPr/>
+          <a:lstStyle/>
+          <a:p>
+            <a:fld id="{76C21F45-62E2-45F0-9269-DC91EBB6FBC8}" type="slidenum">
+              <a:rPr lang="en-IN" smtClean="0"/>
+              <a:t>4</a:t>
             </a:fld>
             <a:endParaRPr lang="en-IN"/>
           </a:p>
@@ -6335,6 +6422,3290 @@
       </p:grpSpPr>
       <p:grpSp>
         <p:nvGrpSpPr>
+          <p:cNvPr id="14" name="Group 13"/>
+          <p:cNvGrpSpPr/>
+          <p:nvPr/>
+        </p:nvGrpSpPr>
+        <p:grpSpPr>
+          <a:xfrm>
+            <a:off x="0" y="24880"/>
+            <a:ext cx="9144000" cy="307777"/>
+            <a:chOff x="0" y="24880"/>
+            <a:chExt cx="9144000" cy="307777"/>
+          </a:xfrm>
+        </p:grpSpPr>
+        <p:cxnSp>
+          <p:nvCxnSpPr>
+            <p:cNvPr id="15" name="Straight Connector 14"/>
+            <p:cNvCxnSpPr/>
+            <p:nvPr/>
+          </p:nvCxnSpPr>
+          <p:spPr>
+            <a:xfrm>
+              <a:off x="0" y="332656"/>
+              <a:ext cx="9144000" cy="0"/>
+            </a:xfrm>
+            <a:prstGeom prst="line">
+              <a:avLst/>
+            </a:prstGeom>
+            <a:ln>
+              <a:solidFill>
+                <a:srgbClr val="FFC000"/>
+              </a:solidFill>
+            </a:ln>
+          </p:spPr>
+          <p:style>
+            <a:lnRef idx="1">
+              <a:schemeClr val="accent1"/>
+            </a:lnRef>
+            <a:fillRef idx="0">
+              <a:schemeClr val="accent1"/>
+            </a:fillRef>
+            <a:effectRef idx="0">
+              <a:schemeClr val="accent1"/>
+            </a:effectRef>
+            <a:fontRef idx="minor">
+              <a:schemeClr val="tx1"/>
+            </a:fontRef>
+          </p:style>
+        </p:cxnSp>
+        <p:sp>
+          <p:nvSpPr>
+            <p:cNvPr id="16" name="TextBox 15"/>
+            <p:cNvSpPr txBox="1"/>
+            <p:nvPr/>
+          </p:nvSpPr>
+          <p:spPr>
+            <a:xfrm>
+              <a:off x="35496" y="24880"/>
+              <a:ext cx="7704856" cy="307777"/>
+            </a:xfrm>
+            <a:prstGeom prst="rect">
+              <a:avLst/>
+            </a:prstGeom>
+            <a:noFill/>
+          </p:spPr>
+          <p:txBody>
+            <a:bodyPr wrap="square" rtlCol="0">
+              <a:spAutoFit/>
+            </a:bodyPr>
+            <a:lstStyle/>
+            <a:p>
+              <a:r>
+                <a:rPr lang="en-US" sz="1400" dirty="0" smtClean="0"/>
+                <a:t>Order </a:t>
+              </a:r>
+              <a:r>
+                <a:rPr lang="en-US" sz="1400" dirty="0" smtClean="0"/>
+                <a:t>management</a:t>
+              </a:r>
+              <a:endParaRPr lang="en-IN" sz="1400" dirty="0"/>
+            </a:p>
+          </p:txBody>
+        </p:sp>
+      </p:grpSp>
+      <p:sp>
+        <p:nvSpPr>
+          <p:cNvPr id="12" name="Rectangle 11"/>
+          <p:cNvSpPr/>
+          <p:nvPr/>
+        </p:nvSpPr>
+        <p:spPr>
+          <a:xfrm>
+            <a:off x="179512" y="476672"/>
+            <a:ext cx="1368152" cy="360040"/>
+          </a:xfrm>
+          <a:prstGeom prst="rect">
+            <a:avLst/>
+          </a:prstGeom>
+        </p:spPr>
+        <p:style>
+          <a:lnRef idx="2">
+            <a:schemeClr val="accent6"/>
+          </a:lnRef>
+          <a:fillRef idx="1">
+            <a:schemeClr val="lt1"/>
+          </a:fillRef>
+          <a:effectRef idx="0">
+            <a:schemeClr val="accent6"/>
+          </a:effectRef>
+          <a:fontRef idx="minor">
+            <a:schemeClr val="dk1"/>
+          </a:fontRef>
+        </p:style>
+        <p:txBody>
+          <a:bodyPr rtlCol="0" anchor="ctr"/>
+          <a:lstStyle/>
+          <a:p>
+            <a:pPr algn="ctr"/>
+            <a:r>
+              <a:rPr lang="en-US" sz="1200" dirty="0" smtClean="0"/>
+              <a:t>Submit booking</a:t>
+            </a:r>
+            <a:endParaRPr lang="en-IN" sz="1200" dirty="0"/>
+          </a:p>
+        </p:txBody>
+      </p:sp>
+      <p:sp>
+        <p:nvSpPr>
+          <p:cNvPr id="18" name="Rectangle 17"/>
+          <p:cNvSpPr/>
+          <p:nvPr/>
+        </p:nvSpPr>
+        <p:spPr>
+          <a:xfrm>
+            <a:off x="179512" y="1124744"/>
+            <a:ext cx="1368152" cy="360040"/>
+          </a:xfrm>
+          <a:prstGeom prst="rect">
+            <a:avLst/>
+          </a:prstGeom>
+        </p:spPr>
+        <p:style>
+          <a:lnRef idx="2">
+            <a:schemeClr val="accent6"/>
+          </a:lnRef>
+          <a:fillRef idx="1">
+            <a:schemeClr val="lt1"/>
+          </a:fillRef>
+          <a:effectRef idx="0">
+            <a:schemeClr val="accent6"/>
+          </a:effectRef>
+          <a:fontRef idx="minor">
+            <a:schemeClr val="dk1"/>
+          </a:fontRef>
+        </p:style>
+        <p:txBody>
+          <a:bodyPr rtlCol="0" anchor="ctr"/>
+          <a:lstStyle/>
+          <a:p>
+            <a:pPr algn="ctr"/>
+            <a:r>
+              <a:rPr lang="en-US" sz="1200" dirty="0" smtClean="0"/>
+              <a:t>Generate booking reference number</a:t>
+            </a:r>
+            <a:endParaRPr lang="en-IN" sz="1200" dirty="0"/>
+          </a:p>
+        </p:txBody>
+      </p:sp>
+      <p:sp>
+        <p:nvSpPr>
+          <p:cNvPr id="19" name="Rectangle 18"/>
+          <p:cNvSpPr/>
+          <p:nvPr/>
+        </p:nvSpPr>
+        <p:spPr>
+          <a:xfrm>
+            <a:off x="1907704" y="1124744"/>
+            <a:ext cx="1368152" cy="360040"/>
+          </a:xfrm>
+          <a:prstGeom prst="rect">
+            <a:avLst/>
+          </a:prstGeom>
+        </p:spPr>
+        <p:style>
+          <a:lnRef idx="2">
+            <a:schemeClr val="accent6"/>
+          </a:lnRef>
+          <a:fillRef idx="1">
+            <a:schemeClr val="lt1"/>
+          </a:fillRef>
+          <a:effectRef idx="0">
+            <a:schemeClr val="accent6"/>
+          </a:effectRef>
+          <a:fontRef idx="minor">
+            <a:schemeClr val="dk1"/>
+          </a:fontRef>
+        </p:style>
+        <p:txBody>
+          <a:bodyPr rtlCol="0" anchor="ctr"/>
+          <a:lstStyle/>
+          <a:p>
+            <a:pPr algn="ctr"/>
+            <a:r>
+              <a:rPr lang="en-US" sz="1200" dirty="0" smtClean="0"/>
+              <a:t>Get the booking and user details</a:t>
+            </a:r>
+            <a:endParaRPr lang="en-IN" sz="1200" dirty="0"/>
+          </a:p>
+        </p:txBody>
+      </p:sp>
+      <p:cxnSp>
+        <p:nvCxnSpPr>
+          <p:cNvPr id="20" name="Straight Arrow Connector 19"/>
+          <p:cNvCxnSpPr>
+            <a:stCxn id="12" idx="2"/>
+            <a:endCxn id="18" idx="0"/>
+          </p:cNvCxnSpPr>
+          <p:nvPr/>
+        </p:nvCxnSpPr>
+        <p:spPr>
+          <a:xfrm>
+            <a:off x="863588" y="836712"/>
+            <a:ext cx="0" cy="288032"/>
+          </a:xfrm>
+          <a:prstGeom prst="straightConnector1">
+            <a:avLst/>
+          </a:prstGeom>
+          <a:ln>
+            <a:tailEnd type="arrow"/>
+          </a:ln>
+        </p:spPr>
+        <p:style>
+          <a:lnRef idx="1">
+            <a:schemeClr val="accent1"/>
+          </a:lnRef>
+          <a:fillRef idx="0">
+            <a:schemeClr val="accent1"/>
+          </a:fillRef>
+          <a:effectRef idx="0">
+            <a:schemeClr val="accent1"/>
+          </a:effectRef>
+          <a:fontRef idx="minor">
+            <a:schemeClr val="tx1"/>
+          </a:fontRef>
+        </p:style>
+      </p:cxnSp>
+      <p:cxnSp>
+        <p:nvCxnSpPr>
+          <p:cNvPr id="22" name="Elbow Connector 21"/>
+          <p:cNvCxnSpPr>
+            <a:stCxn id="12" idx="2"/>
+            <a:endCxn id="19" idx="0"/>
+          </p:cNvCxnSpPr>
+          <p:nvPr/>
+        </p:nvCxnSpPr>
+        <p:spPr>
+          <a:xfrm rot="16200000" flipH="1">
+            <a:off x="1583668" y="116632"/>
+            <a:ext cx="288032" cy="1728192"/>
+          </a:xfrm>
+          <a:prstGeom prst="bentConnector3">
+            <a:avLst/>
+          </a:prstGeom>
+          <a:ln>
+            <a:tailEnd type="arrow"/>
+          </a:ln>
+        </p:spPr>
+        <p:style>
+          <a:lnRef idx="1">
+            <a:schemeClr val="accent1"/>
+          </a:lnRef>
+          <a:fillRef idx="0">
+            <a:schemeClr val="accent1"/>
+          </a:fillRef>
+          <a:effectRef idx="0">
+            <a:schemeClr val="accent1"/>
+          </a:effectRef>
+          <a:fontRef idx="minor">
+            <a:schemeClr val="tx1"/>
+          </a:fontRef>
+        </p:style>
+      </p:cxnSp>
+      <p:sp>
+        <p:nvSpPr>
+          <p:cNvPr id="24" name="Rectangle 23"/>
+          <p:cNvSpPr/>
+          <p:nvPr/>
+        </p:nvSpPr>
+        <p:spPr>
+          <a:xfrm>
+            <a:off x="179512" y="1844824"/>
+            <a:ext cx="1368152" cy="360040"/>
+          </a:xfrm>
+          <a:prstGeom prst="rect">
+            <a:avLst/>
+          </a:prstGeom>
+        </p:spPr>
+        <p:style>
+          <a:lnRef idx="2">
+            <a:schemeClr val="accent6"/>
+          </a:lnRef>
+          <a:fillRef idx="1">
+            <a:schemeClr val="lt1"/>
+          </a:fillRef>
+          <a:effectRef idx="0">
+            <a:schemeClr val="accent6"/>
+          </a:effectRef>
+          <a:fontRef idx="minor">
+            <a:schemeClr val="dk1"/>
+          </a:fontRef>
+        </p:style>
+        <p:txBody>
+          <a:bodyPr rtlCol="0" anchor="ctr"/>
+          <a:lstStyle/>
+          <a:p>
+            <a:pPr algn="ctr"/>
+            <a:r>
+              <a:rPr lang="en-US" sz="1200" dirty="0" smtClean="0"/>
+              <a:t>Mail the details to agent and user</a:t>
+            </a:r>
+            <a:endParaRPr lang="en-IN" sz="1200" dirty="0"/>
+          </a:p>
+        </p:txBody>
+      </p:sp>
+      <p:cxnSp>
+        <p:nvCxnSpPr>
+          <p:cNvPr id="27" name="Straight Arrow Connector 26"/>
+          <p:cNvCxnSpPr>
+            <a:stCxn id="18" idx="2"/>
+            <a:endCxn id="24" idx="0"/>
+          </p:cNvCxnSpPr>
+          <p:nvPr/>
+        </p:nvCxnSpPr>
+        <p:spPr>
+          <a:xfrm>
+            <a:off x="863588" y="1484784"/>
+            <a:ext cx="0" cy="360040"/>
+          </a:xfrm>
+          <a:prstGeom prst="straightConnector1">
+            <a:avLst/>
+          </a:prstGeom>
+          <a:ln>
+            <a:tailEnd type="arrow"/>
+          </a:ln>
+        </p:spPr>
+        <p:style>
+          <a:lnRef idx="1">
+            <a:schemeClr val="accent1"/>
+          </a:lnRef>
+          <a:fillRef idx="0">
+            <a:schemeClr val="accent1"/>
+          </a:fillRef>
+          <a:effectRef idx="0">
+            <a:schemeClr val="accent1"/>
+          </a:effectRef>
+          <a:fontRef idx="minor">
+            <a:schemeClr val="tx1"/>
+          </a:fontRef>
+        </p:style>
+      </p:cxnSp>
+      <p:cxnSp>
+        <p:nvCxnSpPr>
+          <p:cNvPr id="29" name="Elbow Connector 28"/>
+          <p:cNvCxnSpPr>
+            <a:stCxn id="19" idx="2"/>
+            <a:endCxn id="24" idx="0"/>
+          </p:cNvCxnSpPr>
+          <p:nvPr/>
+        </p:nvCxnSpPr>
+        <p:spPr>
+          <a:xfrm rot="5400000">
+            <a:off x="1547664" y="800708"/>
+            <a:ext cx="360040" cy="1728192"/>
+          </a:xfrm>
+          <a:prstGeom prst="bentConnector3">
+            <a:avLst/>
+          </a:prstGeom>
+          <a:ln>
+            <a:tailEnd type="arrow"/>
+          </a:ln>
+        </p:spPr>
+        <p:style>
+          <a:lnRef idx="1">
+            <a:schemeClr val="accent1"/>
+          </a:lnRef>
+          <a:fillRef idx="0">
+            <a:schemeClr val="accent1"/>
+          </a:fillRef>
+          <a:effectRef idx="0">
+            <a:schemeClr val="accent1"/>
+          </a:effectRef>
+          <a:fontRef idx="minor">
+            <a:schemeClr val="tx1"/>
+          </a:fontRef>
+        </p:style>
+      </p:cxnSp>
+      <p:pic>
+        <p:nvPicPr>
+          <p:cNvPr id="32" name="Picture 5" descr="D:\MyWorkSpace\xampp\htdocs\bmhs\assets\img\bmhs\icons\email.png"/>
+          <p:cNvPicPr>
+            <a:picLocks noChangeAspect="1" noChangeArrowheads="1"/>
+          </p:cNvPicPr>
+          <p:nvPr/>
+        </p:nvPicPr>
+        <p:blipFill>
+          <a:blip r:embed="rId3" cstate="print">
+            <a:extLst>
+              <a:ext uri="{28A0092B-C50C-407E-A947-70E740481C1C}">
+                <a14:useLocalDpi xmlns:a14="http://schemas.microsoft.com/office/drawing/2010/main" val="0"/>
+              </a:ext>
+            </a:extLst>
+          </a:blip>
+          <a:srcRect/>
+          <a:stretch>
+            <a:fillRect/>
+          </a:stretch>
+        </p:blipFill>
+        <p:spPr bwMode="auto">
+          <a:xfrm>
+            <a:off x="1603433" y="1936148"/>
+            <a:ext cx="248502" cy="177392"/>
+          </a:xfrm>
+          <a:prstGeom prst="rect">
+            <a:avLst/>
+          </a:prstGeom>
+          <a:noFill/>
+          <a:extLst>
+            <a:ext uri="{909E8E84-426E-40DD-AFC4-6F175D3DCCD1}">
+              <a14:hiddenFill xmlns:a14="http://schemas.microsoft.com/office/drawing/2010/main">
+                <a:solidFill>
+                  <a:srgbClr val="FFFFFF"/>
+                </a:solidFill>
+              </a14:hiddenFill>
+            </a:ext>
+          </a:extLst>
+        </p:spPr>
+      </p:pic>
+      <p:sp>
+        <p:nvSpPr>
+          <p:cNvPr id="36" name="Rectangle 35"/>
+          <p:cNvSpPr/>
+          <p:nvPr/>
+        </p:nvSpPr>
+        <p:spPr>
+          <a:xfrm>
+            <a:off x="179512" y="2420888"/>
+            <a:ext cx="1368152" cy="360040"/>
+          </a:xfrm>
+          <a:prstGeom prst="rect">
+            <a:avLst/>
+          </a:prstGeom>
+        </p:spPr>
+        <p:style>
+          <a:lnRef idx="2">
+            <a:schemeClr val="accent1"/>
+          </a:lnRef>
+          <a:fillRef idx="1">
+            <a:schemeClr val="lt1"/>
+          </a:fillRef>
+          <a:effectRef idx="0">
+            <a:schemeClr val="accent1"/>
+          </a:effectRef>
+          <a:fontRef idx="minor">
+            <a:schemeClr val="dk1"/>
+          </a:fontRef>
+        </p:style>
+        <p:txBody>
+          <a:bodyPr rtlCol="0" anchor="ctr"/>
+          <a:lstStyle/>
+          <a:p>
+            <a:pPr algn="ctr"/>
+            <a:r>
+              <a:rPr lang="en-US" sz="1200" dirty="0" smtClean="0"/>
+              <a:t>back log</a:t>
+            </a:r>
+            <a:endParaRPr lang="en-IN" sz="1200" dirty="0"/>
+          </a:p>
+        </p:txBody>
+      </p:sp>
+      <p:sp>
+        <p:nvSpPr>
+          <p:cNvPr id="37" name="Rectangle 36"/>
+          <p:cNvSpPr/>
+          <p:nvPr/>
+        </p:nvSpPr>
+        <p:spPr>
+          <a:xfrm>
+            <a:off x="179512" y="2996952"/>
+            <a:ext cx="1368152" cy="360040"/>
+          </a:xfrm>
+          <a:prstGeom prst="rect">
+            <a:avLst/>
+          </a:prstGeom>
+        </p:spPr>
+        <p:style>
+          <a:lnRef idx="2">
+            <a:schemeClr val="accent1"/>
+          </a:lnRef>
+          <a:fillRef idx="1">
+            <a:schemeClr val="lt1"/>
+          </a:fillRef>
+          <a:effectRef idx="0">
+            <a:schemeClr val="accent1"/>
+          </a:effectRef>
+          <a:fontRef idx="minor">
+            <a:schemeClr val="dk1"/>
+          </a:fontRef>
+        </p:style>
+        <p:txBody>
+          <a:bodyPr rtlCol="0" anchor="ctr"/>
+          <a:lstStyle/>
+          <a:p>
+            <a:pPr algn="ctr"/>
+            <a:r>
+              <a:rPr lang="en-US" sz="1200" dirty="0" smtClean="0"/>
+              <a:t>processing</a:t>
+            </a:r>
+            <a:endParaRPr lang="en-IN" sz="1200" dirty="0"/>
+          </a:p>
+        </p:txBody>
+      </p:sp>
+      <p:sp>
+        <p:nvSpPr>
+          <p:cNvPr id="38" name="Rectangle 37"/>
+          <p:cNvSpPr/>
+          <p:nvPr/>
+        </p:nvSpPr>
+        <p:spPr>
+          <a:xfrm>
+            <a:off x="3779124" y="3501008"/>
+            <a:ext cx="1368152" cy="360040"/>
+          </a:xfrm>
+          <a:prstGeom prst="rect">
+            <a:avLst/>
+          </a:prstGeom>
+        </p:spPr>
+        <p:style>
+          <a:lnRef idx="2">
+            <a:schemeClr val="accent1"/>
+          </a:lnRef>
+          <a:fillRef idx="1">
+            <a:schemeClr val="lt1"/>
+          </a:fillRef>
+          <a:effectRef idx="0">
+            <a:schemeClr val="accent1"/>
+          </a:effectRef>
+          <a:fontRef idx="minor">
+            <a:schemeClr val="dk1"/>
+          </a:fontRef>
+        </p:style>
+        <p:txBody>
+          <a:bodyPr rtlCol="0" anchor="ctr"/>
+          <a:lstStyle/>
+          <a:p>
+            <a:pPr algn="ctr"/>
+            <a:r>
+              <a:rPr lang="en-US" sz="1200" dirty="0" smtClean="0"/>
+              <a:t>unsuccessful</a:t>
+            </a:r>
+            <a:endParaRPr lang="en-IN" sz="1200" dirty="0"/>
+          </a:p>
+        </p:txBody>
+      </p:sp>
+      <p:sp>
+        <p:nvSpPr>
+          <p:cNvPr id="39" name="Rectangle 38"/>
+          <p:cNvSpPr/>
+          <p:nvPr/>
+        </p:nvSpPr>
+        <p:spPr>
+          <a:xfrm>
+            <a:off x="5507316" y="3789040"/>
+            <a:ext cx="1368152" cy="360040"/>
+          </a:xfrm>
+          <a:prstGeom prst="rect">
+            <a:avLst/>
+          </a:prstGeom>
+        </p:spPr>
+        <p:style>
+          <a:lnRef idx="2">
+            <a:schemeClr val="accent1"/>
+          </a:lnRef>
+          <a:fillRef idx="1">
+            <a:schemeClr val="lt1"/>
+          </a:fillRef>
+          <a:effectRef idx="0">
+            <a:schemeClr val="accent1"/>
+          </a:effectRef>
+          <a:fontRef idx="minor">
+            <a:schemeClr val="dk1"/>
+          </a:fontRef>
+        </p:style>
+        <p:txBody>
+          <a:bodyPr rtlCol="0" anchor="ctr"/>
+          <a:lstStyle/>
+          <a:p>
+            <a:pPr algn="ctr"/>
+            <a:r>
+              <a:rPr lang="en-US" sz="1200" dirty="0" smtClean="0"/>
+              <a:t>Payment-pending</a:t>
+            </a:r>
+            <a:endParaRPr lang="en-IN" sz="1200" dirty="0"/>
+          </a:p>
+        </p:txBody>
+      </p:sp>
+      <p:sp>
+        <p:nvSpPr>
+          <p:cNvPr id="40" name="Diamond 39"/>
+          <p:cNvSpPr/>
+          <p:nvPr/>
+        </p:nvSpPr>
+        <p:spPr>
+          <a:xfrm>
+            <a:off x="4471024" y="2914180"/>
+            <a:ext cx="2071604" cy="537990"/>
+          </a:xfrm>
+          <a:prstGeom prst="diamond">
+            <a:avLst/>
+          </a:prstGeom>
+        </p:spPr>
+        <p:style>
+          <a:lnRef idx="2">
+            <a:schemeClr val="accent6"/>
+          </a:lnRef>
+          <a:fillRef idx="1">
+            <a:schemeClr val="lt1"/>
+          </a:fillRef>
+          <a:effectRef idx="0">
+            <a:schemeClr val="accent6"/>
+          </a:effectRef>
+          <a:fontRef idx="minor">
+            <a:schemeClr val="dk1"/>
+          </a:fontRef>
+        </p:style>
+        <p:txBody>
+          <a:bodyPr rtlCol="0" anchor="ctr"/>
+          <a:lstStyle/>
+          <a:p>
+            <a:pPr algn="ctr"/>
+            <a:r>
+              <a:rPr lang="en-US" sz="1200" dirty="0" smtClean="0"/>
+              <a:t>available</a:t>
+            </a:r>
+            <a:endParaRPr lang="en-IN" sz="1200" dirty="0"/>
+          </a:p>
+        </p:txBody>
+      </p:sp>
+      <p:cxnSp>
+        <p:nvCxnSpPr>
+          <p:cNvPr id="44" name="Straight Arrow Connector 43"/>
+          <p:cNvCxnSpPr>
+            <a:stCxn id="24" idx="2"/>
+            <a:endCxn id="36" idx="0"/>
+          </p:cNvCxnSpPr>
+          <p:nvPr/>
+        </p:nvCxnSpPr>
+        <p:spPr>
+          <a:xfrm>
+            <a:off x="863588" y="2204864"/>
+            <a:ext cx="0" cy="216024"/>
+          </a:xfrm>
+          <a:prstGeom prst="straightConnector1">
+            <a:avLst/>
+          </a:prstGeom>
+          <a:ln>
+            <a:tailEnd type="arrow"/>
+          </a:ln>
+        </p:spPr>
+        <p:style>
+          <a:lnRef idx="1">
+            <a:schemeClr val="accent1"/>
+          </a:lnRef>
+          <a:fillRef idx="0">
+            <a:schemeClr val="accent1"/>
+          </a:fillRef>
+          <a:effectRef idx="0">
+            <a:schemeClr val="accent1"/>
+          </a:effectRef>
+          <a:fontRef idx="minor">
+            <a:schemeClr val="tx1"/>
+          </a:fontRef>
+        </p:style>
+      </p:cxnSp>
+      <p:cxnSp>
+        <p:nvCxnSpPr>
+          <p:cNvPr id="46" name="Straight Arrow Connector 45"/>
+          <p:cNvCxnSpPr>
+            <a:stCxn id="36" idx="2"/>
+            <a:endCxn id="37" idx="0"/>
+          </p:cNvCxnSpPr>
+          <p:nvPr/>
+        </p:nvCxnSpPr>
+        <p:spPr>
+          <a:xfrm>
+            <a:off x="863588" y="2780928"/>
+            <a:ext cx="0" cy="216024"/>
+          </a:xfrm>
+          <a:prstGeom prst="straightConnector1">
+            <a:avLst/>
+          </a:prstGeom>
+          <a:ln>
+            <a:tailEnd type="arrow"/>
+          </a:ln>
+        </p:spPr>
+        <p:style>
+          <a:lnRef idx="1">
+            <a:schemeClr val="accent1"/>
+          </a:lnRef>
+          <a:fillRef idx="0">
+            <a:schemeClr val="accent1"/>
+          </a:fillRef>
+          <a:effectRef idx="0">
+            <a:schemeClr val="accent1"/>
+          </a:effectRef>
+          <a:fontRef idx="minor">
+            <a:schemeClr val="tx1"/>
+          </a:fontRef>
+        </p:style>
+      </p:cxnSp>
+      <p:cxnSp>
+        <p:nvCxnSpPr>
+          <p:cNvPr id="48" name="Elbow Connector 47"/>
+          <p:cNvCxnSpPr>
+            <a:stCxn id="40" idx="2"/>
+            <a:endCxn id="38" idx="3"/>
+          </p:cNvCxnSpPr>
+          <p:nvPr/>
+        </p:nvCxnSpPr>
+        <p:spPr>
+          <a:xfrm rot="5400000">
+            <a:off x="5212622" y="3386824"/>
+            <a:ext cx="228858" cy="359550"/>
+          </a:xfrm>
+          <a:prstGeom prst="bentConnector2">
+            <a:avLst/>
+          </a:prstGeom>
+          <a:ln>
+            <a:tailEnd type="arrow"/>
+          </a:ln>
+        </p:spPr>
+        <p:style>
+          <a:lnRef idx="1">
+            <a:schemeClr val="accent1"/>
+          </a:lnRef>
+          <a:fillRef idx="0">
+            <a:schemeClr val="accent1"/>
+          </a:fillRef>
+          <a:effectRef idx="0">
+            <a:schemeClr val="accent1"/>
+          </a:effectRef>
+          <a:fontRef idx="minor">
+            <a:schemeClr val="tx1"/>
+          </a:fontRef>
+        </p:style>
+      </p:cxnSp>
+      <p:sp>
+        <p:nvSpPr>
+          <p:cNvPr id="50" name="TextBox 49"/>
+          <p:cNvSpPr txBox="1"/>
+          <p:nvPr/>
+        </p:nvSpPr>
+        <p:spPr>
+          <a:xfrm>
+            <a:off x="5153133" y="3362509"/>
+            <a:ext cx="464190" cy="276998"/>
+          </a:xfrm>
+          <a:prstGeom prst="rect">
+            <a:avLst/>
+          </a:prstGeom>
+          <a:noFill/>
+        </p:spPr>
+        <p:txBody>
+          <a:bodyPr wrap="square" rtlCol="0">
+            <a:spAutoFit/>
+          </a:bodyPr>
+          <a:lstStyle/>
+          <a:p>
+            <a:r>
+              <a:rPr lang="en-US" sz="1200" dirty="0" smtClean="0"/>
+              <a:t>No</a:t>
+            </a:r>
+            <a:endParaRPr lang="en-IN" sz="1200" dirty="0"/>
+          </a:p>
+        </p:txBody>
+      </p:sp>
+      <p:cxnSp>
+        <p:nvCxnSpPr>
+          <p:cNvPr id="51" name="Elbow Connector 50"/>
+          <p:cNvCxnSpPr>
+            <a:stCxn id="40" idx="3"/>
+            <a:endCxn id="39" idx="3"/>
+          </p:cNvCxnSpPr>
+          <p:nvPr/>
+        </p:nvCxnSpPr>
+        <p:spPr>
+          <a:xfrm>
+            <a:off x="6542628" y="3183175"/>
+            <a:ext cx="332840" cy="785885"/>
+          </a:xfrm>
+          <a:prstGeom prst="bentConnector3">
+            <a:avLst>
+              <a:gd name="adj1" fmla="val 168682"/>
+            </a:avLst>
+          </a:prstGeom>
+          <a:ln>
+            <a:tailEnd type="arrow"/>
+          </a:ln>
+        </p:spPr>
+        <p:style>
+          <a:lnRef idx="1">
+            <a:schemeClr val="accent1"/>
+          </a:lnRef>
+          <a:fillRef idx="0">
+            <a:schemeClr val="accent1"/>
+          </a:fillRef>
+          <a:effectRef idx="0">
+            <a:schemeClr val="accent1"/>
+          </a:effectRef>
+          <a:fontRef idx="minor">
+            <a:schemeClr val="tx1"/>
+          </a:fontRef>
+        </p:style>
+      </p:cxnSp>
+      <p:sp>
+        <p:nvSpPr>
+          <p:cNvPr id="54" name="Rectangle 53"/>
+          <p:cNvSpPr/>
+          <p:nvPr/>
+        </p:nvSpPr>
+        <p:spPr>
+          <a:xfrm>
+            <a:off x="3779124" y="4077072"/>
+            <a:ext cx="1368152" cy="360040"/>
+          </a:xfrm>
+          <a:prstGeom prst="rect">
+            <a:avLst/>
+          </a:prstGeom>
+        </p:spPr>
+        <p:style>
+          <a:lnRef idx="2">
+            <a:schemeClr val="accent1"/>
+          </a:lnRef>
+          <a:fillRef idx="1">
+            <a:schemeClr val="lt1"/>
+          </a:fillRef>
+          <a:effectRef idx="0">
+            <a:schemeClr val="accent1"/>
+          </a:effectRef>
+          <a:fontRef idx="minor">
+            <a:schemeClr val="dk1"/>
+          </a:fontRef>
+        </p:style>
+        <p:txBody>
+          <a:bodyPr rtlCol="0" anchor="ctr"/>
+          <a:lstStyle/>
+          <a:p>
+            <a:pPr algn="ctr"/>
+            <a:r>
+              <a:rPr lang="en-US" sz="1200" dirty="0" smtClean="0"/>
+              <a:t>Enter the reason</a:t>
+            </a:r>
+            <a:endParaRPr lang="en-IN" sz="1200" dirty="0"/>
+          </a:p>
+        </p:txBody>
+      </p:sp>
+      <p:cxnSp>
+        <p:nvCxnSpPr>
+          <p:cNvPr id="55" name="Straight Arrow Connector 54"/>
+          <p:cNvCxnSpPr>
+            <a:stCxn id="38" idx="2"/>
+            <a:endCxn id="54" idx="0"/>
+          </p:cNvCxnSpPr>
+          <p:nvPr/>
+        </p:nvCxnSpPr>
+        <p:spPr>
+          <a:xfrm>
+            <a:off x="4463200" y="3861048"/>
+            <a:ext cx="0" cy="216024"/>
+          </a:xfrm>
+          <a:prstGeom prst="straightConnector1">
+            <a:avLst/>
+          </a:prstGeom>
+          <a:ln>
+            <a:tailEnd type="arrow"/>
+          </a:ln>
+        </p:spPr>
+        <p:style>
+          <a:lnRef idx="1">
+            <a:schemeClr val="accent1"/>
+          </a:lnRef>
+          <a:fillRef idx="0">
+            <a:schemeClr val="accent1"/>
+          </a:fillRef>
+          <a:effectRef idx="0">
+            <a:schemeClr val="accent1"/>
+          </a:effectRef>
+          <a:fontRef idx="minor">
+            <a:schemeClr val="tx1"/>
+          </a:fontRef>
+        </p:style>
+      </p:cxnSp>
+      <p:pic>
+        <p:nvPicPr>
+          <p:cNvPr id="58" name="Picture 5" descr="D:\MyWorkSpace\xampp\htdocs\bmhs\assets\img\bmhs\icons\email.png"/>
+          <p:cNvPicPr>
+            <a:picLocks noChangeAspect="1" noChangeArrowheads="1"/>
+          </p:cNvPicPr>
+          <p:nvPr/>
+        </p:nvPicPr>
+        <p:blipFill>
+          <a:blip r:embed="rId3" cstate="print">
+            <a:extLst>
+              <a:ext uri="{28A0092B-C50C-407E-A947-70E740481C1C}">
+                <a14:useLocalDpi xmlns:a14="http://schemas.microsoft.com/office/drawing/2010/main" val="0"/>
+              </a:ext>
+            </a:extLst>
+          </a:blip>
+          <a:srcRect/>
+          <a:stretch>
+            <a:fillRect/>
+          </a:stretch>
+        </p:blipFill>
+        <p:spPr bwMode="auto">
+          <a:xfrm>
+            <a:off x="4816042" y="4581128"/>
+            <a:ext cx="248502" cy="177392"/>
+          </a:xfrm>
+          <a:prstGeom prst="rect">
+            <a:avLst/>
+          </a:prstGeom>
+          <a:noFill/>
+          <a:extLst>
+            <a:ext uri="{909E8E84-426E-40DD-AFC4-6F175D3DCCD1}">
+              <a14:hiddenFill xmlns:a14="http://schemas.microsoft.com/office/drawing/2010/main">
+                <a:solidFill>
+                  <a:srgbClr val="FFFFFF"/>
+                </a:solidFill>
+              </a14:hiddenFill>
+            </a:ext>
+          </a:extLst>
+        </p:spPr>
+      </p:pic>
+      <p:sp>
+        <p:nvSpPr>
+          <p:cNvPr id="67" name="TextBox 66"/>
+          <p:cNvSpPr txBox="1"/>
+          <p:nvPr/>
+        </p:nvSpPr>
+        <p:spPr>
+          <a:xfrm>
+            <a:off x="6476953" y="2863970"/>
+            <a:ext cx="464190" cy="276998"/>
+          </a:xfrm>
+          <a:prstGeom prst="rect">
+            <a:avLst/>
+          </a:prstGeom>
+          <a:noFill/>
+        </p:spPr>
+        <p:txBody>
+          <a:bodyPr wrap="square" rtlCol="0">
+            <a:spAutoFit/>
+          </a:bodyPr>
+          <a:lstStyle/>
+          <a:p>
+            <a:r>
+              <a:rPr lang="en-US" sz="1200" dirty="0" smtClean="0"/>
+              <a:t>Yes</a:t>
+            </a:r>
+            <a:endParaRPr lang="en-IN" sz="1200" dirty="0"/>
+          </a:p>
+        </p:txBody>
+      </p:sp>
+      <p:sp>
+        <p:nvSpPr>
+          <p:cNvPr id="71" name="Diamond 70"/>
+          <p:cNvSpPr/>
+          <p:nvPr/>
+        </p:nvSpPr>
+        <p:spPr>
+          <a:xfrm>
+            <a:off x="3780240" y="5517232"/>
+            <a:ext cx="2071604" cy="537990"/>
+          </a:xfrm>
+          <a:prstGeom prst="diamond">
+            <a:avLst/>
+          </a:prstGeom>
+        </p:spPr>
+        <p:style>
+          <a:lnRef idx="2">
+            <a:schemeClr val="accent6"/>
+          </a:lnRef>
+          <a:fillRef idx="1">
+            <a:schemeClr val="lt1"/>
+          </a:fillRef>
+          <a:effectRef idx="0">
+            <a:schemeClr val="accent6"/>
+          </a:effectRef>
+          <a:fontRef idx="minor">
+            <a:schemeClr val="dk1"/>
+          </a:fontRef>
+        </p:style>
+        <p:txBody>
+          <a:bodyPr rtlCol="0" anchor="ctr"/>
+          <a:lstStyle/>
+          <a:p>
+            <a:pPr algn="ctr"/>
+            <a:r>
+              <a:rPr lang="en-US" sz="1200" dirty="0" smtClean="0"/>
+              <a:t>payment</a:t>
+            </a:r>
+            <a:endParaRPr lang="en-IN" sz="1200" dirty="0"/>
+          </a:p>
+        </p:txBody>
+      </p:sp>
+      <p:sp>
+        <p:nvSpPr>
+          <p:cNvPr id="84" name="Rectangle 83"/>
+          <p:cNvSpPr/>
+          <p:nvPr/>
+        </p:nvSpPr>
+        <p:spPr>
+          <a:xfrm>
+            <a:off x="3779124" y="4797152"/>
+            <a:ext cx="1368152" cy="360040"/>
+          </a:xfrm>
+          <a:prstGeom prst="rect">
+            <a:avLst/>
+          </a:prstGeom>
+        </p:spPr>
+        <p:style>
+          <a:lnRef idx="2">
+            <a:schemeClr val="accent6"/>
+          </a:lnRef>
+          <a:fillRef idx="1">
+            <a:schemeClr val="lt1"/>
+          </a:fillRef>
+          <a:effectRef idx="0">
+            <a:schemeClr val="accent6"/>
+          </a:effectRef>
+          <a:fontRef idx="minor">
+            <a:schemeClr val="dk1"/>
+          </a:fontRef>
+        </p:style>
+        <p:txBody>
+          <a:bodyPr rtlCol="0" anchor="ctr"/>
+          <a:lstStyle/>
+          <a:p>
+            <a:pPr algn="ctr"/>
+            <a:r>
+              <a:rPr lang="en-US" sz="1200" dirty="0" smtClean="0"/>
+              <a:t>Mail: status</a:t>
+            </a:r>
+            <a:endParaRPr lang="en-IN" sz="1200" dirty="0"/>
+          </a:p>
+        </p:txBody>
+      </p:sp>
+      <p:cxnSp>
+        <p:nvCxnSpPr>
+          <p:cNvPr id="1043" name="Straight Arrow Connector 1042"/>
+          <p:cNvCxnSpPr>
+            <a:stCxn id="54" idx="2"/>
+            <a:endCxn id="84" idx="0"/>
+          </p:cNvCxnSpPr>
+          <p:nvPr/>
+        </p:nvCxnSpPr>
+        <p:spPr>
+          <a:xfrm>
+            <a:off x="4463200" y="4437112"/>
+            <a:ext cx="0" cy="360040"/>
+          </a:xfrm>
+          <a:prstGeom prst="straightConnector1">
+            <a:avLst/>
+          </a:prstGeom>
+          <a:ln>
+            <a:tailEnd type="arrow"/>
+          </a:ln>
+        </p:spPr>
+        <p:style>
+          <a:lnRef idx="1">
+            <a:schemeClr val="accent1"/>
+          </a:lnRef>
+          <a:fillRef idx="0">
+            <a:schemeClr val="accent1"/>
+          </a:fillRef>
+          <a:effectRef idx="0">
+            <a:schemeClr val="accent1"/>
+          </a:effectRef>
+          <a:fontRef idx="minor">
+            <a:schemeClr val="tx1"/>
+          </a:fontRef>
+        </p:style>
+      </p:cxnSp>
+      <p:sp>
+        <p:nvSpPr>
+          <p:cNvPr id="87" name="Rectangle 86"/>
+          <p:cNvSpPr/>
+          <p:nvPr/>
+        </p:nvSpPr>
+        <p:spPr>
+          <a:xfrm>
+            <a:off x="5507316" y="4868894"/>
+            <a:ext cx="1368152" cy="360040"/>
+          </a:xfrm>
+          <a:prstGeom prst="rect">
+            <a:avLst/>
+          </a:prstGeom>
+        </p:spPr>
+        <p:style>
+          <a:lnRef idx="2">
+            <a:schemeClr val="accent6"/>
+          </a:lnRef>
+          <a:fillRef idx="1">
+            <a:schemeClr val="lt1"/>
+          </a:fillRef>
+          <a:effectRef idx="0">
+            <a:schemeClr val="accent6"/>
+          </a:effectRef>
+          <a:fontRef idx="minor">
+            <a:schemeClr val="dk1"/>
+          </a:fontRef>
+        </p:style>
+        <p:txBody>
+          <a:bodyPr rtlCol="0" anchor="ctr"/>
+          <a:lstStyle/>
+          <a:p>
+            <a:pPr algn="ctr"/>
+            <a:r>
+              <a:rPr lang="en-US" sz="1200" dirty="0" smtClean="0"/>
+              <a:t>Mail: status &amp; payment request</a:t>
+            </a:r>
+            <a:endParaRPr lang="en-IN" sz="1200" dirty="0"/>
+          </a:p>
+        </p:txBody>
+      </p:sp>
+      <p:cxnSp>
+        <p:nvCxnSpPr>
+          <p:cNvPr id="1045" name="Straight Arrow Connector 1044"/>
+          <p:cNvCxnSpPr>
+            <a:stCxn id="39" idx="2"/>
+            <a:endCxn id="87" idx="0"/>
+          </p:cNvCxnSpPr>
+          <p:nvPr/>
+        </p:nvCxnSpPr>
+        <p:spPr>
+          <a:xfrm>
+            <a:off x="6191392" y="4149080"/>
+            <a:ext cx="0" cy="719814"/>
+          </a:xfrm>
+          <a:prstGeom prst="straightConnector1">
+            <a:avLst/>
+          </a:prstGeom>
+          <a:ln>
+            <a:tailEnd type="arrow"/>
+          </a:ln>
+        </p:spPr>
+        <p:style>
+          <a:lnRef idx="1">
+            <a:schemeClr val="accent1"/>
+          </a:lnRef>
+          <a:fillRef idx="0">
+            <a:schemeClr val="accent1"/>
+          </a:fillRef>
+          <a:effectRef idx="0">
+            <a:schemeClr val="accent1"/>
+          </a:effectRef>
+          <a:fontRef idx="minor">
+            <a:schemeClr val="tx1"/>
+          </a:fontRef>
+        </p:style>
+      </p:cxnSp>
+      <p:cxnSp>
+        <p:nvCxnSpPr>
+          <p:cNvPr id="1047" name="Elbow Connector 1046"/>
+          <p:cNvCxnSpPr>
+            <a:stCxn id="87" idx="2"/>
+            <a:endCxn id="71" idx="0"/>
+          </p:cNvCxnSpPr>
+          <p:nvPr/>
+        </p:nvCxnSpPr>
+        <p:spPr>
+          <a:xfrm rot="5400000">
+            <a:off x="5359568" y="4685408"/>
+            <a:ext cx="288298" cy="1375350"/>
+          </a:xfrm>
+          <a:prstGeom prst="bentConnector3">
+            <a:avLst/>
+          </a:prstGeom>
+          <a:ln>
+            <a:tailEnd type="arrow"/>
+          </a:ln>
+        </p:spPr>
+        <p:style>
+          <a:lnRef idx="1">
+            <a:schemeClr val="accent1"/>
+          </a:lnRef>
+          <a:fillRef idx="0">
+            <a:schemeClr val="accent1"/>
+          </a:fillRef>
+          <a:effectRef idx="0">
+            <a:schemeClr val="accent1"/>
+          </a:effectRef>
+          <a:fontRef idx="minor">
+            <a:schemeClr val="tx1"/>
+          </a:fontRef>
+        </p:style>
+      </p:cxnSp>
+      <p:pic>
+        <p:nvPicPr>
+          <p:cNvPr id="92" name="Picture 5" descr="D:\MyWorkSpace\xampp\htdocs\bmhs\assets\img\bmhs\icons\email.png"/>
+          <p:cNvPicPr>
+            <a:picLocks noChangeAspect="1" noChangeArrowheads="1"/>
+          </p:cNvPicPr>
+          <p:nvPr/>
+        </p:nvPicPr>
+        <p:blipFill>
+          <a:blip r:embed="rId3" cstate="print">
+            <a:extLst>
+              <a:ext uri="{28A0092B-C50C-407E-A947-70E740481C1C}">
+                <a14:useLocalDpi xmlns:a14="http://schemas.microsoft.com/office/drawing/2010/main" val="0"/>
+              </a:ext>
+            </a:extLst>
+          </a:blip>
+          <a:srcRect/>
+          <a:stretch>
+            <a:fillRect/>
+          </a:stretch>
+        </p:blipFill>
+        <p:spPr bwMode="auto">
+          <a:xfrm>
+            <a:off x="6932618" y="4941168"/>
+            <a:ext cx="248502" cy="177392"/>
+          </a:xfrm>
+          <a:prstGeom prst="rect">
+            <a:avLst/>
+          </a:prstGeom>
+          <a:noFill/>
+          <a:extLst>
+            <a:ext uri="{909E8E84-426E-40DD-AFC4-6F175D3DCCD1}">
+              <a14:hiddenFill xmlns:a14="http://schemas.microsoft.com/office/drawing/2010/main">
+                <a:solidFill>
+                  <a:srgbClr val="FFFFFF"/>
+                </a:solidFill>
+              </a14:hiddenFill>
+            </a:ext>
+          </a:extLst>
+        </p:spPr>
+      </p:pic>
+      <p:sp>
+        <p:nvSpPr>
+          <p:cNvPr id="93" name="Rectangle 92"/>
+          <p:cNvSpPr/>
+          <p:nvPr/>
+        </p:nvSpPr>
+        <p:spPr>
+          <a:xfrm>
+            <a:off x="5795348" y="5922377"/>
+            <a:ext cx="1368152" cy="530959"/>
+          </a:xfrm>
+          <a:prstGeom prst="rect">
+            <a:avLst/>
+          </a:prstGeom>
+        </p:spPr>
+        <p:style>
+          <a:lnRef idx="2">
+            <a:schemeClr val="accent6"/>
+          </a:lnRef>
+          <a:fillRef idx="1">
+            <a:schemeClr val="lt1"/>
+          </a:fillRef>
+          <a:effectRef idx="0">
+            <a:schemeClr val="accent6"/>
+          </a:effectRef>
+          <a:fontRef idx="minor">
+            <a:schemeClr val="dk1"/>
+          </a:fontRef>
+        </p:style>
+        <p:txBody>
+          <a:bodyPr rtlCol="0" anchor="ctr"/>
+          <a:lstStyle/>
+          <a:p>
+            <a:pPr algn="ctr"/>
+            <a:r>
+              <a:rPr lang="en-US" sz="1200" dirty="0" smtClean="0"/>
+              <a:t>Mail: status with booking details &amp; ref number</a:t>
+            </a:r>
+            <a:endParaRPr lang="en-IN" sz="1200" dirty="0"/>
+          </a:p>
+        </p:txBody>
+      </p:sp>
+      <p:sp>
+        <p:nvSpPr>
+          <p:cNvPr id="96" name="TextBox 95"/>
+          <p:cNvSpPr txBox="1"/>
+          <p:nvPr/>
+        </p:nvSpPr>
+        <p:spPr>
+          <a:xfrm>
+            <a:off x="3999010" y="5916723"/>
+            <a:ext cx="464190" cy="276998"/>
+          </a:xfrm>
+          <a:prstGeom prst="rect">
+            <a:avLst/>
+          </a:prstGeom>
+          <a:noFill/>
+        </p:spPr>
+        <p:txBody>
+          <a:bodyPr wrap="square" rtlCol="0">
+            <a:spAutoFit/>
+          </a:bodyPr>
+          <a:lstStyle/>
+          <a:p>
+            <a:r>
+              <a:rPr lang="en-US" sz="1200" dirty="0" smtClean="0"/>
+              <a:t>Yes</a:t>
+            </a:r>
+            <a:endParaRPr lang="en-IN" sz="1200" dirty="0"/>
+          </a:p>
+        </p:txBody>
+      </p:sp>
+      <p:sp>
+        <p:nvSpPr>
+          <p:cNvPr id="97" name="Rectangle 96"/>
+          <p:cNvSpPr/>
+          <p:nvPr/>
+        </p:nvSpPr>
+        <p:spPr>
+          <a:xfrm>
+            <a:off x="3779124" y="6366470"/>
+            <a:ext cx="1368152" cy="360040"/>
+          </a:xfrm>
+          <a:prstGeom prst="rect">
+            <a:avLst/>
+          </a:prstGeom>
+        </p:spPr>
+        <p:style>
+          <a:lnRef idx="2">
+            <a:schemeClr val="accent1"/>
+          </a:lnRef>
+          <a:fillRef idx="1">
+            <a:schemeClr val="lt1"/>
+          </a:fillRef>
+          <a:effectRef idx="0">
+            <a:schemeClr val="accent1"/>
+          </a:effectRef>
+          <a:fontRef idx="minor">
+            <a:schemeClr val="dk1"/>
+          </a:fontRef>
+        </p:style>
+        <p:txBody>
+          <a:bodyPr rtlCol="0" anchor="ctr"/>
+          <a:lstStyle/>
+          <a:p>
+            <a:pPr algn="ctr"/>
+            <a:r>
+              <a:rPr lang="en-US" sz="1200" dirty="0" smtClean="0"/>
+              <a:t>successful</a:t>
+            </a:r>
+            <a:endParaRPr lang="en-IN" sz="1200" dirty="0"/>
+          </a:p>
+        </p:txBody>
+      </p:sp>
+      <p:pic>
+        <p:nvPicPr>
+          <p:cNvPr id="100" name="Picture 5" descr="D:\MyWorkSpace\xampp\htdocs\bmhs\assets\img\bmhs\icons\email.png"/>
+          <p:cNvPicPr>
+            <a:picLocks noChangeAspect="1" noChangeArrowheads="1"/>
+          </p:cNvPicPr>
+          <p:nvPr/>
+        </p:nvPicPr>
+        <p:blipFill>
+          <a:blip r:embed="rId3" cstate="print">
+            <a:extLst>
+              <a:ext uri="{28A0092B-C50C-407E-A947-70E740481C1C}">
+                <a14:useLocalDpi xmlns:a14="http://schemas.microsoft.com/office/drawing/2010/main" val="0"/>
+              </a:ext>
+            </a:extLst>
+          </a:blip>
+          <a:srcRect/>
+          <a:stretch>
+            <a:fillRect/>
+          </a:stretch>
+        </p:blipFill>
+        <p:spPr bwMode="auto">
+          <a:xfrm>
+            <a:off x="5439170" y="5949280"/>
+            <a:ext cx="248502" cy="177392"/>
+          </a:xfrm>
+          <a:prstGeom prst="rect">
+            <a:avLst/>
+          </a:prstGeom>
+          <a:noFill/>
+          <a:extLst>
+            <a:ext uri="{909E8E84-426E-40DD-AFC4-6F175D3DCCD1}">
+              <a14:hiddenFill xmlns:a14="http://schemas.microsoft.com/office/drawing/2010/main">
+                <a:solidFill>
+                  <a:srgbClr val="FFFFFF"/>
+                </a:solidFill>
+              </a14:hiddenFill>
+            </a:ext>
+          </a:extLst>
+        </p:spPr>
+      </p:pic>
+      <p:cxnSp>
+        <p:nvCxnSpPr>
+          <p:cNvPr id="1063" name="Elbow Connector 1062"/>
+          <p:cNvCxnSpPr>
+            <a:stCxn id="71" idx="2"/>
+            <a:endCxn id="97" idx="0"/>
+          </p:cNvCxnSpPr>
+          <p:nvPr/>
+        </p:nvCxnSpPr>
+        <p:spPr>
+          <a:xfrm rot="5400000">
+            <a:off x="4483997" y="6034425"/>
+            <a:ext cx="311248" cy="352842"/>
+          </a:xfrm>
+          <a:prstGeom prst="bentConnector3">
+            <a:avLst/>
+          </a:prstGeom>
+          <a:ln>
+            <a:tailEnd type="arrow"/>
+          </a:ln>
+        </p:spPr>
+        <p:style>
+          <a:lnRef idx="1">
+            <a:schemeClr val="accent1"/>
+          </a:lnRef>
+          <a:fillRef idx="0">
+            <a:schemeClr val="accent1"/>
+          </a:fillRef>
+          <a:effectRef idx="0">
+            <a:schemeClr val="accent1"/>
+          </a:effectRef>
+          <a:fontRef idx="minor">
+            <a:schemeClr val="tx1"/>
+          </a:fontRef>
+        </p:style>
+      </p:cxnSp>
+      <p:sp>
+        <p:nvSpPr>
+          <p:cNvPr id="115" name="Rectangle 114"/>
+          <p:cNvSpPr/>
+          <p:nvPr/>
+        </p:nvSpPr>
+        <p:spPr>
+          <a:xfrm>
+            <a:off x="6660232" y="5337212"/>
+            <a:ext cx="1368152" cy="360040"/>
+          </a:xfrm>
+          <a:prstGeom prst="rect">
+            <a:avLst/>
+          </a:prstGeom>
+        </p:spPr>
+        <p:style>
+          <a:lnRef idx="2">
+            <a:schemeClr val="accent1"/>
+          </a:lnRef>
+          <a:fillRef idx="1">
+            <a:schemeClr val="lt1"/>
+          </a:fillRef>
+          <a:effectRef idx="0">
+            <a:schemeClr val="accent1"/>
+          </a:effectRef>
+          <a:fontRef idx="minor">
+            <a:schemeClr val="dk1"/>
+          </a:fontRef>
+        </p:style>
+        <p:txBody>
+          <a:bodyPr rtlCol="0" anchor="ctr"/>
+          <a:lstStyle/>
+          <a:p>
+            <a:pPr algn="ctr"/>
+            <a:r>
+              <a:rPr lang="en-US" sz="1200" dirty="0" smtClean="0"/>
+              <a:t>Payment awaited</a:t>
+            </a:r>
+            <a:endParaRPr lang="en-IN" sz="1200" dirty="0"/>
+          </a:p>
+        </p:txBody>
+      </p:sp>
+      <p:cxnSp>
+        <p:nvCxnSpPr>
+          <p:cNvPr id="1067" name="Elbow Connector 1066"/>
+          <p:cNvCxnSpPr>
+            <a:stCxn id="71" idx="3"/>
+            <a:endCxn id="115" idx="1"/>
+          </p:cNvCxnSpPr>
+          <p:nvPr/>
+        </p:nvCxnSpPr>
+        <p:spPr>
+          <a:xfrm flipV="1">
+            <a:off x="5851844" y="5517232"/>
+            <a:ext cx="808388" cy="268995"/>
+          </a:xfrm>
+          <a:prstGeom prst="bentConnector3">
+            <a:avLst/>
+          </a:prstGeom>
+          <a:ln>
+            <a:tailEnd type="arrow"/>
+          </a:ln>
+        </p:spPr>
+        <p:style>
+          <a:lnRef idx="1">
+            <a:schemeClr val="accent1"/>
+          </a:lnRef>
+          <a:fillRef idx="0">
+            <a:schemeClr val="accent1"/>
+          </a:fillRef>
+          <a:effectRef idx="0">
+            <a:schemeClr val="accent1"/>
+          </a:effectRef>
+          <a:fontRef idx="minor">
+            <a:schemeClr val="tx1"/>
+          </a:fontRef>
+        </p:style>
+      </p:cxnSp>
+      <p:sp>
+        <p:nvSpPr>
+          <p:cNvPr id="120" name="TextBox 119"/>
+          <p:cNvSpPr txBox="1"/>
+          <p:nvPr/>
+        </p:nvSpPr>
+        <p:spPr>
+          <a:xfrm>
+            <a:off x="5780701" y="5513230"/>
+            <a:ext cx="464190" cy="276998"/>
+          </a:xfrm>
+          <a:prstGeom prst="rect">
+            <a:avLst/>
+          </a:prstGeom>
+          <a:noFill/>
+        </p:spPr>
+        <p:txBody>
+          <a:bodyPr wrap="square" rtlCol="0">
+            <a:spAutoFit/>
+          </a:bodyPr>
+          <a:lstStyle/>
+          <a:p>
+            <a:r>
+              <a:rPr lang="en-US" sz="1200" dirty="0" smtClean="0"/>
+              <a:t>No</a:t>
+            </a:r>
+            <a:endParaRPr lang="en-IN" sz="1200" dirty="0"/>
+          </a:p>
+        </p:txBody>
+      </p:sp>
+      <p:sp>
+        <p:nvSpPr>
+          <p:cNvPr id="121" name="Rectangle 120"/>
+          <p:cNvSpPr/>
+          <p:nvPr/>
+        </p:nvSpPr>
+        <p:spPr>
+          <a:xfrm>
+            <a:off x="7523540" y="5949280"/>
+            <a:ext cx="1368152" cy="360040"/>
+          </a:xfrm>
+          <a:prstGeom prst="rect">
+            <a:avLst/>
+          </a:prstGeom>
+        </p:spPr>
+        <p:style>
+          <a:lnRef idx="2">
+            <a:schemeClr val="accent1"/>
+          </a:lnRef>
+          <a:fillRef idx="1">
+            <a:schemeClr val="lt1"/>
+          </a:fillRef>
+          <a:effectRef idx="0">
+            <a:schemeClr val="accent1"/>
+          </a:effectRef>
+          <a:fontRef idx="minor">
+            <a:schemeClr val="dk1"/>
+          </a:fontRef>
+        </p:style>
+        <p:txBody>
+          <a:bodyPr rtlCol="0" anchor="ctr"/>
+          <a:lstStyle/>
+          <a:p>
+            <a:pPr algn="ctr"/>
+            <a:r>
+              <a:rPr lang="en-US" sz="1200" dirty="0" smtClean="0"/>
+              <a:t>Enter the reason</a:t>
+            </a:r>
+            <a:endParaRPr lang="en-IN" sz="1200" dirty="0"/>
+          </a:p>
+        </p:txBody>
+      </p:sp>
+      <p:cxnSp>
+        <p:nvCxnSpPr>
+          <p:cNvPr id="1073" name="Elbow Connector 1072"/>
+          <p:cNvCxnSpPr>
+            <a:stCxn id="115" idx="3"/>
+            <a:endCxn id="121" idx="0"/>
+          </p:cNvCxnSpPr>
+          <p:nvPr/>
+        </p:nvCxnSpPr>
+        <p:spPr>
+          <a:xfrm>
+            <a:off x="8028384" y="5517232"/>
+            <a:ext cx="179232" cy="432048"/>
+          </a:xfrm>
+          <a:prstGeom prst="bentConnector2">
+            <a:avLst/>
+          </a:prstGeom>
+          <a:ln>
+            <a:tailEnd type="arrow"/>
+          </a:ln>
+        </p:spPr>
+        <p:style>
+          <a:lnRef idx="1">
+            <a:schemeClr val="accent1"/>
+          </a:lnRef>
+          <a:fillRef idx="0">
+            <a:schemeClr val="accent1"/>
+          </a:fillRef>
+          <a:effectRef idx="0">
+            <a:schemeClr val="accent1"/>
+          </a:effectRef>
+          <a:fontRef idx="minor">
+            <a:schemeClr val="tx1"/>
+          </a:fontRef>
+        </p:style>
+      </p:cxnSp>
+      <p:cxnSp>
+        <p:nvCxnSpPr>
+          <p:cNvPr id="1078" name="Elbow Connector 1077"/>
+          <p:cNvCxnSpPr>
+            <a:stCxn id="97" idx="3"/>
+            <a:endCxn id="93" idx="1"/>
+          </p:cNvCxnSpPr>
+          <p:nvPr/>
+        </p:nvCxnSpPr>
+        <p:spPr>
+          <a:xfrm flipV="1">
+            <a:off x="5147276" y="6187857"/>
+            <a:ext cx="648072" cy="358633"/>
+          </a:xfrm>
+          <a:prstGeom prst="bentConnector3">
+            <a:avLst/>
+          </a:prstGeom>
+          <a:ln>
+            <a:tailEnd type="arrow"/>
+          </a:ln>
+        </p:spPr>
+        <p:style>
+          <a:lnRef idx="1">
+            <a:schemeClr val="accent1"/>
+          </a:lnRef>
+          <a:fillRef idx="0">
+            <a:schemeClr val="accent1"/>
+          </a:fillRef>
+          <a:effectRef idx="0">
+            <a:schemeClr val="accent1"/>
+          </a:effectRef>
+          <a:fontRef idx="minor">
+            <a:schemeClr val="tx1"/>
+          </a:fontRef>
+        </p:style>
+      </p:cxnSp>
+      <p:sp>
+        <p:nvSpPr>
+          <p:cNvPr id="131" name="Rectangle 130"/>
+          <p:cNvSpPr/>
+          <p:nvPr/>
+        </p:nvSpPr>
+        <p:spPr>
+          <a:xfrm>
+            <a:off x="7540956" y="6366470"/>
+            <a:ext cx="1368152" cy="360040"/>
+          </a:xfrm>
+          <a:prstGeom prst="rect">
+            <a:avLst/>
+          </a:prstGeom>
+        </p:spPr>
+        <p:style>
+          <a:lnRef idx="2">
+            <a:schemeClr val="accent6"/>
+          </a:lnRef>
+          <a:fillRef idx="1">
+            <a:schemeClr val="lt1"/>
+          </a:fillRef>
+          <a:effectRef idx="0">
+            <a:schemeClr val="accent6"/>
+          </a:effectRef>
+          <a:fontRef idx="minor">
+            <a:schemeClr val="dk1"/>
+          </a:fontRef>
+        </p:style>
+        <p:txBody>
+          <a:bodyPr rtlCol="0" anchor="ctr"/>
+          <a:lstStyle/>
+          <a:p>
+            <a:pPr algn="ctr"/>
+            <a:r>
+              <a:rPr lang="en-US" sz="1200" dirty="0" smtClean="0"/>
+              <a:t>Block calendar</a:t>
+            </a:r>
+            <a:endParaRPr lang="en-IN" sz="1200" dirty="0"/>
+          </a:p>
+        </p:txBody>
+      </p:sp>
+      <p:cxnSp>
+        <p:nvCxnSpPr>
+          <p:cNvPr id="1080" name="Straight Arrow Connector 1079"/>
+          <p:cNvCxnSpPr>
+            <a:stCxn id="97" idx="3"/>
+            <a:endCxn id="131" idx="1"/>
+          </p:cNvCxnSpPr>
+          <p:nvPr/>
+        </p:nvCxnSpPr>
+        <p:spPr>
+          <a:xfrm>
+            <a:off x="5147276" y="6546490"/>
+            <a:ext cx="2393680" cy="0"/>
+          </a:xfrm>
+          <a:prstGeom prst="straightConnector1">
+            <a:avLst/>
+          </a:prstGeom>
+          <a:ln>
+            <a:tailEnd type="arrow"/>
+          </a:ln>
+        </p:spPr>
+        <p:style>
+          <a:lnRef idx="1">
+            <a:schemeClr val="accent1"/>
+          </a:lnRef>
+          <a:fillRef idx="0">
+            <a:schemeClr val="accent1"/>
+          </a:fillRef>
+          <a:effectRef idx="0">
+            <a:schemeClr val="accent1"/>
+          </a:effectRef>
+          <a:fontRef idx="minor">
+            <a:schemeClr val="tx1"/>
+          </a:fontRef>
+        </p:style>
+      </p:cxnSp>
+      <p:sp>
+        <p:nvSpPr>
+          <p:cNvPr id="134" name="Diamond 133"/>
+          <p:cNvSpPr/>
+          <p:nvPr/>
+        </p:nvSpPr>
+        <p:spPr>
+          <a:xfrm>
+            <a:off x="1780316" y="2907977"/>
+            <a:ext cx="2071604" cy="537990"/>
+          </a:xfrm>
+          <a:prstGeom prst="diamond">
+            <a:avLst/>
+          </a:prstGeom>
+        </p:spPr>
+        <p:style>
+          <a:lnRef idx="2">
+            <a:schemeClr val="accent6"/>
+          </a:lnRef>
+          <a:fillRef idx="1">
+            <a:schemeClr val="lt1"/>
+          </a:fillRef>
+          <a:effectRef idx="0">
+            <a:schemeClr val="accent6"/>
+          </a:effectRef>
+          <a:fontRef idx="minor">
+            <a:schemeClr val="dk1"/>
+          </a:fontRef>
+        </p:style>
+        <p:txBody>
+          <a:bodyPr rtlCol="0" anchor="ctr"/>
+          <a:lstStyle/>
+          <a:p>
+            <a:pPr algn="ctr"/>
+            <a:r>
+              <a:rPr lang="en-US" sz="1200" dirty="0" smtClean="0"/>
+              <a:t>owner reachable</a:t>
+            </a:r>
+            <a:endParaRPr lang="en-IN" sz="1200" dirty="0"/>
+          </a:p>
+        </p:txBody>
+      </p:sp>
+      <p:cxnSp>
+        <p:nvCxnSpPr>
+          <p:cNvPr id="1084" name="Straight Arrow Connector 1083"/>
+          <p:cNvCxnSpPr>
+            <a:stCxn id="37" idx="3"/>
+            <a:endCxn id="134" idx="1"/>
+          </p:cNvCxnSpPr>
+          <p:nvPr/>
+        </p:nvCxnSpPr>
+        <p:spPr>
+          <a:xfrm>
+            <a:off x="1547664" y="3176972"/>
+            <a:ext cx="232652" cy="0"/>
+          </a:xfrm>
+          <a:prstGeom prst="straightConnector1">
+            <a:avLst/>
+          </a:prstGeom>
+          <a:ln>
+            <a:tailEnd type="arrow"/>
+          </a:ln>
+        </p:spPr>
+        <p:style>
+          <a:lnRef idx="1">
+            <a:schemeClr val="accent1"/>
+          </a:lnRef>
+          <a:fillRef idx="0">
+            <a:schemeClr val="accent1"/>
+          </a:fillRef>
+          <a:effectRef idx="0">
+            <a:schemeClr val="accent1"/>
+          </a:effectRef>
+          <a:fontRef idx="minor">
+            <a:schemeClr val="tx1"/>
+          </a:fontRef>
+        </p:style>
+      </p:cxnSp>
+      <p:sp>
+        <p:nvSpPr>
+          <p:cNvPr id="139" name="Rectangle 138"/>
+          <p:cNvSpPr/>
+          <p:nvPr/>
+        </p:nvSpPr>
+        <p:spPr>
+          <a:xfrm>
+            <a:off x="179512" y="3501008"/>
+            <a:ext cx="1368152" cy="360040"/>
+          </a:xfrm>
+          <a:prstGeom prst="rect">
+            <a:avLst/>
+          </a:prstGeom>
+        </p:spPr>
+        <p:style>
+          <a:lnRef idx="2">
+            <a:schemeClr val="accent1"/>
+          </a:lnRef>
+          <a:fillRef idx="1">
+            <a:schemeClr val="lt1"/>
+          </a:fillRef>
+          <a:effectRef idx="0">
+            <a:schemeClr val="accent1"/>
+          </a:effectRef>
+          <a:fontRef idx="minor">
+            <a:schemeClr val="dk1"/>
+          </a:fontRef>
+        </p:style>
+        <p:txBody>
+          <a:bodyPr rtlCol="0" anchor="ctr"/>
+          <a:lstStyle/>
+          <a:p>
+            <a:pPr algn="ctr"/>
+            <a:r>
+              <a:rPr lang="en-US" sz="1200" dirty="0" smtClean="0"/>
+              <a:t>Processing-back log</a:t>
+            </a:r>
+            <a:endParaRPr lang="en-IN" sz="1200" dirty="0"/>
+          </a:p>
+        </p:txBody>
+      </p:sp>
+      <p:sp>
+        <p:nvSpPr>
+          <p:cNvPr id="140" name="Rectangle 139"/>
+          <p:cNvSpPr/>
+          <p:nvPr/>
+        </p:nvSpPr>
+        <p:spPr>
+          <a:xfrm>
+            <a:off x="179512" y="4104368"/>
+            <a:ext cx="1368152" cy="360040"/>
+          </a:xfrm>
+          <a:prstGeom prst="rect">
+            <a:avLst/>
+          </a:prstGeom>
+        </p:spPr>
+        <p:style>
+          <a:lnRef idx="2">
+            <a:schemeClr val="accent1"/>
+          </a:lnRef>
+          <a:fillRef idx="1">
+            <a:schemeClr val="lt1"/>
+          </a:fillRef>
+          <a:effectRef idx="0">
+            <a:schemeClr val="accent1"/>
+          </a:effectRef>
+          <a:fontRef idx="minor">
+            <a:schemeClr val="dk1"/>
+          </a:fontRef>
+        </p:style>
+        <p:txBody>
+          <a:bodyPr rtlCol="0" anchor="ctr"/>
+          <a:lstStyle/>
+          <a:p>
+            <a:pPr algn="ctr"/>
+            <a:r>
+              <a:rPr lang="en-US" sz="1200" dirty="0" smtClean="0"/>
+              <a:t>Enter reason as: HS not reachable</a:t>
+            </a:r>
+            <a:endParaRPr lang="en-IN" sz="1200" dirty="0"/>
+          </a:p>
+        </p:txBody>
+      </p:sp>
+      <p:sp>
+        <p:nvSpPr>
+          <p:cNvPr id="141" name="Diamond 140"/>
+          <p:cNvSpPr/>
+          <p:nvPr/>
+        </p:nvSpPr>
+        <p:spPr>
+          <a:xfrm>
+            <a:off x="1259632" y="4365104"/>
+            <a:ext cx="2071604" cy="537990"/>
+          </a:xfrm>
+          <a:prstGeom prst="diamond">
+            <a:avLst/>
+          </a:prstGeom>
+        </p:spPr>
+        <p:style>
+          <a:lnRef idx="2">
+            <a:schemeClr val="accent6"/>
+          </a:lnRef>
+          <a:fillRef idx="1">
+            <a:schemeClr val="lt1"/>
+          </a:fillRef>
+          <a:effectRef idx="0">
+            <a:schemeClr val="accent6"/>
+          </a:effectRef>
+          <a:fontRef idx="minor">
+            <a:schemeClr val="dk1"/>
+          </a:fontRef>
+        </p:style>
+        <p:txBody>
+          <a:bodyPr rtlCol="0" anchor="ctr"/>
+          <a:lstStyle/>
+          <a:p>
+            <a:pPr algn="ctr"/>
+            <a:r>
+              <a:rPr lang="en-US" sz="1200" dirty="0" smtClean="0"/>
+              <a:t>If reachable with in 2 HRs</a:t>
+            </a:r>
+            <a:endParaRPr lang="en-IN" sz="1200" dirty="0"/>
+          </a:p>
+        </p:txBody>
+      </p:sp>
+      <p:cxnSp>
+        <p:nvCxnSpPr>
+          <p:cNvPr id="142" name="Elbow Connector 141"/>
+          <p:cNvCxnSpPr>
+            <a:stCxn id="139" idx="2"/>
+            <a:endCxn id="141" idx="0"/>
+          </p:cNvCxnSpPr>
+          <p:nvPr/>
+        </p:nvCxnSpPr>
+        <p:spPr>
+          <a:xfrm rot="16200000" flipH="1">
+            <a:off x="1327483" y="3397153"/>
+            <a:ext cx="504056" cy="1431846"/>
+          </a:xfrm>
+          <a:prstGeom prst="bentConnector3">
+            <a:avLst>
+              <a:gd name="adj1" fmla="val 28339"/>
+            </a:avLst>
+          </a:prstGeom>
+          <a:ln>
+            <a:tailEnd type="arrow"/>
+          </a:ln>
+        </p:spPr>
+        <p:style>
+          <a:lnRef idx="1">
+            <a:schemeClr val="accent1"/>
+          </a:lnRef>
+          <a:fillRef idx="0">
+            <a:schemeClr val="accent1"/>
+          </a:fillRef>
+          <a:effectRef idx="0">
+            <a:schemeClr val="accent1"/>
+          </a:effectRef>
+          <a:fontRef idx="minor">
+            <a:schemeClr val="tx1"/>
+          </a:fontRef>
+        </p:style>
+      </p:cxnSp>
+      <p:cxnSp>
+        <p:nvCxnSpPr>
+          <p:cNvPr id="1087" name="Elbow Connector 1086"/>
+          <p:cNvCxnSpPr>
+            <a:stCxn id="134" idx="2"/>
+            <a:endCxn id="139" idx="3"/>
+          </p:cNvCxnSpPr>
+          <p:nvPr/>
+        </p:nvCxnSpPr>
+        <p:spPr>
+          <a:xfrm rot="5400000">
+            <a:off x="2064361" y="2929270"/>
+            <a:ext cx="235061" cy="1268454"/>
+          </a:xfrm>
+          <a:prstGeom prst="bentConnector2">
+            <a:avLst/>
+          </a:prstGeom>
+          <a:ln>
+            <a:tailEnd type="arrow"/>
+          </a:ln>
+        </p:spPr>
+        <p:style>
+          <a:lnRef idx="1">
+            <a:schemeClr val="accent1"/>
+          </a:lnRef>
+          <a:fillRef idx="0">
+            <a:schemeClr val="accent1"/>
+          </a:fillRef>
+          <a:effectRef idx="0">
+            <a:schemeClr val="accent1"/>
+          </a:effectRef>
+          <a:fontRef idx="minor">
+            <a:schemeClr val="tx1"/>
+          </a:fontRef>
+        </p:style>
+      </p:cxnSp>
+      <p:cxnSp>
+        <p:nvCxnSpPr>
+          <p:cNvPr id="65" name="Straight Arrow Connector 64"/>
+          <p:cNvCxnSpPr>
+            <a:stCxn id="134" idx="3"/>
+            <a:endCxn id="40" idx="1"/>
+          </p:cNvCxnSpPr>
+          <p:nvPr/>
+        </p:nvCxnSpPr>
+        <p:spPr>
+          <a:xfrm>
+            <a:off x="3851920" y="3176972"/>
+            <a:ext cx="619104" cy="6203"/>
+          </a:xfrm>
+          <a:prstGeom prst="straightConnector1">
+            <a:avLst/>
+          </a:prstGeom>
+          <a:ln>
+            <a:tailEnd type="arrow"/>
+          </a:ln>
+        </p:spPr>
+        <p:style>
+          <a:lnRef idx="1">
+            <a:schemeClr val="accent1"/>
+          </a:lnRef>
+          <a:fillRef idx="0">
+            <a:schemeClr val="accent1"/>
+          </a:fillRef>
+          <a:effectRef idx="0">
+            <a:schemeClr val="accent1"/>
+          </a:effectRef>
+          <a:fontRef idx="minor">
+            <a:schemeClr val="tx1"/>
+          </a:fontRef>
+        </p:style>
+      </p:cxnSp>
+      <p:sp>
+        <p:nvSpPr>
+          <p:cNvPr id="148" name="TextBox 147"/>
+          <p:cNvSpPr txBox="1"/>
+          <p:nvPr/>
+        </p:nvSpPr>
+        <p:spPr>
+          <a:xfrm>
+            <a:off x="3741043" y="2800346"/>
+            <a:ext cx="464190" cy="276998"/>
+          </a:xfrm>
+          <a:prstGeom prst="rect">
+            <a:avLst/>
+          </a:prstGeom>
+          <a:noFill/>
+        </p:spPr>
+        <p:txBody>
+          <a:bodyPr wrap="square" rtlCol="0">
+            <a:spAutoFit/>
+          </a:bodyPr>
+          <a:lstStyle/>
+          <a:p>
+            <a:r>
+              <a:rPr lang="en-US" sz="1200" dirty="0" smtClean="0"/>
+              <a:t>Yes</a:t>
+            </a:r>
+            <a:endParaRPr lang="en-IN" sz="1200" dirty="0"/>
+          </a:p>
+        </p:txBody>
+      </p:sp>
+      <p:sp>
+        <p:nvSpPr>
+          <p:cNvPr id="149" name="TextBox 148"/>
+          <p:cNvSpPr txBox="1"/>
+          <p:nvPr/>
+        </p:nvSpPr>
+        <p:spPr>
+          <a:xfrm>
+            <a:off x="2483768" y="3440034"/>
+            <a:ext cx="464190" cy="276998"/>
+          </a:xfrm>
+          <a:prstGeom prst="rect">
+            <a:avLst/>
+          </a:prstGeom>
+          <a:noFill/>
+        </p:spPr>
+        <p:txBody>
+          <a:bodyPr wrap="square" rtlCol="0">
+            <a:spAutoFit/>
+          </a:bodyPr>
+          <a:lstStyle/>
+          <a:p>
+            <a:r>
+              <a:rPr lang="en-US" sz="1200" dirty="0" smtClean="0"/>
+              <a:t>No</a:t>
+            </a:r>
+            <a:endParaRPr lang="en-IN" sz="1200" dirty="0"/>
+          </a:p>
+        </p:txBody>
+      </p:sp>
+      <p:cxnSp>
+        <p:nvCxnSpPr>
+          <p:cNvPr id="68" name="Elbow Connector 67"/>
+          <p:cNvCxnSpPr>
+            <a:stCxn id="141" idx="2"/>
+            <a:endCxn id="39" idx="1"/>
+          </p:cNvCxnSpPr>
+          <p:nvPr/>
+        </p:nvCxnSpPr>
+        <p:spPr>
+          <a:xfrm rot="5400000" flipH="1" flipV="1">
+            <a:off x="3434358" y="2830136"/>
+            <a:ext cx="934034" cy="3211882"/>
+          </a:xfrm>
+          <a:prstGeom prst="bentConnector4">
+            <a:avLst>
+              <a:gd name="adj1" fmla="val -40547"/>
+              <a:gd name="adj2" fmla="val 94169"/>
+            </a:avLst>
+          </a:prstGeom>
+          <a:ln>
+            <a:tailEnd type="arrow"/>
+          </a:ln>
+        </p:spPr>
+        <p:style>
+          <a:lnRef idx="1">
+            <a:schemeClr val="accent1"/>
+          </a:lnRef>
+          <a:fillRef idx="0">
+            <a:schemeClr val="accent1"/>
+          </a:fillRef>
+          <a:effectRef idx="0">
+            <a:schemeClr val="accent1"/>
+          </a:effectRef>
+          <a:fontRef idx="minor">
+            <a:schemeClr val="tx1"/>
+          </a:fontRef>
+        </p:style>
+      </p:cxnSp>
+      <p:cxnSp>
+        <p:nvCxnSpPr>
+          <p:cNvPr id="78" name="Elbow Connector 77"/>
+          <p:cNvCxnSpPr>
+            <a:stCxn id="139" idx="1"/>
+            <a:endCxn id="140" idx="1"/>
+          </p:cNvCxnSpPr>
+          <p:nvPr/>
+        </p:nvCxnSpPr>
+        <p:spPr>
+          <a:xfrm rot="10800000" flipV="1">
+            <a:off x="179512" y="3681028"/>
+            <a:ext cx="12700" cy="603360"/>
+          </a:xfrm>
+          <a:prstGeom prst="bentConnector3">
+            <a:avLst>
+              <a:gd name="adj1" fmla="val 1047764"/>
+            </a:avLst>
+          </a:prstGeom>
+          <a:ln>
+            <a:tailEnd type="arrow"/>
+          </a:ln>
+        </p:spPr>
+        <p:style>
+          <a:lnRef idx="1">
+            <a:schemeClr val="accent1"/>
+          </a:lnRef>
+          <a:fillRef idx="0">
+            <a:schemeClr val="accent1"/>
+          </a:fillRef>
+          <a:effectRef idx="0">
+            <a:schemeClr val="accent1"/>
+          </a:effectRef>
+          <a:fontRef idx="minor">
+            <a:schemeClr val="tx1"/>
+          </a:fontRef>
+        </p:style>
+      </p:cxnSp>
+      <p:sp>
+        <p:nvSpPr>
+          <p:cNvPr id="170" name="TextBox 169"/>
+          <p:cNvSpPr txBox="1"/>
+          <p:nvPr/>
+        </p:nvSpPr>
+        <p:spPr>
+          <a:xfrm>
+            <a:off x="2359685" y="4951936"/>
+            <a:ext cx="464190" cy="276998"/>
+          </a:xfrm>
+          <a:prstGeom prst="rect">
+            <a:avLst/>
+          </a:prstGeom>
+          <a:noFill/>
+        </p:spPr>
+        <p:txBody>
+          <a:bodyPr wrap="square" rtlCol="0">
+            <a:spAutoFit/>
+          </a:bodyPr>
+          <a:lstStyle/>
+          <a:p>
+            <a:r>
+              <a:rPr lang="en-US" sz="1200" dirty="0" smtClean="0"/>
+              <a:t>Yes</a:t>
+            </a:r>
+            <a:endParaRPr lang="en-IN" sz="1200" dirty="0"/>
+          </a:p>
+        </p:txBody>
+      </p:sp>
+      <p:sp>
+        <p:nvSpPr>
+          <p:cNvPr id="172" name="Oval 171"/>
+          <p:cNvSpPr/>
+          <p:nvPr/>
+        </p:nvSpPr>
+        <p:spPr>
+          <a:xfrm>
+            <a:off x="1907704" y="1916832"/>
+            <a:ext cx="216024" cy="216024"/>
+          </a:xfrm>
+          <a:prstGeom prst="ellipse">
+            <a:avLst/>
+          </a:prstGeom>
+        </p:spPr>
+        <p:style>
+          <a:lnRef idx="2">
+            <a:schemeClr val="accent6"/>
+          </a:lnRef>
+          <a:fillRef idx="1">
+            <a:schemeClr val="lt1"/>
+          </a:fillRef>
+          <a:effectRef idx="0">
+            <a:schemeClr val="accent6"/>
+          </a:effectRef>
+          <a:fontRef idx="minor">
+            <a:schemeClr val="dk1"/>
+          </a:fontRef>
+        </p:style>
+        <p:txBody>
+          <a:bodyPr rtlCol="0" anchor="ctr"/>
+          <a:lstStyle/>
+          <a:p>
+            <a:pPr algn="ctr"/>
+            <a:r>
+              <a:rPr lang="en-US" sz="1200" dirty="0" smtClean="0"/>
+              <a:t>1</a:t>
+            </a:r>
+            <a:endParaRPr lang="en-IN" sz="1200" dirty="0"/>
+          </a:p>
+        </p:txBody>
+      </p:sp>
+      <p:sp>
+        <p:nvSpPr>
+          <p:cNvPr id="173" name="Oval 172"/>
+          <p:cNvSpPr/>
+          <p:nvPr/>
+        </p:nvSpPr>
+        <p:spPr>
+          <a:xfrm>
+            <a:off x="3779124" y="4526593"/>
+            <a:ext cx="216024" cy="216024"/>
+          </a:xfrm>
+          <a:prstGeom prst="ellipse">
+            <a:avLst/>
+          </a:prstGeom>
+        </p:spPr>
+        <p:style>
+          <a:lnRef idx="2">
+            <a:schemeClr val="accent6"/>
+          </a:lnRef>
+          <a:fillRef idx="1">
+            <a:schemeClr val="lt1"/>
+          </a:fillRef>
+          <a:effectRef idx="0">
+            <a:schemeClr val="accent6"/>
+          </a:effectRef>
+          <a:fontRef idx="minor">
+            <a:schemeClr val="dk1"/>
+          </a:fontRef>
+        </p:style>
+        <p:txBody>
+          <a:bodyPr rtlCol="0" anchor="ctr"/>
+          <a:lstStyle/>
+          <a:p>
+            <a:pPr algn="ctr"/>
+            <a:r>
+              <a:rPr lang="en-US" sz="1200" dirty="0" smtClean="0"/>
+              <a:t>2</a:t>
+            </a:r>
+            <a:endParaRPr lang="en-IN" sz="1200" dirty="0"/>
+          </a:p>
+        </p:txBody>
+      </p:sp>
+      <p:sp>
+        <p:nvSpPr>
+          <p:cNvPr id="174" name="Oval 173"/>
+          <p:cNvSpPr/>
+          <p:nvPr/>
+        </p:nvSpPr>
+        <p:spPr>
+          <a:xfrm>
+            <a:off x="6659444" y="4561812"/>
+            <a:ext cx="216024" cy="216024"/>
+          </a:xfrm>
+          <a:prstGeom prst="ellipse">
+            <a:avLst/>
+          </a:prstGeom>
+        </p:spPr>
+        <p:style>
+          <a:lnRef idx="2">
+            <a:schemeClr val="accent6"/>
+          </a:lnRef>
+          <a:fillRef idx="1">
+            <a:schemeClr val="lt1"/>
+          </a:fillRef>
+          <a:effectRef idx="0">
+            <a:schemeClr val="accent6"/>
+          </a:effectRef>
+          <a:fontRef idx="minor">
+            <a:schemeClr val="dk1"/>
+          </a:fontRef>
+        </p:style>
+        <p:txBody>
+          <a:bodyPr rtlCol="0" anchor="ctr"/>
+          <a:lstStyle/>
+          <a:p>
+            <a:pPr algn="ctr"/>
+            <a:r>
+              <a:rPr lang="en-US" sz="1200" dirty="0" smtClean="0"/>
+              <a:t>3</a:t>
+            </a:r>
+            <a:endParaRPr lang="en-IN" sz="1200" dirty="0"/>
+          </a:p>
+        </p:txBody>
+      </p:sp>
+      <p:sp>
+        <p:nvSpPr>
+          <p:cNvPr id="175" name="Oval 174"/>
+          <p:cNvSpPr/>
+          <p:nvPr/>
+        </p:nvSpPr>
+        <p:spPr>
+          <a:xfrm>
+            <a:off x="5520804" y="6250012"/>
+            <a:ext cx="216024" cy="216024"/>
+          </a:xfrm>
+          <a:prstGeom prst="ellipse">
+            <a:avLst/>
+          </a:prstGeom>
+        </p:spPr>
+        <p:style>
+          <a:lnRef idx="2">
+            <a:schemeClr val="accent6"/>
+          </a:lnRef>
+          <a:fillRef idx="1">
+            <a:schemeClr val="lt1"/>
+          </a:fillRef>
+          <a:effectRef idx="0">
+            <a:schemeClr val="accent6"/>
+          </a:effectRef>
+          <a:fontRef idx="minor">
+            <a:schemeClr val="dk1"/>
+          </a:fontRef>
+        </p:style>
+        <p:txBody>
+          <a:bodyPr rtlCol="0" anchor="ctr"/>
+          <a:lstStyle/>
+          <a:p>
+            <a:pPr algn="ctr"/>
+            <a:r>
+              <a:rPr lang="en-US" sz="1200" dirty="0" smtClean="0"/>
+              <a:t>4</a:t>
+            </a:r>
+            <a:endParaRPr lang="en-IN" sz="1200" dirty="0"/>
+          </a:p>
+        </p:txBody>
+      </p:sp>
+      <p:pic>
+        <p:nvPicPr>
+          <p:cNvPr id="176" name="Picture 5" descr="D:\MyWorkSpace\xampp\htdocs\bmhs\assets\img\bmhs\icons\email.png"/>
+          <p:cNvPicPr>
+            <a:picLocks noChangeAspect="1" noChangeArrowheads="1"/>
+          </p:cNvPicPr>
+          <p:nvPr/>
+        </p:nvPicPr>
+        <p:blipFill>
+          <a:blip r:embed="rId3" cstate="print">
+            <a:extLst>
+              <a:ext uri="{28A0092B-C50C-407E-A947-70E740481C1C}">
+                <a14:useLocalDpi xmlns:a14="http://schemas.microsoft.com/office/drawing/2010/main" val="0"/>
+              </a:ext>
+            </a:extLst>
+          </a:blip>
+          <a:srcRect/>
+          <a:stretch>
+            <a:fillRect/>
+          </a:stretch>
+        </p:blipFill>
+        <p:spPr bwMode="auto">
+          <a:xfrm>
+            <a:off x="179512" y="4835784"/>
+            <a:ext cx="248502" cy="177392"/>
+          </a:xfrm>
+          <a:prstGeom prst="rect">
+            <a:avLst/>
+          </a:prstGeom>
+          <a:noFill/>
+          <a:extLst>
+            <a:ext uri="{909E8E84-426E-40DD-AFC4-6F175D3DCCD1}">
+              <a14:hiddenFill xmlns:a14="http://schemas.microsoft.com/office/drawing/2010/main">
+                <a:solidFill>
+                  <a:srgbClr val="FFFFFF"/>
+                </a:solidFill>
+              </a14:hiddenFill>
+            </a:ext>
+          </a:extLst>
+        </p:spPr>
+      </p:pic>
+      <p:sp>
+        <p:nvSpPr>
+          <p:cNvPr id="177" name="Rectangle 176"/>
+          <p:cNvSpPr/>
+          <p:nvPr/>
+        </p:nvSpPr>
+        <p:spPr>
+          <a:xfrm>
+            <a:off x="179511" y="5085184"/>
+            <a:ext cx="1368152" cy="360040"/>
+          </a:xfrm>
+          <a:prstGeom prst="rect">
+            <a:avLst/>
+          </a:prstGeom>
+        </p:spPr>
+        <p:style>
+          <a:lnRef idx="2">
+            <a:schemeClr val="accent6"/>
+          </a:lnRef>
+          <a:fillRef idx="1">
+            <a:schemeClr val="lt1"/>
+          </a:fillRef>
+          <a:effectRef idx="0">
+            <a:schemeClr val="accent6"/>
+          </a:effectRef>
+          <a:fontRef idx="minor">
+            <a:schemeClr val="dk1"/>
+          </a:fontRef>
+        </p:style>
+        <p:txBody>
+          <a:bodyPr rtlCol="0" anchor="ctr"/>
+          <a:lstStyle/>
+          <a:p>
+            <a:pPr algn="ctr"/>
+            <a:r>
+              <a:rPr lang="en-US" sz="1200" dirty="0" smtClean="0"/>
+              <a:t>Mail: status</a:t>
+            </a:r>
+            <a:endParaRPr lang="en-IN" sz="1200" dirty="0"/>
+          </a:p>
+        </p:txBody>
+      </p:sp>
+      <p:sp>
+        <p:nvSpPr>
+          <p:cNvPr id="178" name="Rectangle 177"/>
+          <p:cNvSpPr/>
+          <p:nvPr/>
+        </p:nvSpPr>
+        <p:spPr>
+          <a:xfrm>
+            <a:off x="179512" y="5733256"/>
+            <a:ext cx="1368152" cy="360040"/>
+          </a:xfrm>
+          <a:prstGeom prst="rect">
+            <a:avLst/>
+          </a:prstGeom>
+        </p:spPr>
+        <p:style>
+          <a:lnRef idx="2">
+            <a:schemeClr val="accent1"/>
+          </a:lnRef>
+          <a:fillRef idx="1">
+            <a:schemeClr val="lt1"/>
+          </a:fillRef>
+          <a:effectRef idx="0">
+            <a:schemeClr val="accent1"/>
+          </a:effectRef>
+          <a:fontRef idx="minor">
+            <a:schemeClr val="dk1"/>
+          </a:fontRef>
+        </p:style>
+        <p:txBody>
+          <a:bodyPr rtlCol="0" anchor="ctr"/>
+          <a:lstStyle/>
+          <a:p>
+            <a:pPr algn="ctr"/>
+            <a:r>
+              <a:rPr lang="en-US" sz="1200" dirty="0" smtClean="0"/>
+              <a:t>Enter reason</a:t>
+            </a:r>
+            <a:endParaRPr lang="en-IN" sz="1200" dirty="0"/>
+          </a:p>
+        </p:txBody>
+      </p:sp>
+      <p:cxnSp>
+        <p:nvCxnSpPr>
+          <p:cNvPr id="179" name="Straight Arrow Connector 178"/>
+          <p:cNvCxnSpPr>
+            <a:stCxn id="177" idx="2"/>
+            <a:endCxn id="178" idx="0"/>
+          </p:cNvCxnSpPr>
+          <p:nvPr/>
+        </p:nvCxnSpPr>
+        <p:spPr>
+          <a:xfrm>
+            <a:off x="863587" y="5445224"/>
+            <a:ext cx="1" cy="288032"/>
+          </a:xfrm>
+          <a:prstGeom prst="straightConnector1">
+            <a:avLst/>
+          </a:prstGeom>
+          <a:ln>
+            <a:tailEnd type="arrow"/>
+          </a:ln>
+        </p:spPr>
+        <p:style>
+          <a:lnRef idx="1">
+            <a:schemeClr val="accent1"/>
+          </a:lnRef>
+          <a:fillRef idx="0">
+            <a:schemeClr val="accent1"/>
+          </a:fillRef>
+          <a:effectRef idx="0">
+            <a:schemeClr val="accent1"/>
+          </a:effectRef>
+          <a:fontRef idx="minor">
+            <a:schemeClr val="tx1"/>
+          </a:fontRef>
+        </p:style>
+      </p:cxnSp>
+      <p:cxnSp>
+        <p:nvCxnSpPr>
+          <p:cNvPr id="91" name="Elbow Connector 90"/>
+          <p:cNvCxnSpPr>
+            <a:stCxn id="141" idx="1"/>
+            <a:endCxn id="177" idx="0"/>
+          </p:cNvCxnSpPr>
+          <p:nvPr/>
+        </p:nvCxnSpPr>
+        <p:spPr>
+          <a:xfrm rot="10800000" flipV="1">
+            <a:off x="863588" y="4634098"/>
+            <a:ext cx="396045" cy="451085"/>
+          </a:xfrm>
+          <a:prstGeom prst="bentConnector2">
+            <a:avLst/>
+          </a:prstGeom>
+          <a:ln>
+            <a:tailEnd type="arrow"/>
+          </a:ln>
+        </p:spPr>
+        <p:style>
+          <a:lnRef idx="1">
+            <a:schemeClr val="accent1"/>
+          </a:lnRef>
+          <a:fillRef idx="0">
+            <a:schemeClr val="accent1"/>
+          </a:fillRef>
+          <a:effectRef idx="0">
+            <a:schemeClr val="accent1"/>
+          </a:effectRef>
+          <a:fontRef idx="minor">
+            <a:schemeClr val="tx1"/>
+          </a:fontRef>
+        </p:style>
+      </p:cxnSp>
+      <p:sp>
+        <p:nvSpPr>
+          <p:cNvPr id="182" name="TextBox 181"/>
+          <p:cNvSpPr txBox="1"/>
+          <p:nvPr/>
+        </p:nvSpPr>
+        <p:spPr>
+          <a:xfrm>
+            <a:off x="867736" y="4670746"/>
+            <a:ext cx="464190" cy="276998"/>
+          </a:xfrm>
+          <a:prstGeom prst="rect">
+            <a:avLst/>
+          </a:prstGeom>
+          <a:noFill/>
+        </p:spPr>
+        <p:txBody>
+          <a:bodyPr wrap="square" rtlCol="0">
+            <a:spAutoFit/>
+          </a:bodyPr>
+          <a:lstStyle/>
+          <a:p>
+            <a:r>
+              <a:rPr lang="en-US" sz="1200" dirty="0" smtClean="0"/>
+              <a:t>No</a:t>
+            </a:r>
+            <a:endParaRPr lang="en-IN" sz="1200" dirty="0"/>
+          </a:p>
+        </p:txBody>
+      </p:sp>
+      <p:sp>
+        <p:nvSpPr>
+          <p:cNvPr id="183" name="Oval 182"/>
+          <p:cNvSpPr/>
+          <p:nvPr/>
+        </p:nvSpPr>
+        <p:spPr>
+          <a:xfrm>
+            <a:off x="467544" y="4797152"/>
+            <a:ext cx="216024" cy="216024"/>
+          </a:xfrm>
+          <a:prstGeom prst="ellipse">
+            <a:avLst/>
+          </a:prstGeom>
+        </p:spPr>
+        <p:style>
+          <a:lnRef idx="2">
+            <a:schemeClr val="accent6"/>
+          </a:lnRef>
+          <a:fillRef idx="1">
+            <a:schemeClr val="lt1"/>
+          </a:fillRef>
+          <a:effectRef idx="0">
+            <a:schemeClr val="accent6"/>
+          </a:effectRef>
+          <a:fontRef idx="minor">
+            <a:schemeClr val="dk1"/>
+          </a:fontRef>
+        </p:style>
+        <p:txBody>
+          <a:bodyPr rtlCol="0" anchor="ctr"/>
+          <a:lstStyle/>
+          <a:p>
+            <a:pPr algn="ctr"/>
+            <a:r>
+              <a:rPr lang="en-US" sz="1200" dirty="0" smtClean="0"/>
+              <a:t>5</a:t>
+            </a:r>
+            <a:endParaRPr lang="en-IN" sz="1200" dirty="0"/>
+          </a:p>
+        </p:txBody>
+      </p:sp>
+      <p:sp>
+        <p:nvSpPr>
+          <p:cNvPr id="184" name="Rectangle 183"/>
+          <p:cNvSpPr/>
+          <p:nvPr/>
+        </p:nvSpPr>
+        <p:spPr>
+          <a:xfrm>
+            <a:off x="7554356" y="4410209"/>
+            <a:ext cx="1368152" cy="530959"/>
+          </a:xfrm>
+          <a:prstGeom prst="rect">
+            <a:avLst/>
+          </a:prstGeom>
+        </p:spPr>
+        <p:style>
+          <a:lnRef idx="2">
+            <a:schemeClr val="accent6"/>
+          </a:lnRef>
+          <a:fillRef idx="1">
+            <a:schemeClr val="lt1"/>
+          </a:fillRef>
+          <a:effectRef idx="0">
+            <a:schemeClr val="accent6"/>
+          </a:effectRef>
+          <a:fontRef idx="minor">
+            <a:schemeClr val="dk1"/>
+          </a:fontRef>
+        </p:style>
+        <p:txBody>
+          <a:bodyPr rtlCol="0" anchor="ctr"/>
+          <a:lstStyle/>
+          <a:p>
+            <a:pPr algn="ctr"/>
+            <a:r>
+              <a:rPr lang="en-US" sz="1200" dirty="0" smtClean="0"/>
+              <a:t>Mail: status with booking details &amp; ref number</a:t>
+            </a:r>
+            <a:endParaRPr lang="en-IN" sz="1200" dirty="0"/>
+          </a:p>
+        </p:txBody>
+      </p:sp>
+      <p:cxnSp>
+        <p:nvCxnSpPr>
+          <p:cNvPr id="95" name="Elbow Connector 94"/>
+          <p:cNvCxnSpPr>
+            <a:stCxn id="115" idx="0"/>
+            <a:endCxn id="184" idx="2"/>
+          </p:cNvCxnSpPr>
+          <p:nvPr/>
+        </p:nvCxnSpPr>
+        <p:spPr>
+          <a:xfrm rot="5400000" flipH="1" flipV="1">
+            <a:off x="7593348" y="4692128"/>
+            <a:ext cx="396044" cy="894124"/>
+          </a:xfrm>
+          <a:prstGeom prst="bentConnector3">
+            <a:avLst/>
+          </a:prstGeom>
+          <a:ln>
+            <a:tailEnd type="arrow"/>
+          </a:ln>
+        </p:spPr>
+        <p:style>
+          <a:lnRef idx="1">
+            <a:schemeClr val="accent1"/>
+          </a:lnRef>
+          <a:fillRef idx="0">
+            <a:schemeClr val="accent1"/>
+          </a:fillRef>
+          <a:effectRef idx="0">
+            <a:schemeClr val="accent1"/>
+          </a:effectRef>
+          <a:fontRef idx="minor">
+            <a:schemeClr val="tx1"/>
+          </a:fontRef>
+        </p:style>
+      </p:cxnSp>
+      <p:pic>
+        <p:nvPicPr>
+          <p:cNvPr id="187" name="Picture 5" descr="D:\MyWorkSpace\xampp\htdocs\bmhs\assets\img\bmhs\icons\email.png"/>
+          <p:cNvPicPr>
+            <a:picLocks noChangeAspect="1" noChangeArrowheads="1"/>
+          </p:cNvPicPr>
+          <p:nvPr/>
+        </p:nvPicPr>
+        <p:blipFill>
+          <a:blip r:embed="rId3" cstate="print">
+            <a:extLst>
+              <a:ext uri="{28A0092B-C50C-407E-A947-70E740481C1C}">
+                <a14:useLocalDpi xmlns:a14="http://schemas.microsoft.com/office/drawing/2010/main" val="0"/>
+              </a:ext>
+            </a:extLst>
+          </a:blip>
+          <a:srcRect/>
+          <a:stretch>
+            <a:fillRect/>
+          </a:stretch>
+        </p:blipFill>
+        <p:spPr bwMode="auto">
+          <a:xfrm>
+            <a:off x="7538441" y="4195692"/>
+            <a:ext cx="248502" cy="177392"/>
+          </a:xfrm>
+          <a:prstGeom prst="rect">
+            <a:avLst/>
+          </a:prstGeom>
+          <a:noFill/>
+          <a:extLst>
+            <a:ext uri="{909E8E84-426E-40DD-AFC4-6F175D3DCCD1}">
+              <a14:hiddenFill xmlns:a14="http://schemas.microsoft.com/office/drawing/2010/main">
+                <a:solidFill>
+                  <a:srgbClr val="FFFFFF"/>
+                </a:solidFill>
+              </a14:hiddenFill>
+            </a:ext>
+          </a:extLst>
+        </p:spPr>
+      </p:pic>
+      <p:sp>
+        <p:nvSpPr>
+          <p:cNvPr id="188" name="Oval 187"/>
+          <p:cNvSpPr/>
+          <p:nvPr/>
+        </p:nvSpPr>
+        <p:spPr>
+          <a:xfrm>
+            <a:off x="7871668" y="4136380"/>
+            <a:ext cx="216024" cy="216024"/>
+          </a:xfrm>
+          <a:prstGeom prst="ellipse">
+            <a:avLst/>
+          </a:prstGeom>
+        </p:spPr>
+        <p:style>
+          <a:lnRef idx="2">
+            <a:schemeClr val="accent6"/>
+          </a:lnRef>
+          <a:fillRef idx="1">
+            <a:schemeClr val="lt1"/>
+          </a:fillRef>
+          <a:effectRef idx="0">
+            <a:schemeClr val="accent6"/>
+          </a:effectRef>
+          <a:fontRef idx="minor">
+            <a:schemeClr val="dk1"/>
+          </a:fontRef>
+        </p:style>
+        <p:txBody>
+          <a:bodyPr rtlCol="0" anchor="ctr"/>
+          <a:lstStyle/>
+          <a:p>
+            <a:pPr algn="ctr"/>
+            <a:r>
+              <a:rPr lang="en-US" sz="1200" dirty="0" smtClean="0"/>
+              <a:t>6</a:t>
+            </a:r>
+            <a:endParaRPr lang="en-IN" sz="1200" dirty="0"/>
+          </a:p>
+        </p:txBody>
+      </p:sp>
+    </p:spTree>
+    <p:extLst>
+      <p:ext uri="{BB962C8B-B14F-4D97-AF65-F5344CB8AC3E}">
+        <p14:creationId xmlns:p14="http://schemas.microsoft.com/office/powerpoint/2010/main" val="2988837857"/>
+      </p:ext>
+    </p:extLst>
+  </p:cSld>
+  <p:clrMapOvr>
+    <a:masterClrMapping/>
+  </p:clrMapOvr>
+  <p:timing>
+    <p:tnLst>
+      <p:par>
+        <p:cTn id="1" dur="indefinite" restart="never" nodeType="tmRoot"/>
+      </p:par>
+    </p:tnLst>
+  </p:timing>
+</p:sld>
+</file>
+
+<file path=ppt/slides/slide3.xml><?xml version="1.0" encoding="utf-8"?>
+<p:sld xmlns:a="http://schemas.openxmlformats.org/drawingml/2006/main" xmlns:r="http://schemas.openxmlformats.org/officeDocument/2006/relationships" xmlns:p="http://schemas.openxmlformats.org/presentationml/2006/main">
+  <p:cSld>
+    <p:spTree>
+      <p:nvGrpSpPr>
+        <p:cNvPr id="1" name=""/>
+        <p:cNvGrpSpPr/>
+        <p:nvPr/>
+      </p:nvGrpSpPr>
+      <p:grpSpPr>
+        <a:xfrm>
+          <a:off x="0" y="0"/>
+          <a:ext cx="0" cy="0"/>
+          <a:chOff x="0" y="0"/>
+          <a:chExt cx="0" cy="0"/>
+        </a:xfrm>
+      </p:grpSpPr>
+      <p:grpSp>
+        <p:nvGrpSpPr>
+          <p:cNvPr id="14" name="Group 13"/>
+          <p:cNvGrpSpPr/>
+          <p:nvPr/>
+        </p:nvGrpSpPr>
+        <p:grpSpPr>
+          <a:xfrm>
+            <a:off x="0" y="24880"/>
+            <a:ext cx="9144000" cy="307777"/>
+            <a:chOff x="0" y="24880"/>
+            <a:chExt cx="9144000" cy="307777"/>
+          </a:xfrm>
+        </p:grpSpPr>
+        <p:cxnSp>
+          <p:nvCxnSpPr>
+            <p:cNvPr id="15" name="Straight Connector 14"/>
+            <p:cNvCxnSpPr/>
+            <p:nvPr/>
+          </p:nvCxnSpPr>
+          <p:spPr>
+            <a:xfrm>
+              <a:off x="0" y="332656"/>
+              <a:ext cx="9144000" cy="0"/>
+            </a:xfrm>
+            <a:prstGeom prst="line">
+              <a:avLst/>
+            </a:prstGeom>
+            <a:ln>
+              <a:solidFill>
+                <a:srgbClr val="FFC000"/>
+              </a:solidFill>
+            </a:ln>
+          </p:spPr>
+          <p:style>
+            <a:lnRef idx="1">
+              <a:schemeClr val="accent1"/>
+            </a:lnRef>
+            <a:fillRef idx="0">
+              <a:schemeClr val="accent1"/>
+            </a:fillRef>
+            <a:effectRef idx="0">
+              <a:schemeClr val="accent1"/>
+            </a:effectRef>
+            <a:fontRef idx="minor">
+              <a:schemeClr val="tx1"/>
+            </a:fontRef>
+          </p:style>
+        </p:cxnSp>
+        <p:sp>
+          <p:nvSpPr>
+            <p:cNvPr id="16" name="TextBox 15"/>
+            <p:cNvSpPr txBox="1"/>
+            <p:nvPr/>
+          </p:nvSpPr>
+          <p:spPr>
+            <a:xfrm>
+              <a:off x="35496" y="24880"/>
+              <a:ext cx="7704856" cy="307777"/>
+            </a:xfrm>
+            <a:prstGeom prst="rect">
+              <a:avLst/>
+            </a:prstGeom>
+            <a:noFill/>
+          </p:spPr>
+          <p:txBody>
+            <a:bodyPr wrap="square" rtlCol="0">
+              <a:spAutoFit/>
+            </a:bodyPr>
+            <a:lstStyle/>
+            <a:p>
+              <a:r>
+                <a:rPr lang="en-US" sz="1400" dirty="0" smtClean="0"/>
+                <a:t>Order </a:t>
+              </a:r>
+              <a:r>
+                <a:rPr lang="en-US" sz="1400" dirty="0" smtClean="0"/>
+                <a:t>management</a:t>
+              </a:r>
+              <a:endParaRPr lang="en-IN" sz="1400" dirty="0"/>
+            </a:p>
+          </p:txBody>
+        </p:sp>
+      </p:grpSp>
+      <p:sp>
+        <p:nvSpPr>
+          <p:cNvPr id="1074" name="TextBox 1073"/>
+          <p:cNvSpPr txBox="1"/>
+          <p:nvPr/>
+        </p:nvSpPr>
+        <p:spPr>
+          <a:xfrm>
+            <a:off x="5148064" y="476672"/>
+            <a:ext cx="3888432" cy="5262979"/>
+          </a:xfrm>
+          <a:prstGeom prst="rect">
+            <a:avLst/>
+          </a:prstGeom>
+          <a:noFill/>
+        </p:spPr>
+        <p:txBody>
+          <a:bodyPr wrap="square" rtlCol="0">
+            <a:spAutoFit/>
+          </a:bodyPr>
+          <a:lstStyle/>
+          <a:p>
+            <a:r>
+              <a:rPr lang="en-US" sz="1200" dirty="0" smtClean="0"/>
+              <a:t>Mails:</a:t>
+            </a:r>
+          </a:p>
+          <a:p>
+            <a:pPr marL="228600" indent="-228600">
+              <a:buFont typeface="+mj-lt"/>
+              <a:buAutoNum type="arabicPeriod"/>
+            </a:pPr>
+            <a:r>
+              <a:rPr lang="en-US" sz="1200" dirty="0" smtClean="0"/>
+              <a:t>As soon the booking enquiry is submitted by the user, a booking acknowledgment mail has to sent to user and agent with the booking reference number and other details</a:t>
+            </a:r>
+          </a:p>
+          <a:p>
+            <a:pPr marL="228600" indent="-228600">
+              <a:buFont typeface="+mj-lt"/>
+              <a:buAutoNum type="arabicPeriod"/>
+            </a:pPr>
+            <a:r>
+              <a:rPr lang="en-US" sz="1200" dirty="0" smtClean="0"/>
+              <a:t>If booking is unsuccessful because of non-availability of homestay, then a mail has to be send to user with same booking reference id, quoiting the reason as non-availability of homestay and request to select other</a:t>
+            </a:r>
+          </a:p>
+          <a:p>
+            <a:pPr marL="228600" indent="-228600">
+              <a:buFont typeface="+mj-lt"/>
+              <a:buAutoNum type="arabicPeriod"/>
+            </a:pPr>
+            <a:r>
+              <a:rPr lang="en-US" sz="1200" dirty="0" smtClean="0"/>
+              <a:t>If HS is available then a payment request mail has to be sent to user following the same reference id and also confirming the availability on the booking dates</a:t>
+            </a:r>
+          </a:p>
+          <a:p>
+            <a:pPr marL="228600" indent="-228600">
+              <a:buFont typeface="+mj-lt"/>
+              <a:buAutoNum type="arabicPeriod"/>
+            </a:pPr>
+            <a:r>
+              <a:rPr lang="en-US" sz="1200" dirty="0" smtClean="0"/>
+              <a:t>If payment received successfully then a final confirmation mail  has to be sent to user with the same booking ref ID.</a:t>
+            </a:r>
+          </a:p>
+          <a:p>
+            <a:pPr marL="228600" indent="-228600">
+              <a:buFont typeface="+mj-lt"/>
+              <a:buAutoNum type="arabicPeriod"/>
+            </a:pPr>
+            <a:r>
+              <a:rPr lang="en-US" sz="1200" dirty="0" smtClean="0"/>
+              <a:t>If HS owner is not reachable with in 2HRs of receipt of booking request, then a mail is sent stating that “no answer from HS owner. ”</a:t>
+            </a:r>
+          </a:p>
+          <a:p>
+            <a:pPr marL="228600" indent="-228600">
+              <a:buFont typeface="+mj-lt"/>
+              <a:buAutoNum type="arabicPeriod"/>
+            </a:pPr>
+            <a:r>
+              <a:rPr lang="en-US" sz="1200" dirty="0"/>
+              <a:t>If </a:t>
+            </a:r>
+            <a:r>
+              <a:rPr lang="en-US" sz="1200" dirty="0" smtClean="0"/>
+              <a:t>payment </a:t>
+            </a:r>
+            <a:r>
+              <a:rPr lang="en-US" sz="1200" dirty="0"/>
+              <a:t>is not </a:t>
+            </a:r>
+            <a:r>
+              <a:rPr lang="en-US" sz="1200" dirty="0" smtClean="0"/>
+              <a:t>made </a:t>
+            </a:r>
+            <a:r>
+              <a:rPr lang="en-US" sz="1200" dirty="0"/>
+              <a:t>with in 2HRs of receipt of booking request, then a </a:t>
+            </a:r>
+            <a:r>
+              <a:rPr lang="en-US" sz="1200" dirty="0" smtClean="0"/>
+              <a:t>payment failure/payment no show mail will be sent to user.</a:t>
+            </a:r>
+            <a:endParaRPr lang="en-US" sz="1200" dirty="0"/>
+          </a:p>
+          <a:p>
+            <a:pPr marL="228600" indent="-228600">
+              <a:buFont typeface="+mj-lt"/>
+              <a:buAutoNum type="arabicPeriod"/>
+            </a:pPr>
+            <a:endParaRPr lang="en-US" sz="1200" dirty="0" smtClean="0"/>
+          </a:p>
+          <a:p>
+            <a:pPr marL="228600" indent="-228600">
+              <a:buFont typeface="+mj-lt"/>
+              <a:buAutoNum type="arabicPeriod"/>
+            </a:pPr>
+            <a:endParaRPr lang="en-US" sz="1200" dirty="0" smtClean="0"/>
+          </a:p>
+          <a:p>
+            <a:pPr marL="228600" indent="-228600">
+              <a:buFont typeface="+mj-lt"/>
+              <a:buAutoNum type="arabicPeriod"/>
+            </a:pPr>
+            <a:endParaRPr lang="en-US" sz="1200" dirty="0" smtClean="0"/>
+          </a:p>
+          <a:p>
+            <a:pPr marL="228600" indent="-228600">
+              <a:buFont typeface="+mj-lt"/>
+              <a:buAutoNum type="arabicPeriod"/>
+            </a:pPr>
+            <a:endParaRPr lang="en-US" sz="1200" dirty="0" smtClean="0"/>
+          </a:p>
+          <a:p>
+            <a:pPr marL="228600" indent="-228600">
+              <a:buFont typeface="+mj-lt"/>
+              <a:buAutoNum type="arabicPeriod"/>
+            </a:pPr>
+            <a:endParaRPr lang="en-US" sz="1200" dirty="0" smtClean="0"/>
+          </a:p>
+          <a:p>
+            <a:pPr marL="285750" indent="-285750">
+              <a:buFont typeface="+mj-lt"/>
+              <a:buAutoNum type="arabicPeriod"/>
+            </a:pPr>
+            <a:endParaRPr lang="en-US" sz="1200" dirty="0" smtClean="0"/>
+          </a:p>
+          <a:p>
+            <a:pPr marL="285750" indent="-285750">
+              <a:buFont typeface="Arial" panose="020B0604020202020204" pitchFamily="34" charset="0"/>
+              <a:buChar char="•"/>
+            </a:pPr>
+            <a:endParaRPr lang="en-IN" sz="1200" dirty="0"/>
+          </a:p>
+        </p:txBody>
+      </p:sp>
+      <p:sp>
+        <p:nvSpPr>
+          <p:cNvPr id="89" name="TextBox 88"/>
+          <p:cNvSpPr txBox="1"/>
+          <p:nvPr/>
+        </p:nvSpPr>
+        <p:spPr>
+          <a:xfrm>
+            <a:off x="179512" y="476672"/>
+            <a:ext cx="3888432" cy="4154984"/>
+          </a:xfrm>
+          <a:prstGeom prst="rect">
+            <a:avLst/>
+          </a:prstGeom>
+          <a:noFill/>
+        </p:spPr>
+        <p:txBody>
+          <a:bodyPr wrap="square" rtlCol="0">
+            <a:spAutoFit/>
+          </a:bodyPr>
+          <a:lstStyle/>
+          <a:p>
+            <a:pPr marL="285750" indent="-285750">
+              <a:buFont typeface="Arial" panose="020B0604020202020204" pitchFamily="34" charset="0"/>
+              <a:buChar char="•"/>
+            </a:pPr>
+            <a:r>
+              <a:rPr lang="en-US" sz="1200" dirty="0" smtClean="0"/>
+              <a:t>Booking reference number should be same for a particular order</a:t>
+            </a:r>
+          </a:p>
+          <a:p>
+            <a:pPr marL="285750" indent="-285750">
+              <a:buFont typeface="Arial" panose="020B0604020202020204" pitchFamily="34" charset="0"/>
+              <a:buChar char="•"/>
+            </a:pPr>
+            <a:r>
+              <a:rPr lang="en-US" sz="1200" dirty="0" smtClean="0"/>
+              <a:t>Booking/enquiry mail should consist of booking ref number and other booking details</a:t>
+            </a:r>
+          </a:p>
+          <a:p>
+            <a:pPr marL="285750" indent="-285750">
+              <a:buFont typeface="Arial" panose="020B0604020202020204" pitchFamily="34" charset="0"/>
+              <a:buChar char="•"/>
+            </a:pPr>
+            <a:r>
+              <a:rPr lang="en-US" sz="1200" dirty="0" smtClean="0"/>
+              <a:t>Text box in blues shows the order status which should be populated in the database for particular order as per the progress</a:t>
+            </a:r>
+          </a:p>
+          <a:p>
+            <a:pPr marL="285750" indent="-285750">
+              <a:buFont typeface="Arial" panose="020B0604020202020204" pitchFamily="34" charset="0"/>
+              <a:buChar char="•"/>
+            </a:pPr>
+            <a:r>
+              <a:rPr lang="en-US" sz="1200" dirty="0" smtClean="0"/>
+              <a:t>Unsuccessful booking can be of two types</a:t>
+            </a:r>
+          </a:p>
+          <a:p>
+            <a:pPr marL="742950" lvl="1" indent="-285750">
+              <a:buFont typeface="+mj-lt"/>
+              <a:buAutoNum type="arabicPeriod"/>
+            </a:pPr>
+            <a:r>
+              <a:rPr lang="en-US" sz="1200" dirty="0" smtClean="0"/>
+              <a:t>Homestay not available</a:t>
+            </a:r>
+          </a:p>
+          <a:p>
+            <a:pPr marL="742950" lvl="1" indent="-285750">
+              <a:buFont typeface="+mj-lt"/>
+              <a:buAutoNum type="arabicPeriod"/>
+            </a:pPr>
+            <a:r>
+              <a:rPr lang="en-US" sz="1200" dirty="0" smtClean="0"/>
+              <a:t>Payment awaited</a:t>
+            </a:r>
+          </a:p>
+          <a:p>
+            <a:pPr marL="285750" indent="-285750">
+              <a:buFont typeface="Arial" panose="020B0604020202020204" pitchFamily="34" charset="0"/>
+              <a:buChar char="•"/>
+            </a:pPr>
+            <a:r>
+              <a:rPr lang="en-US" sz="1200" dirty="0" smtClean="0"/>
+              <a:t>In case of 1, make the status as unsuccessful and write the correct reason</a:t>
+            </a:r>
+          </a:p>
+          <a:p>
+            <a:pPr marL="285750" indent="-285750">
+              <a:buFont typeface="Arial" panose="020B0604020202020204" pitchFamily="34" charset="0"/>
+              <a:buChar char="•"/>
+            </a:pPr>
+            <a:r>
+              <a:rPr lang="en-US" sz="1200" dirty="0" smtClean="0"/>
+              <a:t>In case of 2, user tries to make the payment but its failed or user doesn't make payment with in 2hrs from the time of email receipt. After 2hrs release the calendar if blocked earlier</a:t>
+            </a:r>
+          </a:p>
+          <a:p>
+            <a:pPr marL="285750" indent="-285750">
+              <a:buFont typeface="Arial" panose="020B0604020202020204" pitchFamily="34" charset="0"/>
+              <a:buChar char="•"/>
+            </a:pPr>
+            <a:r>
+              <a:rPr lang="en-US" sz="1200" dirty="0" smtClean="0"/>
+              <a:t>Block the calendar of particular home stay if payment is successful</a:t>
+            </a:r>
+          </a:p>
+          <a:p>
+            <a:pPr marL="285750" indent="-285750">
+              <a:buFont typeface="Arial" panose="020B0604020202020204" pitchFamily="34" charset="0"/>
+              <a:buChar char="•"/>
+            </a:pPr>
+            <a:r>
+              <a:rPr lang="en-US" sz="1200" dirty="0"/>
+              <a:t>If homestay owner not reachable, then change the booking status </a:t>
+            </a:r>
+            <a:r>
+              <a:rPr lang="en-US" sz="1200"/>
+              <a:t>to </a:t>
+            </a:r>
+            <a:r>
+              <a:rPr lang="en-US" sz="1200" smtClean="0"/>
+              <a:t>“processing </a:t>
+            </a:r>
+            <a:r>
+              <a:rPr lang="en-US" sz="1200"/>
+              <a:t>back </a:t>
+            </a:r>
+            <a:r>
+              <a:rPr lang="en-US" sz="1200" smtClean="0"/>
+              <a:t>log” </a:t>
+            </a:r>
+            <a:r>
+              <a:rPr lang="en-US" sz="1200" dirty="0"/>
+              <a:t>so that the owner can be contacted later</a:t>
+            </a:r>
+          </a:p>
+          <a:p>
+            <a:pPr marL="285750" indent="-285750">
+              <a:buFont typeface="Arial" panose="020B0604020202020204" pitchFamily="34" charset="0"/>
+              <a:buChar char="•"/>
+            </a:pPr>
+            <a:endParaRPr lang="en-IN" sz="1200" dirty="0"/>
+          </a:p>
+        </p:txBody>
+      </p:sp>
+    </p:spTree>
+    <p:extLst>
+      <p:ext uri="{BB962C8B-B14F-4D97-AF65-F5344CB8AC3E}">
+        <p14:creationId xmlns:p14="http://schemas.microsoft.com/office/powerpoint/2010/main" val="3117874647"/>
+      </p:ext>
+    </p:extLst>
+  </p:cSld>
+  <p:clrMapOvr>
+    <a:masterClrMapping/>
+  </p:clrMapOvr>
+  <p:timing>
+    <p:tnLst>
+      <p:par>
+        <p:cTn id="1" dur="indefinite" restart="never" nodeType="tmRoot"/>
+      </p:par>
+    </p:tnLst>
+  </p:timing>
+</p:sld>
+</file>
+
+<file path=ppt/slides/slide4.xml><?xml version="1.0" encoding="utf-8"?>
+<p:sld xmlns:a="http://schemas.openxmlformats.org/drawingml/2006/main" xmlns:r="http://schemas.openxmlformats.org/officeDocument/2006/relationships" xmlns:p="http://schemas.openxmlformats.org/presentationml/2006/main">
+  <p:cSld>
+    <p:spTree>
+      <p:nvGrpSpPr>
+        <p:cNvPr id="1" name=""/>
+        <p:cNvGrpSpPr/>
+        <p:nvPr/>
+      </p:nvGrpSpPr>
+      <p:grpSpPr>
+        <a:xfrm>
+          <a:off x="0" y="0"/>
+          <a:ext cx="0" cy="0"/>
+          <a:chOff x="0" y="0"/>
+          <a:chExt cx="0" cy="0"/>
+        </a:xfrm>
+      </p:grpSpPr>
+      <p:grpSp>
+        <p:nvGrpSpPr>
           <p:cNvPr id="6" name="Group 5"/>
           <p:cNvGrpSpPr/>
           <p:nvPr/>
@@ -8380,6 +11751,907 @@
     <p:extLst>
       <p:ext uri="{BB962C8B-B14F-4D97-AF65-F5344CB8AC3E}">
         <p14:creationId xmlns:p14="http://schemas.microsoft.com/office/powerpoint/2010/main" val="2135036576"/>
+      </p:ext>
+    </p:extLst>
+  </p:cSld>
+  <p:clrMapOvr>
+    <a:masterClrMapping/>
+  </p:clrMapOvr>
+  <p:timing>
+    <p:tnLst>
+      <p:par>
+        <p:cTn id="1" dur="indefinite" restart="never" nodeType="tmRoot"/>
+      </p:par>
+    </p:tnLst>
+  </p:timing>
+</p:sld>
+</file>
+
+<file path=ppt/slides/slide5.xml><?xml version="1.0" encoding="utf-8"?>
+<p:sld xmlns:a="http://schemas.openxmlformats.org/drawingml/2006/main" xmlns:r="http://schemas.openxmlformats.org/officeDocument/2006/relationships" xmlns:p="http://schemas.openxmlformats.org/presentationml/2006/main">
+  <p:cSld>
+    <p:spTree>
+      <p:nvGrpSpPr>
+        <p:cNvPr id="1" name=""/>
+        <p:cNvGrpSpPr/>
+        <p:nvPr/>
+      </p:nvGrpSpPr>
+      <p:grpSpPr>
+        <a:xfrm>
+          <a:off x="0" y="0"/>
+          <a:ext cx="0" cy="0"/>
+          <a:chOff x="0" y="0"/>
+          <a:chExt cx="0" cy="0"/>
+        </a:xfrm>
+      </p:grpSpPr>
+      <p:grpSp>
+        <p:nvGrpSpPr>
+          <p:cNvPr id="2" name="Group 1"/>
+          <p:cNvGrpSpPr/>
+          <p:nvPr/>
+        </p:nvGrpSpPr>
+        <p:grpSpPr>
+          <a:xfrm>
+            <a:off x="0" y="24880"/>
+            <a:ext cx="9144000" cy="307776"/>
+            <a:chOff x="0" y="24880"/>
+            <a:chExt cx="9144000" cy="307776"/>
+          </a:xfrm>
+        </p:grpSpPr>
+        <p:cxnSp>
+          <p:nvCxnSpPr>
+            <p:cNvPr id="3" name="Straight Connector 2"/>
+            <p:cNvCxnSpPr/>
+            <p:nvPr/>
+          </p:nvCxnSpPr>
+          <p:spPr>
+            <a:xfrm>
+              <a:off x="0" y="332656"/>
+              <a:ext cx="9144000" cy="0"/>
+            </a:xfrm>
+            <a:prstGeom prst="line">
+              <a:avLst/>
+            </a:prstGeom>
+            <a:ln>
+              <a:solidFill>
+                <a:srgbClr val="FFC000"/>
+              </a:solidFill>
+            </a:ln>
+          </p:spPr>
+          <p:style>
+            <a:lnRef idx="1">
+              <a:schemeClr val="accent1"/>
+            </a:lnRef>
+            <a:fillRef idx="0">
+              <a:schemeClr val="accent1"/>
+            </a:fillRef>
+            <a:effectRef idx="0">
+              <a:schemeClr val="accent1"/>
+            </a:effectRef>
+            <a:fontRef idx="minor">
+              <a:schemeClr val="tx1"/>
+            </a:fontRef>
+          </p:style>
+        </p:cxnSp>
+        <p:sp>
+          <p:nvSpPr>
+            <p:cNvPr id="4" name="TextBox 3"/>
+            <p:cNvSpPr txBox="1"/>
+            <p:nvPr/>
+          </p:nvSpPr>
+          <p:spPr>
+            <a:xfrm>
+              <a:off x="35496" y="24880"/>
+              <a:ext cx="7704856" cy="276999"/>
+            </a:xfrm>
+            <a:prstGeom prst="rect">
+              <a:avLst/>
+            </a:prstGeom>
+            <a:noFill/>
+          </p:spPr>
+          <p:txBody>
+            <a:bodyPr wrap="square" rtlCol="0">
+              <a:spAutoFit/>
+            </a:bodyPr>
+            <a:lstStyle/>
+            <a:p>
+              <a:r>
+                <a:rPr lang="en-US" sz="1200" dirty="0" smtClean="0"/>
+                <a:t>Navigation</a:t>
+              </a:r>
+              <a:endParaRPr lang="en-IN" sz="1200" dirty="0"/>
+            </a:p>
+          </p:txBody>
+        </p:sp>
+      </p:grpSp>
+      <p:grpSp>
+        <p:nvGrpSpPr>
+          <p:cNvPr id="33" name="Group 32"/>
+          <p:cNvGrpSpPr/>
+          <p:nvPr/>
+        </p:nvGrpSpPr>
+        <p:grpSpPr>
+          <a:xfrm>
+            <a:off x="66560" y="377456"/>
+            <a:ext cx="1841144" cy="1784608"/>
+            <a:chOff x="66560" y="377456"/>
+            <a:chExt cx="1841144" cy="1784608"/>
+          </a:xfrm>
+        </p:grpSpPr>
+        <p:sp>
+          <p:nvSpPr>
+            <p:cNvPr id="5" name="Rectangle 4"/>
+            <p:cNvSpPr/>
+            <p:nvPr/>
+          </p:nvSpPr>
+          <p:spPr>
+            <a:xfrm>
+              <a:off x="66560" y="418312"/>
+              <a:ext cx="360040" cy="1743752"/>
+            </a:xfrm>
+            <a:prstGeom prst="rect">
+              <a:avLst/>
+            </a:prstGeom>
+          </p:spPr>
+          <p:style>
+            <a:lnRef idx="2">
+              <a:schemeClr val="accent6">
+                <a:shade val="50000"/>
+              </a:schemeClr>
+            </a:lnRef>
+            <a:fillRef idx="1">
+              <a:schemeClr val="accent6"/>
+            </a:fillRef>
+            <a:effectRef idx="0">
+              <a:schemeClr val="accent6"/>
+            </a:effectRef>
+            <a:fontRef idx="minor">
+              <a:schemeClr val="lt1"/>
+            </a:fontRef>
+          </p:style>
+          <p:txBody>
+            <a:bodyPr vert="vert270" rtlCol="0" anchor="ctr"/>
+            <a:lstStyle/>
+            <a:p>
+              <a:pPr algn="ctr"/>
+              <a:r>
+                <a:rPr lang="en-US" sz="1200" dirty="0" smtClean="0"/>
+                <a:t>Header</a:t>
+              </a:r>
+            </a:p>
+          </p:txBody>
+        </p:sp>
+        <p:sp>
+          <p:nvSpPr>
+            <p:cNvPr id="28" name="Rectangle 27"/>
+            <p:cNvSpPr/>
+            <p:nvPr/>
+          </p:nvSpPr>
+          <p:spPr>
+            <a:xfrm>
+              <a:off x="395536" y="377456"/>
+              <a:ext cx="1512168" cy="1784608"/>
+            </a:xfrm>
+            <a:prstGeom prst="rect">
+              <a:avLst/>
+            </a:prstGeom>
+            <a:noFill/>
+            <a:ln>
+              <a:noFill/>
+            </a:ln>
+          </p:spPr>
+          <p:style>
+            <a:lnRef idx="2">
+              <a:schemeClr val="accent6">
+                <a:shade val="50000"/>
+              </a:schemeClr>
+            </a:lnRef>
+            <a:fillRef idx="1">
+              <a:schemeClr val="accent6"/>
+            </a:fillRef>
+            <a:effectRef idx="0">
+              <a:schemeClr val="accent6"/>
+            </a:effectRef>
+            <a:fontRef idx="minor">
+              <a:schemeClr val="lt1"/>
+            </a:fontRef>
+          </p:style>
+          <p:txBody>
+            <a:bodyPr vert="horz" rtlCol="0" anchor="t"/>
+            <a:lstStyle/>
+            <a:p>
+              <a:pPr marL="171450" indent="-171450">
+                <a:buFont typeface="Arial" panose="020B0604020202020204" pitchFamily="34" charset="0"/>
+                <a:buChar char="•"/>
+              </a:pPr>
+              <a:r>
+                <a:rPr lang="en-US" sz="1200" dirty="0" smtClean="0">
+                  <a:solidFill>
+                    <a:schemeClr val="tx1"/>
+                  </a:solidFill>
+                </a:rPr>
+                <a:t>Change location</a:t>
+              </a:r>
+            </a:p>
+            <a:p>
+              <a:pPr marL="171450" indent="-171450">
+                <a:buFont typeface="Arial" panose="020B0604020202020204" pitchFamily="34" charset="0"/>
+                <a:buChar char="•"/>
+              </a:pPr>
+              <a:r>
+                <a:rPr lang="en-US" sz="1200" dirty="0" smtClean="0">
+                  <a:solidFill>
+                    <a:schemeClr val="tx1"/>
+                  </a:solidFill>
+                </a:rPr>
+                <a:t>Register</a:t>
+              </a:r>
+            </a:p>
+            <a:p>
+              <a:pPr marL="171450" indent="-171450">
+                <a:buFont typeface="Arial" panose="020B0604020202020204" pitchFamily="34" charset="0"/>
+                <a:buChar char="•"/>
+              </a:pPr>
+              <a:r>
+                <a:rPr lang="en-US" sz="1200" dirty="0" smtClean="0">
+                  <a:solidFill>
+                    <a:schemeClr val="tx1"/>
+                  </a:solidFill>
+                </a:rPr>
+                <a:t>Login</a:t>
+              </a:r>
+            </a:p>
+            <a:p>
+              <a:pPr marL="171450" indent="-171450">
+                <a:buFont typeface="Arial" panose="020B0604020202020204" pitchFamily="34" charset="0"/>
+                <a:buChar char="•"/>
+              </a:pPr>
+              <a:r>
+                <a:rPr lang="en-US" sz="1200" dirty="0" smtClean="0">
+                  <a:solidFill>
+                    <a:schemeClr val="tx1"/>
+                  </a:solidFill>
+                </a:rPr>
+                <a:t>Offers</a:t>
+              </a:r>
+            </a:p>
+            <a:p>
+              <a:pPr marL="171450" indent="-171450">
+                <a:buFont typeface="Arial" panose="020B0604020202020204" pitchFamily="34" charset="0"/>
+                <a:buChar char="•"/>
+              </a:pPr>
+              <a:r>
+                <a:rPr lang="en-US" sz="1200" dirty="0" smtClean="0">
+                  <a:solidFill>
+                    <a:schemeClr val="tx1"/>
+                  </a:solidFill>
+                </a:rPr>
+                <a:t>Contact us</a:t>
+              </a:r>
+            </a:p>
+            <a:p>
+              <a:pPr marL="171450" indent="-171450">
+                <a:buFont typeface="Arial" panose="020B0604020202020204" pitchFamily="34" charset="0"/>
+                <a:buChar char="•"/>
+              </a:pPr>
+              <a:r>
+                <a:rPr lang="en-US" sz="1200" dirty="0" smtClean="0">
+                  <a:solidFill>
+                    <a:schemeClr val="tx1"/>
+                  </a:solidFill>
+                </a:rPr>
+                <a:t>Ad details &amp; booking page</a:t>
+              </a:r>
+            </a:p>
+          </p:txBody>
+        </p:sp>
+      </p:grpSp>
+      <p:grpSp>
+        <p:nvGrpSpPr>
+          <p:cNvPr id="34" name="Group 33"/>
+          <p:cNvGrpSpPr/>
+          <p:nvPr/>
+        </p:nvGrpSpPr>
+        <p:grpSpPr>
+          <a:xfrm>
+            <a:off x="62542" y="2162064"/>
+            <a:ext cx="1841144" cy="4533648"/>
+            <a:chOff x="66560" y="377456"/>
+            <a:chExt cx="1841144" cy="1784608"/>
+          </a:xfrm>
+        </p:grpSpPr>
+        <p:sp>
+          <p:nvSpPr>
+            <p:cNvPr id="35" name="Rectangle 34"/>
+            <p:cNvSpPr/>
+            <p:nvPr/>
+          </p:nvSpPr>
+          <p:spPr>
+            <a:xfrm>
+              <a:off x="66560" y="418312"/>
+              <a:ext cx="360040" cy="1743752"/>
+            </a:xfrm>
+            <a:prstGeom prst="rect">
+              <a:avLst/>
+            </a:prstGeom>
+          </p:spPr>
+          <p:style>
+            <a:lnRef idx="2">
+              <a:schemeClr val="accent6">
+                <a:shade val="50000"/>
+              </a:schemeClr>
+            </a:lnRef>
+            <a:fillRef idx="1">
+              <a:schemeClr val="accent6"/>
+            </a:fillRef>
+            <a:effectRef idx="0">
+              <a:schemeClr val="accent6"/>
+            </a:effectRef>
+            <a:fontRef idx="minor">
+              <a:schemeClr val="lt1"/>
+            </a:fontRef>
+          </p:style>
+          <p:txBody>
+            <a:bodyPr vert="vert270" rtlCol="0" anchor="ctr"/>
+            <a:lstStyle/>
+            <a:p>
+              <a:pPr algn="ctr"/>
+              <a:r>
+                <a:rPr lang="en-US" sz="1200" dirty="0" smtClean="0"/>
+                <a:t>Footer</a:t>
+              </a:r>
+            </a:p>
+          </p:txBody>
+        </p:sp>
+        <p:sp>
+          <p:nvSpPr>
+            <p:cNvPr id="36" name="Rectangle 35"/>
+            <p:cNvSpPr/>
+            <p:nvPr/>
+          </p:nvSpPr>
+          <p:spPr>
+            <a:xfrm>
+              <a:off x="395536" y="377456"/>
+              <a:ext cx="1512168" cy="1784608"/>
+            </a:xfrm>
+            <a:prstGeom prst="rect">
+              <a:avLst/>
+            </a:prstGeom>
+            <a:noFill/>
+            <a:ln>
+              <a:noFill/>
+            </a:ln>
+          </p:spPr>
+          <p:style>
+            <a:lnRef idx="2">
+              <a:schemeClr val="accent6">
+                <a:shade val="50000"/>
+              </a:schemeClr>
+            </a:lnRef>
+            <a:fillRef idx="1">
+              <a:schemeClr val="accent6"/>
+            </a:fillRef>
+            <a:effectRef idx="0">
+              <a:schemeClr val="accent6"/>
+            </a:effectRef>
+            <a:fontRef idx="minor">
+              <a:schemeClr val="lt1"/>
+            </a:fontRef>
+          </p:style>
+          <p:txBody>
+            <a:bodyPr vert="horz" rtlCol="0" anchor="t"/>
+            <a:lstStyle/>
+            <a:p>
+              <a:pPr marL="171450" indent="-171450">
+                <a:buFont typeface="Arial" panose="020B0604020202020204" pitchFamily="34" charset="0"/>
+                <a:buChar char="•"/>
+              </a:pPr>
+              <a:r>
+                <a:rPr lang="en-US" sz="1200" dirty="0">
+                  <a:solidFill>
+                    <a:schemeClr val="tx1"/>
+                  </a:solidFill>
+                </a:rPr>
+                <a:t>Home</a:t>
+              </a:r>
+            </a:p>
+            <a:p>
+              <a:pPr marL="171450" indent="-171450">
+                <a:buFont typeface="Arial" panose="020B0604020202020204" pitchFamily="34" charset="0"/>
+                <a:buChar char="•"/>
+              </a:pPr>
+              <a:r>
+                <a:rPr lang="en-US" sz="1200" dirty="0">
+                  <a:solidFill>
+                    <a:schemeClr val="tx1"/>
+                  </a:solidFill>
+                </a:rPr>
+                <a:t>Categories</a:t>
+              </a:r>
+            </a:p>
+            <a:p>
+              <a:pPr marL="171450" indent="-171450">
+                <a:buFont typeface="Arial" panose="020B0604020202020204" pitchFamily="34" charset="0"/>
+                <a:buChar char="•"/>
+              </a:pPr>
+              <a:r>
+                <a:rPr lang="en-US" sz="1200" dirty="0">
+                  <a:solidFill>
+                    <a:schemeClr val="tx1"/>
+                  </a:solidFill>
+                </a:rPr>
+                <a:t>Browse</a:t>
+              </a:r>
+            </a:p>
+            <a:p>
+              <a:pPr marL="171450" indent="-171450">
+                <a:buFont typeface="Arial" panose="020B0604020202020204" pitchFamily="34" charset="0"/>
+                <a:buChar char="•"/>
+              </a:pPr>
+              <a:r>
+                <a:rPr lang="en-US" sz="1200" dirty="0">
+                  <a:solidFill>
+                    <a:schemeClr val="tx1"/>
+                  </a:solidFill>
+                </a:rPr>
+                <a:t>Register</a:t>
+              </a:r>
+            </a:p>
+            <a:p>
+              <a:pPr marL="171450" indent="-171450">
+                <a:buFont typeface="Arial" panose="020B0604020202020204" pitchFamily="34" charset="0"/>
+                <a:buChar char="•"/>
+              </a:pPr>
+              <a:r>
+                <a:rPr lang="en-US" sz="1200" dirty="0">
+                  <a:solidFill>
+                    <a:schemeClr val="tx1"/>
+                  </a:solidFill>
+                </a:rPr>
+                <a:t>Login</a:t>
+              </a:r>
+            </a:p>
+            <a:p>
+              <a:pPr marL="171450" indent="-171450">
+                <a:buFont typeface="Arial" panose="020B0604020202020204" pitchFamily="34" charset="0"/>
+                <a:buChar char="•"/>
+              </a:pPr>
+              <a:r>
+                <a:rPr lang="en-US" sz="1200" dirty="0">
+                  <a:solidFill>
+                    <a:schemeClr val="tx1"/>
+                  </a:solidFill>
+                </a:rPr>
+                <a:t>T &amp; C</a:t>
+              </a:r>
+            </a:p>
+            <a:p>
+              <a:pPr marL="171450" indent="-171450">
+                <a:buFont typeface="Arial" panose="020B0604020202020204" pitchFamily="34" charset="0"/>
+                <a:buChar char="•"/>
+              </a:pPr>
+              <a:r>
+                <a:rPr lang="en-US" sz="1200" dirty="0">
+                  <a:solidFill>
+                    <a:schemeClr val="tx1"/>
+                  </a:solidFill>
+                </a:rPr>
+                <a:t>Privacy policy</a:t>
+              </a:r>
+            </a:p>
+            <a:p>
+              <a:pPr marL="171450" indent="-171450">
+                <a:buFont typeface="Arial" panose="020B0604020202020204" pitchFamily="34" charset="0"/>
+                <a:buChar char="•"/>
+              </a:pPr>
+              <a:r>
+                <a:rPr lang="en-US" sz="1200" dirty="0">
+                  <a:solidFill>
+                    <a:schemeClr val="tx1"/>
+                  </a:solidFill>
+                </a:rPr>
+                <a:t>Cancellation policy</a:t>
+              </a:r>
+            </a:p>
+            <a:p>
+              <a:pPr marL="171450" indent="-171450">
+                <a:buFont typeface="Arial" panose="020B0604020202020204" pitchFamily="34" charset="0"/>
+                <a:buChar char="•"/>
+              </a:pPr>
+              <a:r>
+                <a:rPr lang="en-US" sz="1200" dirty="0">
+                  <a:solidFill>
+                    <a:schemeClr val="tx1"/>
+                  </a:solidFill>
+                </a:rPr>
+                <a:t>Termination policy</a:t>
+              </a:r>
+            </a:p>
+            <a:p>
+              <a:pPr marL="171450" indent="-171450">
+                <a:buFont typeface="Arial" panose="020B0604020202020204" pitchFamily="34" charset="0"/>
+                <a:buChar char="•"/>
+              </a:pPr>
+              <a:r>
+                <a:rPr lang="en-US" sz="1200" dirty="0">
+                  <a:solidFill>
+                    <a:schemeClr val="tx1"/>
+                  </a:solidFill>
+                </a:rPr>
+                <a:t>Site map</a:t>
+              </a:r>
+            </a:p>
+            <a:p>
+              <a:pPr marL="171450" indent="-171450">
+                <a:buFont typeface="Arial" panose="020B0604020202020204" pitchFamily="34" charset="0"/>
+                <a:buChar char="•"/>
+              </a:pPr>
+              <a:r>
+                <a:rPr lang="en-US" sz="1200" dirty="0">
+                  <a:solidFill>
+                    <a:schemeClr val="tx1"/>
+                  </a:solidFill>
+                </a:rPr>
+                <a:t>About us</a:t>
+              </a:r>
+            </a:p>
+            <a:p>
+              <a:pPr marL="171450" indent="-171450">
+                <a:buFont typeface="Arial" panose="020B0604020202020204" pitchFamily="34" charset="0"/>
+                <a:buChar char="•"/>
+              </a:pPr>
+              <a:r>
+                <a:rPr lang="en-US" sz="1200" dirty="0">
+                  <a:solidFill>
+                    <a:schemeClr val="tx1"/>
+                  </a:solidFill>
+                </a:rPr>
+                <a:t>Contact us</a:t>
+              </a:r>
+            </a:p>
+            <a:p>
+              <a:pPr marL="171450" indent="-171450">
+                <a:buFont typeface="Arial" panose="020B0604020202020204" pitchFamily="34" charset="0"/>
+                <a:buChar char="•"/>
+              </a:pPr>
+              <a:r>
+                <a:rPr lang="en-US" sz="1200" dirty="0">
+                  <a:solidFill>
+                    <a:schemeClr val="tx1"/>
+                  </a:solidFill>
+                </a:rPr>
+                <a:t>FAQ</a:t>
+              </a:r>
+            </a:p>
+            <a:p>
+              <a:pPr marL="171450" indent="-171450">
+                <a:buFont typeface="Arial" panose="020B0604020202020204" pitchFamily="34" charset="0"/>
+                <a:buChar char="•"/>
+              </a:pPr>
+              <a:r>
+                <a:rPr lang="en-US" sz="1200" dirty="0">
+                  <a:solidFill>
+                    <a:schemeClr val="tx1"/>
+                  </a:solidFill>
+                </a:rPr>
+                <a:t>Category result page</a:t>
+              </a:r>
+            </a:p>
+          </p:txBody>
+        </p:sp>
+      </p:grpSp>
+      <p:grpSp>
+        <p:nvGrpSpPr>
+          <p:cNvPr id="37" name="Group 36"/>
+          <p:cNvGrpSpPr/>
+          <p:nvPr/>
+        </p:nvGrpSpPr>
+        <p:grpSpPr>
+          <a:xfrm>
+            <a:off x="1931150" y="397884"/>
+            <a:ext cx="1841144" cy="1784608"/>
+            <a:chOff x="66560" y="377456"/>
+            <a:chExt cx="1841144" cy="1784608"/>
+          </a:xfrm>
+        </p:grpSpPr>
+        <p:sp>
+          <p:nvSpPr>
+            <p:cNvPr id="38" name="Rectangle 37"/>
+            <p:cNvSpPr/>
+            <p:nvPr/>
+          </p:nvSpPr>
+          <p:spPr>
+            <a:xfrm>
+              <a:off x="66560" y="418312"/>
+              <a:ext cx="360040" cy="1743752"/>
+            </a:xfrm>
+            <a:prstGeom prst="rect">
+              <a:avLst/>
+            </a:prstGeom>
+          </p:spPr>
+          <p:style>
+            <a:lnRef idx="2">
+              <a:schemeClr val="accent6">
+                <a:shade val="50000"/>
+              </a:schemeClr>
+            </a:lnRef>
+            <a:fillRef idx="1">
+              <a:schemeClr val="accent6"/>
+            </a:fillRef>
+            <a:effectRef idx="0">
+              <a:schemeClr val="accent6"/>
+            </a:effectRef>
+            <a:fontRef idx="minor">
+              <a:schemeClr val="lt1"/>
+            </a:fontRef>
+          </p:style>
+          <p:txBody>
+            <a:bodyPr vert="vert270" rtlCol="0" anchor="ctr"/>
+            <a:lstStyle/>
+            <a:p>
+              <a:pPr algn="ctr"/>
+              <a:r>
+                <a:rPr lang="en-US" sz="1200" dirty="0" smtClean="0"/>
+                <a:t>Home page</a:t>
+              </a:r>
+            </a:p>
+          </p:txBody>
+        </p:sp>
+        <p:sp>
+          <p:nvSpPr>
+            <p:cNvPr id="39" name="Rectangle 38"/>
+            <p:cNvSpPr/>
+            <p:nvPr/>
+          </p:nvSpPr>
+          <p:spPr>
+            <a:xfrm>
+              <a:off x="395536" y="377456"/>
+              <a:ext cx="1512168" cy="1784608"/>
+            </a:xfrm>
+            <a:prstGeom prst="rect">
+              <a:avLst/>
+            </a:prstGeom>
+            <a:noFill/>
+            <a:ln>
+              <a:noFill/>
+            </a:ln>
+          </p:spPr>
+          <p:style>
+            <a:lnRef idx="2">
+              <a:schemeClr val="accent6">
+                <a:shade val="50000"/>
+              </a:schemeClr>
+            </a:lnRef>
+            <a:fillRef idx="1">
+              <a:schemeClr val="accent6"/>
+            </a:fillRef>
+            <a:effectRef idx="0">
+              <a:schemeClr val="accent6"/>
+            </a:effectRef>
+            <a:fontRef idx="minor">
+              <a:schemeClr val="lt1"/>
+            </a:fontRef>
+          </p:style>
+          <p:txBody>
+            <a:bodyPr vert="horz" rtlCol="0" anchor="t"/>
+            <a:lstStyle/>
+            <a:p>
+              <a:pPr marL="171450" indent="-171450">
+                <a:buFont typeface="Arial" panose="020B0604020202020204" pitchFamily="34" charset="0"/>
+                <a:buChar char="•"/>
+              </a:pPr>
+              <a:r>
+                <a:rPr lang="en-US" sz="1200" dirty="0">
+                  <a:solidFill>
+                    <a:schemeClr val="tx1"/>
+                  </a:solidFill>
+                </a:rPr>
+                <a:t>Category result page</a:t>
+              </a:r>
+            </a:p>
+            <a:p>
+              <a:pPr marL="171450" indent="-171450">
+                <a:buFont typeface="Arial" panose="020B0604020202020204" pitchFamily="34" charset="0"/>
+                <a:buChar char="•"/>
+              </a:pPr>
+              <a:r>
+                <a:rPr lang="en-US" sz="1200" dirty="0">
+                  <a:solidFill>
+                    <a:schemeClr val="tx1"/>
+                  </a:solidFill>
+                </a:rPr>
+                <a:t>Ad details &amp; booking page</a:t>
+              </a:r>
+            </a:p>
+            <a:p>
+              <a:pPr marL="171450" indent="-171450">
+                <a:buFont typeface="Arial" panose="020B0604020202020204" pitchFamily="34" charset="0"/>
+                <a:buChar char="•"/>
+              </a:pPr>
+              <a:r>
+                <a:rPr lang="en-US" sz="1200" dirty="0">
+                  <a:solidFill>
+                    <a:schemeClr val="tx1"/>
+                  </a:solidFill>
+                </a:rPr>
+                <a:t>Gallery</a:t>
+              </a:r>
+            </a:p>
+            <a:p>
+              <a:pPr marL="171450" indent="-171450">
+                <a:buFont typeface="Arial" panose="020B0604020202020204" pitchFamily="34" charset="0"/>
+                <a:buChar char="•"/>
+              </a:pPr>
+              <a:r>
+                <a:rPr lang="en-US" sz="1200" dirty="0">
+                  <a:solidFill>
+                    <a:schemeClr val="tx1"/>
+                  </a:solidFill>
+                </a:rPr>
+                <a:t>About us</a:t>
+              </a:r>
+            </a:p>
+          </p:txBody>
+        </p:sp>
+      </p:grpSp>
+      <p:grpSp>
+        <p:nvGrpSpPr>
+          <p:cNvPr id="40" name="Group 39"/>
+          <p:cNvGrpSpPr/>
+          <p:nvPr/>
+        </p:nvGrpSpPr>
+        <p:grpSpPr>
+          <a:xfrm>
+            <a:off x="1938768" y="2213959"/>
+            <a:ext cx="1841144" cy="4533648"/>
+            <a:chOff x="66560" y="377456"/>
+            <a:chExt cx="1841144" cy="1784608"/>
+          </a:xfrm>
+        </p:grpSpPr>
+        <p:sp>
+          <p:nvSpPr>
+            <p:cNvPr id="41" name="Rectangle 40"/>
+            <p:cNvSpPr/>
+            <p:nvPr/>
+          </p:nvSpPr>
+          <p:spPr>
+            <a:xfrm>
+              <a:off x="66560" y="418312"/>
+              <a:ext cx="360040" cy="1743752"/>
+            </a:xfrm>
+            <a:prstGeom prst="rect">
+              <a:avLst/>
+            </a:prstGeom>
+          </p:spPr>
+          <p:style>
+            <a:lnRef idx="2">
+              <a:schemeClr val="accent6">
+                <a:shade val="50000"/>
+              </a:schemeClr>
+            </a:lnRef>
+            <a:fillRef idx="1">
+              <a:schemeClr val="accent6"/>
+            </a:fillRef>
+            <a:effectRef idx="0">
+              <a:schemeClr val="accent6"/>
+            </a:effectRef>
+            <a:fontRef idx="minor">
+              <a:schemeClr val="lt1"/>
+            </a:fontRef>
+          </p:style>
+          <p:txBody>
+            <a:bodyPr vert="vert270" rtlCol="0" anchor="ctr"/>
+            <a:lstStyle/>
+            <a:p>
+              <a:pPr algn="ctr"/>
+              <a:r>
+                <a:rPr lang="en-US" sz="1200" dirty="0" smtClean="0"/>
+                <a:t>Ad detail &amp; booking page</a:t>
+              </a:r>
+            </a:p>
+          </p:txBody>
+        </p:sp>
+        <p:sp>
+          <p:nvSpPr>
+            <p:cNvPr id="42" name="Rectangle 41"/>
+            <p:cNvSpPr/>
+            <p:nvPr/>
+          </p:nvSpPr>
+          <p:spPr>
+            <a:xfrm>
+              <a:off x="395536" y="377456"/>
+              <a:ext cx="1512168" cy="1784608"/>
+            </a:xfrm>
+            <a:prstGeom prst="rect">
+              <a:avLst/>
+            </a:prstGeom>
+            <a:noFill/>
+            <a:ln>
+              <a:noFill/>
+            </a:ln>
+          </p:spPr>
+          <p:style>
+            <a:lnRef idx="2">
+              <a:schemeClr val="accent6">
+                <a:shade val="50000"/>
+              </a:schemeClr>
+            </a:lnRef>
+            <a:fillRef idx="1">
+              <a:schemeClr val="accent6"/>
+            </a:fillRef>
+            <a:effectRef idx="0">
+              <a:schemeClr val="accent6"/>
+            </a:effectRef>
+            <a:fontRef idx="minor">
+              <a:schemeClr val="lt1"/>
+            </a:fontRef>
+          </p:style>
+          <p:txBody>
+            <a:bodyPr vert="horz" rtlCol="0" anchor="t"/>
+            <a:lstStyle/>
+            <a:p>
+              <a:pPr marL="171450" indent="-171450">
+                <a:buFont typeface="Arial" panose="020B0604020202020204" pitchFamily="34" charset="0"/>
+                <a:buChar char="•"/>
+              </a:pPr>
+              <a:r>
+                <a:rPr lang="en-US" sz="1200" dirty="0">
+                  <a:solidFill>
+                    <a:schemeClr val="tx1"/>
+                  </a:solidFill>
+                </a:rPr>
+                <a:t>Booking confirmation</a:t>
+              </a:r>
+            </a:p>
+            <a:p>
+              <a:pPr marL="171450" indent="-171450">
+                <a:buFont typeface="Arial" panose="020B0604020202020204" pitchFamily="34" charset="0"/>
+                <a:buChar char="•"/>
+              </a:pPr>
+              <a:r>
+                <a:rPr lang="en-US" sz="1200" dirty="0">
+                  <a:solidFill>
+                    <a:schemeClr val="tx1"/>
+                  </a:solidFill>
+                </a:rPr>
+                <a:t>Ad detail &amp; booking page</a:t>
+              </a:r>
+            </a:p>
+            <a:p>
+              <a:pPr marL="171450" indent="-171450">
+                <a:buFont typeface="Arial" panose="020B0604020202020204" pitchFamily="34" charset="0"/>
+                <a:buChar char="•"/>
+              </a:pPr>
+              <a:r>
+                <a:rPr lang="en-US" sz="1200" dirty="0">
+                  <a:solidFill>
+                    <a:schemeClr val="tx1"/>
+                  </a:solidFill>
+                </a:rPr>
+                <a:t>Website</a:t>
+              </a:r>
+            </a:p>
+            <a:p>
+              <a:pPr marL="171450" indent="-171450">
+                <a:buFont typeface="Arial" panose="020B0604020202020204" pitchFamily="34" charset="0"/>
+                <a:buChar char="•"/>
+              </a:pPr>
+              <a:r>
+                <a:rPr lang="en-US" sz="1200" dirty="0">
+                  <a:solidFill>
+                    <a:schemeClr val="tx1"/>
+                  </a:solidFill>
+                </a:rPr>
+                <a:t>Facebook</a:t>
+              </a:r>
+            </a:p>
+          </p:txBody>
+        </p:sp>
+      </p:grpSp>
+    </p:spTree>
+    <p:extLst>
+      <p:ext uri="{BB962C8B-B14F-4D97-AF65-F5344CB8AC3E}">
+        <p14:creationId xmlns:p14="http://schemas.microsoft.com/office/powerpoint/2010/main" val="1677082597"/>
       </p:ext>
     </p:extLst>
   </p:cSld>

</xml_diff>